<commit_message>
Minor update to refactoring slides.
</commit_message>
<xml_diff>
--- a/slides/601 - Refactoring.pptx
+++ b/slides/601 - Refactoring.pptx
@@ -226,7 +226,7 @@
           <a:noFill/>
           <a:extLst>
             <a:ext uri="{909E8E84-426E-40dd-AFC4-6F175D3DCCD1}">
-              <a14:hiddenFill xmlns:a14="http://schemas.microsoft.com/office/drawing/2010/main" xmlns="">
+              <a14:hiddenFill xmlns="" xmlns:a14="http://schemas.microsoft.com/office/drawing/2010/main">
                 <a:solidFill>
                   <a:srgbClr val="FFFFFF"/>
                 </a:solidFill>
@@ -285,7 +285,7 @@
             </a:ln>
             <a:extLst>
               <a:ext uri="{91240B29-F687-4f45-9708-019B960494DF}">
-                <a14:hiddenLine xmlns:a14="http://schemas.microsoft.com/office/drawing/2010/main" xmlns="" w="9525">
+                <a14:hiddenLine xmlns="" xmlns:a14="http://schemas.microsoft.com/office/drawing/2010/main" w="9525">
                   <a:solidFill>
                     <a:srgbClr val="000000"/>
                   </a:solidFill>
@@ -375,7 +375,7 @@
             </a:ln>
             <a:extLst>
               <a:ext uri="{91240B29-F687-4f45-9708-019B960494DF}">
-                <a14:hiddenLine xmlns:a14="http://schemas.microsoft.com/office/drawing/2010/main" xmlns="" w="9525">
+                <a14:hiddenLine xmlns="" xmlns:a14="http://schemas.microsoft.com/office/drawing/2010/main" w="9525">
                   <a:solidFill>
                     <a:srgbClr val="000000"/>
                   </a:solidFill>
@@ -465,7 +465,7 @@
             </a:ln>
             <a:extLst>
               <a:ext uri="{91240B29-F687-4f45-9708-019B960494DF}">
-                <a14:hiddenLine xmlns:a14="http://schemas.microsoft.com/office/drawing/2010/main" xmlns="" w="9525">
+                <a14:hiddenLine xmlns="" xmlns:a14="http://schemas.microsoft.com/office/drawing/2010/main" w="9525">
                   <a:solidFill>
                     <a:srgbClr val="000000"/>
                   </a:solidFill>
@@ -499,7 +499,7 @@
             </a:ln>
             <a:extLst>
               <a:ext uri="{91240B29-F687-4f45-9708-019B960494DF}">
-                <a14:hiddenLine xmlns:a14="http://schemas.microsoft.com/office/drawing/2010/main" xmlns="" w="9525">
+                <a14:hiddenLine xmlns="" xmlns:a14="http://schemas.microsoft.com/office/drawing/2010/main" w="9525">
                   <a:solidFill>
                     <a:srgbClr val="000000"/>
                   </a:solidFill>
@@ -589,7 +589,7 @@
             </a:ln>
             <a:extLst>
               <a:ext uri="{91240B29-F687-4f45-9708-019B960494DF}">
-                <a14:hiddenLine xmlns:a14="http://schemas.microsoft.com/office/drawing/2010/main" xmlns="" w="9525">
+                <a14:hiddenLine xmlns="" xmlns:a14="http://schemas.microsoft.com/office/drawing/2010/main" w="9525">
                   <a:solidFill>
                     <a:srgbClr val="000000"/>
                   </a:solidFill>
@@ -651,7 +651,7 @@
             </a:ln>
             <a:extLst>
               <a:ext uri="{91240B29-F687-4f45-9708-019B960494DF}">
-                <a14:hiddenLine xmlns:a14="http://schemas.microsoft.com/office/drawing/2010/main" xmlns="" w="9525">
+                <a14:hiddenLine xmlns="" xmlns:a14="http://schemas.microsoft.com/office/drawing/2010/main" w="9525">
                   <a:solidFill>
                     <a:srgbClr val="000000"/>
                   </a:solidFill>
@@ -713,7 +713,7 @@
             </a:ln>
             <a:extLst>
               <a:ext uri="{91240B29-F687-4f45-9708-019B960494DF}">
-                <a14:hiddenLine xmlns:a14="http://schemas.microsoft.com/office/drawing/2010/main" xmlns="" w="9525">
+                <a14:hiddenLine xmlns="" xmlns:a14="http://schemas.microsoft.com/office/drawing/2010/main" w="9525">
                   <a:solidFill>
                     <a:srgbClr val="000000"/>
                   </a:solidFill>
@@ -803,7 +803,7 @@
             </a:ln>
             <a:extLst>
               <a:ext uri="{91240B29-F687-4f45-9708-019B960494DF}">
-                <a14:hiddenLine xmlns:a14="http://schemas.microsoft.com/office/drawing/2010/main" xmlns="" w="9525">
+                <a14:hiddenLine xmlns="" xmlns:a14="http://schemas.microsoft.com/office/drawing/2010/main" w="9525">
                   <a:solidFill>
                     <a:srgbClr val="000000"/>
                   </a:solidFill>
@@ -865,7 +865,7 @@
             </a:ln>
             <a:extLst>
               <a:ext uri="{91240B29-F687-4f45-9708-019B960494DF}">
-                <a14:hiddenLine xmlns:a14="http://schemas.microsoft.com/office/drawing/2010/main" xmlns="" w="9525">
+                <a14:hiddenLine xmlns="" xmlns:a14="http://schemas.microsoft.com/office/drawing/2010/main" w="9525">
                   <a:solidFill>
                     <a:srgbClr val="000000"/>
                   </a:solidFill>
@@ -927,7 +927,7 @@
             </a:ln>
             <a:extLst>
               <a:ext uri="{91240B29-F687-4f45-9708-019B960494DF}">
-                <a14:hiddenLine xmlns:a14="http://schemas.microsoft.com/office/drawing/2010/main" xmlns="" w="9525">
+                <a14:hiddenLine xmlns="" xmlns:a14="http://schemas.microsoft.com/office/drawing/2010/main" w="9525">
                   <a:solidFill>
                     <a:srgbClr val="000000"/>
                   </a:solidFill>
@@ -1017,7 +1017,7 @@
             </a:ln>
             <a:extLst>
               <a:ext uri="{91240B29-F687-4f45-9708-019B960494DF}">
-                <a14:hiddenLine xmlns:a14="http://schemas.microsoft.com/office/drawing/2010/main" xmlns="" w="9525">
+                <a14:hiddenLine xmlns="" xmlns:a14="http://schemas.microsoft.com/office/drawing/2010/main" w="9525">
                   <a:solidFill>
                     <a:srgbClr val="000000"/>
                   </a:solidFill>
@@ -1107,7 +1107,7 @@
             </a:ln>
             <a:extLst>
               <a:ext uri="{91240B29-F687-4f45-9708-019B960494DF}">
-                <a14:hiddenLine xmlns:a14="http://schemas.microsoft.com/office/drawing/2010/main" xmlns="" w="9525">
+                <a14:hiddenLine xmlns="" xmlns:a14="http://schemas.microsoft.com/office/drawing/2010/main" w="9525">
                   <a:solidFill>
                     <a:srgbClr val="000000"/>
                   </a:solidFill>
@@ -1169,7 +1169,7 @@
             </a:ln>
             <a:extLst>
               <a:ext uri="{91240B29-F687-4f45-9708-019B960494DF}">
-                <a14:hiddenLine xmlns:a14="http://schemas.microsoft.com/office/drawing/2010/main" xmlns="" w="9525">
+                <a14:hiddenLine xmlns="" xmlns:a14="http://schemas.microsoft.com/office/drawing/2010/main" w="9525">
                   <a:solidFill>
                     <a:srgbClr val="000000"/>
                   </a:solidFill>
@@ -1279,7 +1279,7 @@
             </a:ln>
             <a:extLst>
               <a:ext uri="{91240B29-F687-4f45-9708-019B960494DF}">
-                <a14:hiddenLine xmlns:a14="http://schemas.microsoft.com/office/drawing/2010/main" xmlns="" w="9525">
+                <a14:hiddenLine xmlns="" xmlns:a14="http://schemas.microsoft.com/office/drawing/2010/main" w="9525">
                   <a:solidFill>
                     <a:srgbClr val="000000"/>
                   </a:solidFill>
@@ -1341,7 +1341,7 @@
             </a:ln>
             <a:extLst>
               <a:ext uri="{91240B29-F687-4f45-9708-019B960494DF}">
-                <a14:hiddenLine xmlns:a14="http://schemas.microsoft.com/office/drawing/2010/main" xmlns="" w="9525">
+                <a14:hiddenLine xmlns="" xmlns:a14="http://schemas.microsoft.com/office/drawing/2010/main" w="9525">
                   <a:solidFill>
                     <a:srgbClr val="000000"/>
                   </a:solidFill>
@@ -1431,7 +1431,7 @@
             </a:ln>
             <a:extLst>
               <a:ext uri="{91240B29-F687-4f45-9708-019B960494DF}">
-                <a14:hiddenLine xmlns:a14="http://schemas.microsoft.com/office/drawing/2010/main" xmlns="" w="9525">
+                <a14:hiddenLine xmlns="" xmlns:a14="http://schemas.microsoft.com/office/drawing/2010/main" w="9525">
                   <a:solidFill>
                     <a:srgbClr val="000000"/>
                   </a:solidFill>
@@ -1521,7 +1521,7 @@
             </a:ln>
             <a:extLst>
               <a:ext uri="{91240B29-F687-4f45-9708-019B960494DF}">
-                <a14:hiddenLine xmlns:a14="http://schemas.microsoft.com/office/drawing/2010/main" xmlns="" w="9525">
+                <a14:hiddenLine xmlns="" xmlns:a14="http://schemas.microsoft.com/office/drawing/2010/main" w="9525">
                   <a:solidFill>
                     <a:srgbClr val="000000"/>
                   </a:solidFill>
@@ -1583,7 +1583,7 @@
             </a:ln>
             <a:extLst>
               <a:ext uri="{91240B29-F687-4f45-9708-019B960494DF}">
-                <a14:hiddenLine xmlns:a14="http://schemas.microsoft.com/office/drawing/2010/main" xmlns="" w="9525">
+                <a14:hiddenLine xmlns="" xmlns:a14="http://schemas.microsoft.com/office/drawing/2010/main" w="9525">
                   <a:solidFill>
                     <a:srgbClr val="000000"/>
                   </a:solidFill>
@@ -1673,7 +1673,7 @@
             </a:ln>
             <a:extLst>
               <a:ext uri="{91240B29-F687-4f45-9708-019B960494DF}">
-                <a14:hiddenLine xmlns:a14="http://schemas.microsoft.com/office/drawing/2010/main" xmlns="" w="9525">
+                <a14:hiddenLine xmlns="" xmlns:a14="http://schemas.microsoft.com/office/drawing/2010/main" w="9525">
                   <a:solidFill>
                     <a:srgbClr val="000000"/>
                   </a:solidFill>
@@ -1763,7 +1763,7 @@
             </a:ln>
             <a:extLst>
               <a:ext uri="{91240B29-F687-4f45-9708-019B960494DF}">
-                <a14:hiddenLine xmlns:a14="http://schemas.microsoft.com/office/drawing/2010/main" xmlns="" w="9525">
+                <a14:hiddenLine xmlns="" xmlns:a14="http://schemas.microsoft.com/office/drawing/2010/main" w="9525">
                   <a:solidFill>
                     <a:srgbClr val="000000"/>
                   </a:solidFill>
@@ -1819,7 +1819,7 @@
             </a:ln>
             <a:extLst>
               <a:ext uri="{91240B29-F687-4f45-9708-019B960494DF}">
-                <a14:hiddenLine xmlns:a14="http://schemas.microsoft.com/office/drawing/2010/main" xmlns="" w="9525">
+                <a14:hiddenLine xmlns="" xmlns:a14="http://schemas.microsoft.com/office/drawing/2010/main" w="9525">
                   <a:solidFill>
                     <a:srgbClr val="000000"/>
                   </a:solidFill>
@@ -1909,7 +1909,7 @@
             </a:ln>
             <a:extLst>
               <a:ext uri="{91240B29-F687-4f45-9708-019B960494DF}">
-                <a14:hiddenLine xmlns:a14="http://schemas.microsoft.com/office/drawing/2010/main" xmlns="" w="9525">
+                <a14:hiddenLine xmlns="" xmlns:a14="http://schemas.microsoft.com/office/drawing/2010/main" w="9525">
                   <a:solidFill>
                     <a:srgbClr val="000000"/>
                   </a:solidFill>
@@ -1965,7 +1965,7 @@
             </a:ln>
             <a:extLst>
               <a:ext uri="{91240B29-F687-4f45-9708-019B960494DF}">
-                <a14:hiddenLine xmlns:a14="http://schemas.microsoft.com/office/drawing/2010/main" xmlns="" w="9525">
+                <a14:hiddenLine xmlns="" xmlns:a14="http://schemas.microsoft.com/office/drawing/2010/main" w="9525">
                   <a:solidFill>
                     <a:srgbClr val="000000"/>
                   </a:solidFill>
@@ -2055,7 +2055,7 @@
             </a:ln>
             <a:extLst>
               <a:ext uri="{91240B29-F687-4f45-9708-019B960494DF}">
-                <a14:hiddenLine xmlns:a14="http://schemas.microsoft.com/office/drawing/2010/main" xmlns="" w="9525">
+                <a14:hiddenLine xmlns="" xmlns:a14="http://schemas.microsoft.com/office/drawing/2010/main" w="9525">
                   <a:solidFill>
                     <a:srgbClr val="000000"/>
                   </a:solidFill>
@@ -2123,7 +2123,7 @@
             </a:ln>
             <a:extLst>
               <a:ext uri="{91240B29-F687-4f45-9708-019B960494DF}">
-                <a14:hiddenLine xmlns:a14="http://schemas.microsoft.com/office/drawing/2010/main" xmlns="" w="9525">
+                <a14:hiddenLine xmlns="" xmlns:a14="http://schemas.microsoft.com/office/drawing/2010/main" w="9525">
                   <a:solidFill>
                     <a:srgbClr val="000000"/>
                   </a:solidFill>
@@ -2213,7 +2213,7 @@
             </a:ln>
             <a:extLst>
               <a:ext uri="{91240B29-F687-4f45-9708-019B960494DF}">
-                <a14:hiddenLine xmlns:a14="http://schemas.microsoft.com/office/drawing/2010/main" xmlns="" w="9525">
+                <a14:hiddenLine xmlns="" xmlns:a14="http://schemas.microsoft.com/office/drawing/2010/main" w="9525">
                   <a:solidFill>
                     <a:srgbClr val="000000"/>
                   </a:solidFill>
@@ -2281,7 +2281,7 @@
             </a:ln>
             <a:extLst>
               <a:ext uri="{91240B29-F687-4f45-9708-019B960494DF}">
-                <a14:hiddenLine xmlns:a14="http://schemas.microsoft.com/office/drawing/2010/main" xmlns="" w="9525">
+                <a14:hiddenLine xmlns="" xmlns:a14="http://schemas.microsoft.com/office/drawing/2010/main" w="9525">
                   <a:solidFill>
                     <a:srgbClr val="000000"/>
                   </a:solidFill>
@@ -2371,7 +2371,7 @@
             </a:ln>
             <a:extLst>
               <a:ext uri="{91240B29-F687-4f45-9708-019B960494DF}">
-                <a14:hiddenLine xmlns:a14="http://schemas.microsoft.com/office/drawing/2010/main" xmlns="" w="9525">
+                <a14:hiddenLine xmlns="" xmlns:a14="http://schemas.microsoft.com/office/drawing/2010/main" w="9525">
                   <a:solidFill>
                     <a:srgbClr val="000000"/>
                   </a:solidFill>
@@ -2405,7 +2405,7 @@
             </a:ln>
             <a:extLst>
               <a:ext uri="{91240B29-F687-4f45-9708-019B960494DF}">
-                <a14:hiddenLine xmlns:a14="http://schemas.microsoft.com/office/drawing/2010/main" xmlns="" w="9525">
+                <a14:hiddenLine xmlns="" xmlns:a14="http://schemas.microsoft.com/office/drawing/2010/main" w="9525">
                   <a:solidFill>
                     <a:srgbClr val="000000"/>
                   </a:solidFill>
@@ -2495,7 +2495,7 @@
             </a:ln>
             <a:extLst>
               <a:ext uri="{91240B29-F687-4f45-9708-019B960494DF}">
-                <a14:hiddenLine xmlns:a14="http://schemas.microsoft.com/office/drawing/2010/main" xmlns="" w="9525">
+                <a14:hiddenLine xmlns="" xmlns:a14="http://schemas.microsoft.com/office/drawing/2010/main" w="9525">
                   <a:solidFill>
                     <a:srgbClr val="000000"/>
                   </a:solidFill>
@@ -2557,7 +2557,7 @@
             </a:ln>
             <a:extLst>
               <a:ext uri="{91240B29-F687-4f45-9708-019B960494DF}">
-                <a14:hiddenLine xmlns:a14="http://schemas.microsoft.com/office/drawing/2010/main" xmlns="" w="9525">
+                <a14:hiddenLine xmlns="" xmlns:a14="http://schemas.microsoft.com/office/drawing/2010/main" w="9525">
                   <a:solidFill>
                     <a:srgbClr val="000000"/>
                   </a:solidFill>
@@ -2619,7 +2619,7 @@
             </a:ln>
             <a:extLst>
               <a:ext uri="{91240B29-F687-4f45-9708-019B960494DF}">
-                <a14:hiddenLine xmlns:a14="http://schemas.microsoft.com/office/drawing/2010/main" xmlns="" w="9525">
+                <a14:hiddenLine xmlns="" xmlns:a14="http://schemas.microsoft.com/office/drawing/2010/main" w="9525">
                   <a:solidFill>
                     <a:srgbClr val="000000"/>
                   </a:solidFill>
@@ -2709,7 +2709,7 @@
             </a:ln>
             <a:extLst>
               <a:ext uri="{91240B29-F687-4f45-9708-019B960494DF}">
-                <a14:hiddenLine xmlns:a14="http://schemas.microsoft.com/office/drawing/2010/main" xmlns="" w="9525">
+                <a14:hiddenLine xmlns="" xmlns:a14="http://schemas.microsoft.com/office/drawing/2010/main" w="9525">
                   <a:solidFill>
                     <a:srgbClr val="000000"/>
                   </a:solidFill>
@@ -2777,7 +2777,7 @@
             </a:ln>
             <a:extLst>
               <a:ext uri="{91240B29-F687-4f45-9708-019B960494DF}">
-                <a14:hiddenLine xmlns:a14="http://schemas.microsoft.com/office/drawing/2010/main" xmlns="" w="9525">
+                <a14:hiddenLine xmlns="" xmlns:a14="http://schemas.microsoft.com/office/drawing/2010/main" w="9525">
                   <a:solidFill>
                     <a:srgbClr val="000000"/>
                   </a:solidFill>
@@ -2839,7 +2839,7 @@
             </a:ln>
             <a:extLst>
               <a:ext uri="{91240B29-F687-4f45-9708-019B960494DF}">
-                <a14:hiddenLine xmlns:a14="http://schemas.microsoft.com/office/drawing/2010/main" xmlns="" w="9525">
+                <a14:hiddenLine xmlns="" xmlns:a14="http://schemas.microsoft.com/office/drawing/2010/main" w="9525">
                   <a:solidFill>
                     <a:srgbClr val="000000"/>
                   </a:solidFill>
@@ -2929,7 +2929,7 @@
             </a:ln>
             <a:extLst>
               <a:ext uri="{91240B29-F687-4f45-9708-019B960494DF}">
-                <a14:hiddenLine xmlns:a14="http://schemas.microsoft.com/office/drawing/2010/main" xmlns="" w="9525">
+                <a14:hiddenLine xmlns="" xmlns:a14="http://schemas.microsoft.com/office/drawing/2010/main" w="9525">
                   <a:solidFill>
                     <a:srgbClr val="000000"/>
                   </a:solidFill>
@@ -2991,7 +2991,7 @@
             </a:ln>
             <a:extLst>
               <a:ext uri="{91240B29-F687-4f45-9708-019B960494DF}">
-                <a14:hiddenLine xmlns:a14="http://schemas.microsoft.com/office/drawing/2010/main" xmlns="" w="9525">
+                <a14:hiddenLine xmlns="" xmlns:a14="http://schemas.microsoft.com/office/drawing/2010/main" w="9525">
                   <a:solidFill>
                     <a:srgbClr val="000000"/>
                   </a:solidFill>
@@ -3081,7 +3081,7 @@
             </a:ln>
             <a:extLst>
               <a:ext uri="{91240B29-F687-4f45-9708-019B960494DF}">
-                <a14:hiddenLine xmlns:a14="http://schemas.microsoft.com/office/drawing/2010/main" xmlns="" w="9525">
+                <a14:hiddenLine xmlns="" xmlns:a14="http://schemas.microsoft.com/office/drawing/2010/main" w="9525">
                   <a:solidFill>
                     <a:srgbClr val="000000"/>
                   </a:solidFill>
@@ -3143,7 +3143,7 @@
             </a:ln>
             <a:extLst>
               <a:ext uri="{91240B29-F687-4f45-9708-019B960494DF}">
-                <a14:hiddenLine xmlns:a14="http://schemas.microsoft.com/office/drawing/2010/main" xmlns="" w="9525">
+                <a14:hiddenLine xmlns="" xmlns:a14="http://schemas.microsoft.com/office/drawing/2010/main" w="9525">
                   <a:solidFill>
                     <a:srgbClr val="000000"/>
                   </a:solidFill>
@@ -3233,7 +3233,7 @@
             </a:ln>
             <a:extLst>
               <a:ext uri="{91240B29-F687-4f45-9708-019B960494DF}">
-                <a14:hiddenLine xmlns:a14="http://schemas.microsoft.com/office/drawing/2010/main" xmlns="" w="9525">
+                <a14:hiddenLine xmlns="" xmlns:a14="http://schemas.microsoft.com/office/drawing/2010/main" w="9525">
                   <a:solidFill>
                     <a:srgbClr val="000000"/>
                   </a:solidFill>
@@ -3267,7 +3267,7 @@
             </a:ln>
             <a:extLst>
               <a:ext uri="{91240B29-F687-4f45-9708-019B960494DF}">
-                <a14:hiddenLine xmlns:a14="http://schemas.microsoft.com/office/drawing/2010/main" xmlns="" w="9525">
+                <a14:hiddenLine xmlns="" xmlns:a14="http://schemas.microsoft.com/office/drawing/2010/main" w="9525">
                   <a:solidFill>
                     <a:srgbClr val="000000"/>
                   </a:solidFill>
@@ -3332,7 +3332,7 @@
             </a:ln>
             <a:extLst>
               <a:ext uri="{91240B29-F687-4f45-9708-019B960494DF}">
-                <a14:hiddenLine xmlns:a14="http://schemas.microsoft.com/office/drawing/2010/main" xmlns="" w="9525">
+                <a14:hiddenLine xmlns="" xmlns:a14="http://schemas.microsoft.com/office/drawing/2010/main" w="9525">
                   <a:solidFill>
                     <a:srgbClr val="000000"/>
                   </a:solidFill>
@@ -3422,7 +3422,7 @@
             </a:ln>
             <a:extLst>
               <a:ext uri="{91240B29-F687-4f45-9708-019B960494DF}">
-                <a14:hiddenLine xmlns:a14="http://schemas.microsoft.com/office/drawing/2010/main" xmlns="" w="9525">
+                <a14:hiddenLine xmlns="" xmlns:a14="http://schemas.microsoft.com/office/drawing/2010/main" w="9525">
                   <a:solidFill>
                     <a:srgbClr val="000000"/>
                   </a:solidFill>
@@ -3484,7 +3484,7 @@
             </a:ln>
             <a:extLst>
               <a:ext uri="{91240B29-F687-4f45-9708-019B960494DF}">
-                <a14:hiddenLine xmlns:a14="http://schemas.microsoft.com/office/drawing/2010/main" xmlns="" w="9525">
+                <a14:hiddenLine xmlns="" xmlns:a14="http://schemas.microsoft.com/office/drawing/2010/main" w="9525">
                   <a:solidFill>
                     <a:srgbClr val="000000"/>
                   </a:solidFill>
@@ -3574,7 +3574,7 @@
             </a:ln>
             <a:extLst>
               <a:ext uri="{91240B29-F687-4f45-9708-019B960494DF}">
-                <a14:hiddenLine xmlns:a14="http://schemas.microsoft.com/office/drawing/2010/main" xmlns="" w="9525">
+                <a14:hiddenLine xmlns="" xmlns:a14="http://schemas.microsoft.com/office/drawing/2010/main" w="9525">
                   <a:solidFill>
                     <a:srgbClr val="000000"/>
                   </a:solidFill>
@@ -3664,7 +3664,7 @@
             </a:ln>
             <a:extLst>
               <a:ext uri="{91240B29-F687-4f45-9708-019B960494DF}">
-                <a14:hiddenLine xmlns:a14="http://schemas.microsoft.com/office/drawing/2010/main" xmlns="" w="9525">
+                <a14:hiddenLine xmlns="" xmlns:a14="http://schemas.microsoft.com/office/drawing/2010/main" w="9525">
                   <a:solidFill>
                     <a:srgbClr val="000000"/>
                   </a:solidFill>
@@ -3729,7 +3729,7 @@
             </a:ln>
             <a:extLst>
               <a:ext uri="{91240B29-F687-4f45-9708-019B960494DF}">
-                <a14:hiddenLine xmlns:a14="http://schemas.microsoft.com/office/drawing/2010/main" xmlns="" w="9525">
+                <a14:hiddenLine xmlns="" xmlns:a14="http://schemas.microsoft.com/office/drawing/2010/main" w="9525">
                   <a:solidFill>
                     <a:srgbClr val="000000"/>
                   </a:solidFill>
@@ -3791,7 +3791,7 @@
             </a:ln>
             <a:extLst>
               <a:ext uri="{91240B29-F687-4f45-9708-019B960494DF}">
-                <a14:hiddenLine xmlns:a14="http://schemas.microsoft.com/office/drawing/2010/main" xmlns="" w="9525">
+                <a14:hiddenLine xmlns="" xmlns:a14="http://schemas.microsoft.com/office/drawing/2010/main" w="9525">
                   <a:solidFill>
                     <a:srgbClr val="000000"/>
                   </a:solidFill>
@@ -3881,7 +3881,7 @@
             </a:ln>
             <a:extLst>
               <a:ext uri="{91240B29-F687-4f45-9708-019B960494DF}">
-                <a14:hiddenLine xmlns:a14="http://schemas.microsoft.com/office/drawing/2010/main" xmlns="" w="9525">
+                <a14:hiddenLine xmlns="" xmlns:a14="http://schemas.microsoft.com/office/drawing/2010/main" w="9525">
                   <a:solidFill>
                     <a:srgbClr val="000000"/>
                   </a:solidFill>
@@ -3971,7 +3971,7 @@
             </a:ln>
             <a:extLst>
               <a:ext uri="{91240B29-F687-4f45-9708-019B960494DF}">
-                <a14:hiddenLine xmlns:a14="http://schemas.microsoft.com/office/drawing/2010/main" xmlns="" w="9525">
+                <a14:hiddenLine xmlns="" xmlns:a14="http://schemas.microsoft.com/office/drawing/2010/main" w="9525">
                   <a:solidFill>
                     <a:srgbClr val="000000"/>
                   </a:solidFill>
@@ -4033,7 +4033,7 @@
             </a:ln>
             <a:extLst>
               <a:ext uri="{91240B29-F687-4f45-9708-019B960494DF}">
-                <a14:hiddenLine xmlns:a14="http://schemas.microsoft.com/office/drawing/2010/main" xmlns="" w="9525">
+                <a14:hiddenLine xmlns="" xmlns:a14="http://schemas.microsoft.com/office/drawing/2010/main" w="9525">
                   <a:solidFill>
                     <a:srgbClr val="000000"/>
                   </a:solidFill>
@@ -4153,7 +4153,7 @@
             </a:ln>
             <a:extLst>
               <a:ext uri="{91240B29-F687-4f45-9708-019B960494DF}">
-                <a14:hiddenLine xmlns:a14="http://schemas.microsoft.com/office/drawing/2010/main" xmlns="" w="9525">
+                <a14:hiddenLine xmlns="" xmlns:a14="http://schemas.microsoft.com/office/drawing/2010/main" w="9525">
                   <a:solidFill>
                     <a:srgbClr val="000000"/>
                   </a:solidFill>
@@ -4221,7 +4221,7 @@
             </a:ln>
             <a:extLst>
               <a:ext uri="{91240B29-F687-4f45-9708-019B960494DF}">
-                <a14:hiddenLine xmlns:a14="http://schemas.microsoft.com/office/drawing/2010/main" xmlns="" w="9525">
+                <a14:hiddenLine xmlns="" xmlns:a14="http://schemas.microsoft.com/office/drawing/2010/main" w="9525">
                   <a:solidFill>
                     <a:srgbClr val="000000"/>
                   </a:solidFill>
@@ -4311,7 +4311,7 @@
             </a:ln>
             <a:extLst>
               <a:ext uri="{91240B29-F687-4f45-9708-019B960494DF}">
-                <a14:hiddenLine xmlns:a14="http://schemas.microsoft.com/office/drawing/2010/main" xmlns="" w="9525">
+                <a14:hiddenLine xmlns="" xmlns:a14="http://schemas.microsoft.com/office/drawing/2010/main" w="9525">
                   <a:solidFill>
                     <a:srgbClr val="000000"/>
                   </a:solidFill>
@@ -4452,7 +4452,7 @@
             <a:fld id="{B61BEF0D-F0BB-DE4B-95CE-6DB70DBA9567}" type="datetimeFigureOut">
               <a:rPr lang="en-US" smtClean="0"/>
               <a:pPr/>
-              <a:t>10/10/19</a:t>
+              <a:t>10/14/19</a:t>
             </a:fld>
             <a:endParaRPr lang="en-US" dirty="0"/>
           </a:p>
@@ -4721,7 +4721,7 @@
             <a:fld id="{B61BEF0D-F0BB-DE4B-95CE-6DB70DBA9567}" type="datetimeFigureOut">
               <a:rPr lang="en-US" smtClean="0"/>
               <a:pPr/>
-              <a:t>10/10/19</a:t>
+              <a:t>10/14/19</a:t>
             </a:fld>
             <a:endParaRPr lang="en-US" dirty="0"/>
           </a:p>
@@ -4919,7 +4919,7 @@
             <a:fld id="{B61BEF0D-F0BB-DE4B-95CE-6DB70DBA9567}" type="datetimeFigureOut">
               <a:rPr lang="en-US" smtClean="0"/>
               <a:pPr/>
-              <a:t>10/10/19</a:t>
+              <a:t>10/14/19</a:t>
             </a:fld>
             <a:endParaRPr lang="en-US" dirty="0"/>
           </a:p>
@@ -5184,7 +5184,7 @@
             <a:fld id="{B61BEF0D-F0BB-DE4B-95CE-6DB70DBA9567}" type="datetimeFigureOut">
               <a:rPr lang="en-US" smtClean="0"/>
               <a:pPr/>
-              <a:t>10/10/19</a:t>
+              <a:t>10/14/19</a:t>
             </a:fld>
             <a:endParaRPr lang="en-US" dirty="0"/>
           </a:p>
@@ -5620,7 +5620,7 @@
             <a:fld id="{B61BEF0D-F0BB-DE4B-95CE-6DB70DBA9567}" type="datetimeFigureOut">
               <a:rPr lang="en-US" smtClean="0"/>
               <a:pPr/>
-              <a:t>10/10/19</a:t>
+              <a:t>10/14/19</a:t>
             </a:fld>
             <a:endParaRPr lang="en-US" dirty="0"/>
           </a:p>
@@ -6168,7 +6168,7 @@
             <a:fld id="{B61BEF0D-F0BB-DE4B-95CE-6DB70DBA9567}" type="datetimeFigureOut">
               <a:rPr lang="en-US" smtClean="0"/>
               <a:pPr/>
-              <a:t>10/10/19</a:t>
+              <a:t>10/14/19</a:t>
             </a:fld>
             <a:endParaRPr lang="en-US" dirty="0"/>
           </a:p>
@@ -6890,7 +6890,7 @@
             <a:fld id="{B61BEF0D-F0BB-DE4B-95CE-6DB70DBA9567}" type="datetimeFigureOut">
               <a:rPr lang="en-US" smtClean="0"/>
               <a:pPr/>
-              <a:t>10/10/19</a:t>
+              <a:t>10/14/19</a:t>
             </a:fld>
             <a:endParaRPr lang="en-US" dirty="0"/>
           </a:p>
@@ -7062,7 +7062,7 @@
             <a:fld id="{B61BEF0D-F0BB-DE4B-95CE-6DB70DBA9567}" type="datetimeFigureOut">
               <a:rPr lang="en-US" smtClean="0"/>
               <a:pPr/>
-              <a:t>10/10/19</a:t>
+              <a:t>10/14/19</a:t>
             </a:fld>
             <a:endParaRPr lang="en-US" dirty="0"/>
           </a:p>
@@ -7244,7 +7244,7 @@
             <a:fld id="{B61BEF0D-F0BB-DE4B-95CE-6DB70DBA9567}" type="datetimeFigureOut">
               <a:rPr lang="en-US" smtClean="0"/>
               <a:pPr/>
-              <a:t>10/10/19</a:t>
+              <a:t>10/14/19</a:t>
             </a:fld>
             <a:endParaRPr lang="en-US" dirty="0"/>
           </a:p>
@@ -7433,7 +7433,7 @@
             <a:fld id="{B61BEF0D-F0BB-DE4B-95CE-6DB70DBA9567}" type="datetimeFigureOut">
               <a:rPr lang="en-US" smtClean="0"/>
               <a:pPr/>
-              <a:t>10/10/19</a:t>
+              <a:t>10/14/19</a:t>
             </a:fld>
             <a:endParaRPr lang="en-US" dirty="0"/>
           </a:p>
@@ -7685,7 +7685,7 @@
             <a:fld id="{B61BEF0D-F0BB-DE4B-95CE-6DB70DBA9567}" type="datetimeFigureOut">
               <a:rPr lang="en-US" smtClean="0"/>
               <a:pPr/>
-              <a:t>10/10/19</a:t>
+              <a:t>10/14/19</a:t>
             </a:fld>
             <a:endParaRPr lang="en-US" dirty="0"/>
           </a:p>
@@ -7919,7 +7919,7 @@
             <a:fld id="{B61BEF0D-F0BB-DE4B-95CE-6DB70DBA9567}" type="datetimeFigureOut">
               <a:rPr lang="en-US" smtClean="0"/>
               <a:pPr/>
-              <a:t>10/10/19</a:t>
+              <a:t>10/14/19</a:t>
             </a:fld>
             <a:endParaRPr lang="en-US" dirty="0"/>
           </a:p>
@@ -8306,7 +8306,7 @@
             <a:fld id="{B61BEF0D-F0BB-DE4B-95CE-6DB70DBA9567}" type="datetimeFigureOut">
               <a:rPr lang="en-US" smtClean="0"/>
               <a:pPr/>
-              <a:t>10/10/19</a:t>
+              <a:t>10/14/19</a:t>
             </a:fld>
             <a:endParaRPr lang="en-US" dirty="0"/>
           </a:p>
@@ -8426,7 +8426,7 @@
             <a:fld id="{B61BEF0D-F0BB-DE4B-95CE-6DB70DBA9567}" type="datetimeFigureOut">
               <a:rPr lang="en-US" smtClean="0"/>
               <a:pPr/>
-              <a:t>10/10/19</a:t>
+              <a:t>10/14/19</a:t>
             </a:fld>
             <a:endParaRPr lang="en-US" dirty="0"/>
           </a:p>
@@ -8523,7 +8523,7 @@
             <a:fld id="{B61BEF0D-F0BB-DE4B-95CE-6DB70DBA9567}" type="datetimeFigureOut">
               <a:rPr lang="en-US" smtClean="0"/>
               <a:pPr/>
-              <a:t>10/10/19</a:t>
+              <a:t>10/14/19</a:t>
             </a:fld>
             <a:endParaRPr lang="en-US" dirty="0"/>
           </a:p>
@@ -8774,7 +8774,7 @@
             <a:fld id="{B61BEF0D-F0BB-DE4B-95CE-6DB70DBA9567}" type="datetimeFigureOut">
               <a:rPr lang="en-US" smtClean="0"/>
               <a:pPr/>
-              <a:t>10/10/19</a:t>
+              <a:t>10/14/19</a:t>
             </a:fld>
             <a:endParaRPr lang="en-US" dirty="0"/>
           </a:p>
@@ -9061,7 +9061,7 @@
             <a:fld id="{B61BEF0D-F0BB-DE4B-95CE-6DB70DBA9567}" type="datetimeFigureOut">
               <a:rPr lang="en-US" smtClean="0"/>
               <a:pPr/>
-              <a:t>10/10/19</a:t>
+              <a:t>10/14/19</a:t>
             </a:fld>
             <a:endParaRPr lang="en-US" dirty="0"/>
           </a:p>
@@ -9185,7 +9185,7 @@
           <a:noFill/>
           <a:extLst>
             <a:ext uri="{909E8E84-426E-40dd-AFC4-6F175D3DCCD1}">
-              <a14:hiddenFill xmlns:a14="http://schemas.microsoft.com/office/drawing/2010/main" xmlns="">
+              <a14:hiddenFill xmlns="" xmlns:a14="http://schemas.microsoft.com/office/drawing/2010/main">
                 <a:solidFill>
                   <a:srgbClr val="FFFFFF"/>
                 </a:solidFill>
@@ -9259,7 +9259,7 @@
               </a:ln>
               <a:extLst>
                 <a:ext uri="{91240B29-F687-4f45-9708-019B960494DF}">
-                  <a14:hiddenLine xmlns:a14="http://schemas.microsoft.com/office/drawing/2010/main" xmlns="" w="9525">
+                  <a14:hiddenLine xmlns="" xmlns:a14="http://schemas.microsoft.com/office/drawing/2010/main" w="9525">
                     <a:solidFill>
                       <a:srgbClr val="000000"/>
                     </a:solidFill>
@@ -9349,7 +9349,7 @@
               </a:ln>
               <a:extLst>
                 <a:ext uri="{91240B29-F687-4f45-9708-019B960494DF}">
-                  <a14:hiddenLine xmlns:a14="http://schemas.microsoft.com/office/drawing/2010/main" xmlns="" w="9525">
+                  <a14:hiddenLine xmlns="" xmlns:a14="http://schemas.microsoft.com/office/drawing/2010/main" w="9525">
                     <a:solidFill>
                       <a:srgbClr val="000000"/>
                     </a:solidFill>
@@ -9439,7 +9439,7 @@
               </a:ln>
               <a:extLst>
                 <a:ext uri="{91240B29-F687-4f45-9708-019B960494DF}">
-                  <a14:hiddenLine xmlns:a14="http://schemas.microsoft.com/office/drawing/2010/main" xmlns="" w="9525">
+                  <a14:hiddenLine xmlns="" xmlns:a14="http://schemas.microsoft.com/office/drawing/2010/main" w="9525">
                     <a:solidFill>
                       <a:srgbClr val="000000"/>
                     </a:solidFill>
@@ -9501,7 +9501,7 @@
               </a:ln>
               <a:extLst>
                 <a:ext uri="{91240B29-F687-4f45-9708-019B960494DF}">
-                  <a14:hiddenLine xmlns:a14="http://schemas.microsoft.com/office/drawing/2010/main" xmlns="" w="9525">
+                  <a14:hiddenLine xmlns="" xmlns:a14="http://schemas.microsoft.com/office/drawing/2010/main" w="9525">
                     <a:solidFill>
                       <a:srgbClr val="000000"/>
                     </a:solidFill>
@@ -9591,7 +9591,7 @@
               </a:ln>
               <a:extLst>
                 <a:ext uri="{91240B29-F687-4f45-9708-019B960494DF}">
-                  <a14:hiddenLine xmlns:a14="http://schemas.microsoft.com/office/drawing/2010/main" xmlns="" w="9525">
+                  <a14:hiddenLine xmlns="" xmlns:a14="http://schemas.microsoft.com/office/drawing/2010/main" w="9525">
                     <a:solidFill>
                       <a:srgbClr val="000000"/>
                     </a:solidFill>
@@ -9653,7 +9653,7 @@
               </a:ln>
               <a:extLst>
                 <a:ext uri="{91240B29-F687-4f45-9708-019B960494DF}">
-                  <a14:hiddenLine xmlns:a14="http://schemas.microsoft.com/office/drawing/2010/main" xmlns="" w="9525">
+                  <a14:hiddenLine xmlns="" xmlns:a14="http://schemas.microsoft.com/office/drawing/2010/main" w="9525">
                     <a:solidFill>
                       <a:srgbClr val="000000"/>
                     </a:solidFill>
@@ -9715,7 +9715,7 @@
               </a:ln>
               <a:extLst>
                 <a:ext uri="{91240B29-F687-4f45-9708-019B960494DF}">
-                  <a14:hiddenLine xmlns:a14="http://schemas.microsoft.com/office/drawing/2010/main" xmlns="" w="9525">
+                  <a14:hiddenLine xmlns="" xmlns:a14="http://schemas.microsoft.com/office/drawing/2010/main" w="9525">
                     <a:solidFill>
                       <a:srgbClr val="000000"/>
                     </a:solidFill>
@@ -9805,7 +9805,7 @@
               </a:ln>
               <a:extLst>
                 <a:ext uri="{91240B29-F687-4f45-9708-019B960494DF}">
-                  <a14:hiddenLine xmlns:a14="http://schemas.microsoft.com/office/drawing/2010/main" xmlns="" w="9525">
+                  <a14:hiddenLine xmlns="" xmlns:a14="http://schemas.microsoft.com/office/drawing/2010/main" w="9525">
                     <a:solidFill>
                       <a:srgbClr val="000000"/>
                     </a:solidFill>
@@ -9895,7 +9895,7 @@
               </a:ln>
               <a:extLst>
                 <a:ext uri="{91240B29-F687-4f45-9708-019B960494DF}">
-                  <a14:hiddenLine xmlns:a14="http://schemas.microsoft.com/office/drawing/2010/main" xmlns="" w="9525">
+                  <a14:hiddenLine xmlns="" xmlns:a14="http://schemas.microsoft.com/office/drawing/2010/main" w="9525">
                     <a:solidFill>
                       <a:srgbClr val="000000"/>
                     </a:solidFill>
@@ -9957,7 +9957,7 @@
               </a:ln>
               <a:extLst>
                 <a:ext uri="{91240B29-F687-4f45-9708-019B960494DF}">
-                  <a14:hiddenLine xmlns:a14="http://schemas.microsoft.com/office/drawing/2010/main" xmlns="" w="9525">
+                  <a14:hiddenLine xmlns="" xmlns:a14="http://schemas.microsoft.com/office/drawing/2010/main" w="9525">
                     <a:solidFill>
                       <a:srgbClr val="000000"/>
                     </a:solidFill>
@@ -10067,7 +10067,7 @@
               </a:ln>
               <a:extLst>
                 <a:ext uri="{91240B29-F687-4f45-9708-019B960494DF}">
-                  <a14:hiddenLine xmlns:a14="http://schemas.microsoft.com/office/drawing/2010/main" xmlns="" w="9525">
+                  <a14:hiddenLine xmlns="" xmlns:a14="http://schemas.microsoft.com/office/drawing/2010/main" w="9525">
                     <a:solidFill>
                       <a:srgbClr val="000000"/>
                     </a:solidFill>
@@ -10151,7 +10151,7 @@
               </a:ln>
               <a:extLst>
                 <a:ext uri="{91240B29-F687-4f45-9708-019B960494DF}">
-                  <a14:hiddenLine xmlns:a14="http://schemas.microsoft.com/office/drawing/2010/main" xmlns="" w="9525">
+                  <a14:hiddenLine xmlns="" xmlns:a14="http://schemas.microsoft.com/office/drawing/2010/main" w="9525">
                     <a:solidFill>
                       <a:srgbClr val="000000"/>
                     </a:solidFill>
@@ -10213,7 +10213,7 @@
               </a:ln>
               <a:extLst>
                 <a:ext uri="{91240B29-F687-4f45-9708-019B960494DF}">
-                  <a14:hiddenLine xmlns:a14="http://schemas.microsoft.com/office/drawing/2010/main" xmlns="" w="9525">
+                  <a14:hiddenLine xmlns="" xmlns:a14="http://schemas.microsoft.com/office/drawing/2010/main" w="9525">
                     <a:solidFill>
                       <a:srgbClr val="000000"/>
                     </a:solidFill>
@@ -10275,7 +10275,7 @@
               </a:ln>
               <a:extLst>
                 <a:ext uri="{91240B29-F687-4f45-9708-019B960494DF}">
-                  <a14:hiddenLine xmlns:a14="http://schemas.microsoft.com/office/drawing/2010/main" xmlns="" w="9525">
+                  <a14:hiddenLine xmlns="" xmlns:a14="http://schemas.microsoft.com/office/drawing/2010/main" w="9525">
                     <a:solidFill>
                       <a:srgbClr val="000000"/>
                     </a:solidFill>
@@ -10365,7 +10365,7 @@
               </a:ln>
               <a:extLst>
                 <a:ext uri="{91240B29-F687-4f45-9708-019B960494DF}">
-                  <a14:hiddenLine xmlns:a14="http://schemas.microsoft.com/office/drawing/2010/main" xmlns="" w="9525">
+                  <a14:hiddenLine xmlns="" xmlns:a14="http://schemas.microsoft.com/office/drawing/2010/main" w="9525">
                     <a:solidFill>
                       <a:srgbClr val="000000"/>
                     </a:solidFill>
@@ -10399,7 +10399,7 @@
               </a:ln>
               <a:extLst>
                 <a:ext uri="{91240B29-F687-4f45-9708-019B960494DF}">
-                  <a14:hiddenLine xmlns:a14="http://schemas.microsoft.com/office/drawing/2010/main" xmlns="" w="9525">
+                  <a14:hiddenLine xmlns="" xmlns:a14="http://schemas.microsoft.com/office/drawing/2010/main" w="9525">
                     <a:solidFill>
                       <a:srgbClr val="000000"/>
                     </a:solidFill>
@@ -10464,7 +10464,7 @@
               </a:ln>
               <a:extLst>
                 <a:ext uri="{91240B29-F687-4f45-9708-019B960494DF}">
-                  <a14:hiddenLine xmlns:a14="http://schemas.microsoft.com/office/drawing/2010/main" xmlns="" w="9525">
+                  <a14:hiddenLine xmlns="" xmlns:a14="http://schemas.microsoft.com/office/drawing/2010/main" w="9525">
                     <a:solidFill>
                       <a:srgbClr val="000000"/>
                     </a:solidFill>
@@ -10554,7 +10554,7 @@
               </a:ln>
               <a:extLst>
                 <a:ext uri="{91240B29-F687-4f45-9708-019B960494DF}">
-                  <a14:hiddenLine xmlns:a14="http://schemas.microsoft.com/office/drawing/2010/main" xmlns="" w="9525">
+                  <a14:hiddenLine xmlns="" xmlns:a14="http://schemas.microsoft.com/office/drawing/2010/main" w="9525">
                     <a:solidFill>
                       <a:srgbClr val="000000"/>
                     </a:solidFill>
@@ -10616,7 +10616,7 @@
               </a:ln>
               <a:extLst>
                 <a:ext uri="{91240B29-F687-4f45-9708-019B960494DF}">
-                  <a14:hiddenLine xmlns:a14="http://schemas.microsoft.com/office/drawing/2010/main" xmlns="" w="9525">
+                  <a14:hiddenLine xmlns="" xmlns:a14="http://schemas.microsoft.com/office/drawing/2010/main" w="9525">
                     <a:solidFill>
                       <a:srgbClr val="000000"/>
                     </a:solidFill>
@@ -10706,7 +10706,7 @@
               </a:ln>
               <a:extLst>
                 <a:ext uri="{91240B29-F687-4f45-9708-019B960494DF}">
-                  <a14:hiddenLine xmlns:a14="http://schemas.microsoft.com/office/drawing/2010/main" xmlns="" w="9525">
+                  <a14:hiddenLine xmlns="" xmlns:a14="http://schemas.microsoft.com/office/drawing/2010/main" w="9525">
                     <a:solidFill>
                       <a:srgbClr val="000000"/>
                     </a:solidFill>
@@ -10771,7 +10771,7 @@
               </a:ln>
               <a:extLst>
                 <a:ext uri="{91240B29-F687-4f45-9708-019B960494DF}">
-                  <a14:hiddenLine xmlns:a14="http://schemas.microsoft.com/office/drawing/2010/main" xmlns="" w="9525">
+                  <a14:hiddenLine xmlns="" xmlns:a14="http://schemas.microsoft.com/office/drawing/2010/main" w="9525">
                     <a:solidFill>
                       <a:srgbClr val="000000"/>
                     </a:solidFill>
@@ -10833,7 +10833,7 @@
               </a:ln>
               <a:extLst>
                 <a:ext uri="{91240B29-F687-4f45-9708-019B960494DF}">
-                  <a14:hiddenLine xmlns:a14="http://schemas.microsoft.com/office/drawing/2010/main" xmlns="" w="9525">
+                  <a14:hiddenLine xmlns="" xmlns:a14="http://schemas.microsoft.com/office/drawing/2010/main" w="9525">
                     <a:solidFill>
                       <a:srgbClr val="000000"/>
                     </a:solidFill>
@@ -10923,7 +10923,7 @@
               </a:ln>
               <a:extLst>
                 <a:ext uri="{91240B29-F687-4f45-9708-019B960494DF}">
-                  <a14:hiddenLine xmlns:a14="http://schemas.microsoft.com/office/drawing/2010/main" xmlns="" w="9525">
+                  <a14:hiddenLine xmlns="" xmlns:a14="http://schemas.microsoft.com/office/drawing/2010/main" w="9525">
                     <a:solidFill>
                       <a:srgbClr val="000000"/>
                     </a:solidFill>
@@ -11013,7 +11013,7 @@
               </a:ln>
               <a:extLst>
                 <a:ext uri="{91240B29-F687-4f45-9708-019B960494DF}">
-                  <a14:hiddenLine xmlns:a14="http://schemas.microsoft.com/office/drawing/2010/main" xmlns="" w="9525">
+                  <a14:hiddenLine xmlns="" xmlns:a14="http://schemas.microsoft.com/office/drawing/2010/main" w="9525">
                     <a:solidFill>
                       <a:srgbClr val="000000"/>
                     </a:solidFill>
@@ -11078,7 +11078,7 @@
               </a:ln>
               <a:extLst>
                 <a:ext uri="{91240B29-F687-4f45-9708-019B960494DF}">
-                  <a14:hiddenLine xmlns:a14="http://schemas.microsoft.com/office/drawing/2010/main" xmlns="" w="9525">
+                  <a14:hiddenLine xmlns="" xmlns:a14="http://schemas.microsoft.com/office/drawing/2010/main" w="9525">
                     <a:solidFill>
                       <a:srgbClr val="000000"/>
                     </a:solidFill>
@@ -11198,7 +11198,7 @@
               </a:ln>
               <a:extLst>
                 <a:ext uri="{91240B29-F687-4f45-9708-019B960494DF}">
-                  <a14:hiddenLine xmlns:a14="http://schemas.microsoft.com/office/drawing/2010/main" xmlns="" w="9525">
+                  <a14:hiddenLine xmlns="" xmlns:a14="http://schemas.microsoft.com/office/drawing/2010/main" w="9525">
                     <a:solidFill>
                       <a:srgbClr val="000000"/>
                     </a:solidFill>
@@ -11279,7 +11279,7 @@
               </a:ln>
               <a:extLst>
                 <a:ext uri="{91240B29-F687-4f45-9708-019B960494DF}">
-                  <a14:hiddenLine xmlns:a14="http://schemas.microsoft.com/office/drawing/2010/main" xmlns="" w="9525">
+                  <a14:hiddenLine xmlns="" xmlns:a14="http://schemas.microsoft.com/office/drawing/2010/main" w="9525">
                     <a:solidFill>
                       <a:srgbClr val="000000"/>
                     </a:solidFill>
@@ -11394,7 +11394,7 @@
               </a:ln>
               <a:extLst>
                 <a:ext uri="{91240B29-F687-4f45-9708-019B960494DF}">
-                  <a14:hiddenLine xmlns:a14="http://schemas.microsoft.com/office/drawing/2010/main" xmlns="" w="9525">
+                  <a14:hiddenLine xmlns="" xmlns:a14="http://schemas.microsoft.com/office/drawing/2010/main" w="9525">
                     <a:solidFill>
                       <a:srgbClr val="000000"/>
                     </a:solidFill>
@@ -11484,7 +11484,7 @@
               </a:ln>
               <a:extLst>
                 <a:ext uri="{91240B29-F687-4f45-9708-019B960494DF}">
-                  <a14:hiddenLine xmlns:a14="http://schemas.microsoft.com/office/drawing/2010/main" xmlns="" w="9525">
+                  <a14:hiddenLine xmlns="" xmlns:a14="http://schemas.microsoft.com/office/drawing/2010/main" w="9525">
                     <a:solidFill>
                       <a:srgbClr val="000000"/>
                     </a:solidFill>
@@ -11549,7 +11549,7 @@
               </a:ln>
               <a:extLst>
                 <a:ext uri="{91240B29-F687-4f45-9708-019B960494DF}">
-                  <a14:hiddenLine xmlns:a14="http://schemas.microsoft.com/office/drawing/2010/main" xmlns="" w="9525">
+                  <a14:hiddenLine xmlns="" xmlns:a14="http://schemas.microsoft.com/office/drawing/2010/main" w="9525">
                     <a:solidFill>
                       <a:srgbClr val="000000"/>
                     </a:solidFill>
@@ -11639,7 +11639,7 @@
               </a:ln>
               <a:extLst>
                 <a:ext uri="{91240B29-F687-4f45-9708-019B960494DF}">
-                  <a14:hiddenLine xmlns:a14="http://schemas.microsoft.com/office/drawing/2010/main" xmlns="" w="9525">
+                  <a14:hiddenLine xmlns="" xmlns:a14="http://schemas.microsoft.com/office/drawing/2010/main" w="9525">
                     <a:solidFill>
                       <a:srgbClr val="000000"/>
                     </a:solidFill>
@@ -11707,7 +11707,7 @@
               </a:ln>
               <a:extLst>
                 <a:ext uri="{91240B29-F687-4f45-9708-019B960494DF}">
-                  <a14:hiddenLine xmlns:a14="http://schemas.microsoft.com/office/drawing/2010/main" xmlns="" w="9525">
+                  <a14:hiddenLine xmlns="" xmlns:a14="http://schemas.microsoft.com/office/drawing/2010/main" w="9525">
                     <a:solidFill>
                       <a:srgbClr val="000000"/>
                     </a:solidFill>
@@ -11797,7 +11797,7 @@
               </a:ln>
               <a:extLst>
                 <a:ext uri="{91240B29-F687-4f45-9708-019B960494DF}">
-                  <a14:hiddenLine xmlns:a14="http://schemas.microsoft.com/office/drawing/2010/main" xmlns="" w="9525">
+                  <a14:hiddenLine xmlns="" xmlns:a14="http://schemas.microsoft.com/office/drawing/2010/main" w="9525">
                     <a:solidFill>
                       <a:srgbClr val="000000"/>
                     </a:solidFill>
@@ -11865,7 +11865,7 @@
               </a:ln>
               <a:extLst>
                 <a:ext uri="{91240B29-F687-4f45-9708-019B960494DF}">
-                  <a14:hiddenLine xmlns:a14="http://schemas.microsoft.com/office/drawing/2010/main" xmlns="" w="9525">
+                  <a14:hiddenLine xmlns="" xmlns:a14="http://schemas.microsoft.com/office/drawing/2010/main" w="9525">
                     <a:solidFill>
                       <a:srgbClr val="000000"/>
                     </a:solidFill>
@@ -11955,7 +11955,7 @@
               </a:ln>
               <a:extLst>
                 <a:ext uri="{91240B29-F687-4f45-9708-019B960494DF}">
-                  <a14:hiddenLine xmlns:a14="http://schemas.microsoft.com/office/drawing/2010/main" xmlns="" w="9525">
+                  <a14:hiddenLine xmlns="" xmlns:a14="http://schemas.microsoft.com/office/drawing/2010/main" w="9525">
                     <a:solidFill>
                       <a:srgbClr val="000000"/>
                     </a:solidFill>
@@ -11989,7 +11989,7 @@
               </a:ln>
               <a:extLst>
                 <a:ext uri="{91240B29-F687-4f45-9708-019B960494DF}">
-                  <a14:hiddenLine xmlns:a14="http://schemas.microsoft.com/office/drawing/2010/main" xmlns="" w="9525">
+                  <a14:hiddenLine xmlns="" xmlns:a14="http://schemas.microsoft.com/office/drawing/2010/main" w="9525">
                     <a:solidFill>
                       <a:srgbClr val="000000"/>
                     </a:solidFill>
@@ -12129,7 +12129,7 @@
             <a:fld id="{B61BEF0D-F0BB-DE4B-95CE-6DB70DBA9567}" type="datetimeFigureOut">
               <a:rPr lang="en-US" smtClean="0"/>
               <a:pPr/>
-              <a:t>10/10/19</a:t>
+              <a:t>10/14/19</a:t>
             </a:fld>
             <a:endParaRPr lang="en-US" dirty="0"/>
           </a:p>
@@ -15790,7 +15790,7 @@
           <a:noFill/>
           <a:extLst>
             <a:ext uri="{909E8E84-426E-40dd-AFC4-6F175D3DCCD1}">
-              <a14:hiddenFill xmlns="" xmlns:a16="http://schemas.microsoft.com/office/drawing/2014/main" xmlns:p14="http://schemas.microsoft.com/office/powerpoint/2010/main" xmlns:a14="http://schemas.microsoft.com/office/drawing/2010/main">
+              <a14:hiddenFill xmlns:a14="http://schemas.microsoft.com/office/drawing/2010/main" xmlns:p14="http://schemas.microsoft.com/office/powerpoint/2010/main" xmlns:a16="http://schemas.microsoft.com/office/drawing/2014/main" xmlns="">
                 <a:solidFill>
                   <a:srgbClr val="FFFFFF"/>
                 </a:solidFill>
@@ -15872,7 +15872,7 @@
             </a:ln>
             <a:extLst>
               <a:ext uri="{91240B29-F687-4f45-9708-019B960494DF}">
-                <a14:hiddenLine xmlns="" xmlns:a16="http://schemas.microsoft.com/office/drawing/2014/main" xmlns:p14="http://schemas.microsoft.com/office/powerpoint/2010/main" xmlns:a14="http://schemas.microsoft.com/office/drawing/2010/main" w="9525">
+                <a14:hiddenLine xmlns:a14="http://schemas.microsoft.com/office/drawing/2010/main" xmlns:p14="http://schemas.microsoft.com/office/powerpoint/2010/main" xmlns:a16="http://schemas.microsoft.com/office/drawing/2014/main" xmlns="" w="9525">
                   <a:solidFill>
                     <a:srgbClr val="000000"/>
                   </a:solidFill>
@@ -15977,7 +15977,7 @@
             </a:ln>
             <a:extLst>
               <a:ext uri="{91240B29-F687-4f45-9708-019B960494DF}">
-                <a14:hiddenLine xmlns="" xmlns:a16="http://schemas.microsoft.com/office/drawing/2014/main" xmlns:p14="http://schemas.microsoft.com/office/powerpoint/2010/main" xmlns:a14="http://schemas.microsoft.com/office/drawing/2010/main" w="9525">
+                <a14:hiddenLine xmlns:a14="http://schemas.microsoft.com/office/drawing/2010/main" xmlns:p14="http://schemas.microsoft.com/office/powerpoint/2010/main" xmlns:a16="http://schemas.microsoft.com/office/drawing/2014/main" xmlns="" w="9525">
                   <a:solidFill>
                     <a:srgbClr val="000000"/>
                   </a:solidFill>
@@ -16082,7 +16082,7 @@
             </a:ln>
             <a:extLst>
               <a:ext uri="{91240B29-F687-4f45-9708-019B960494DF}">
-                <a14:hiddenLine xmlns="" xmlns:a16="http://schemas.microsoft.com/office/drawing/2014/main" xmlns:p14="http://schemas.microsoft.com/office/powerpoint/2010/main" xmlns:a14="http://schemas.microsoft.com/office/drawing/2010/main" w="9525">
+                <a14:hiddenLine xmlns:a14="http://schemas.microsoft.com/office/drawing/2010/main" xmlns:p14="http://schemas.microsoft.com/office/powerpoint/2010/main" xmlns:a16="http://schemas.microsoft.com/office/drawing/2014/main" xmlns="" w="9525">
                   <a:solidFill>
                     <a:srgbClr val="000000"/>
                   </a:solidFill>
@@ -16159,7 +16159,7 @@
             </a:ln>
             <a:extLst>
               <a:ext uri="{91240B29-F687-4f45-9708-019B960494DF}">
-                <a14:hiddenLine xmlns="" xmlns:a16="http://schemas.microsoft.com/office/drawing/2014/main" xmlns:p14="http://schemas.microsoft.com/office/powerpoint/2010/main" xmlns:a14="http://schemas.microsoft.com/office/drawing/2010/main" w="9525">
+                <a14:hiddenLine xmlns:a14="http://schemas.microsoft.com/office/drawing/2010/main" xmlns:p14="http://schemas.microsoft.com/office/powerpoint/2010/main" xmlns:a16="http://schemas.microsoft.com/office/drawing/2014/main" xmlns="" w="9525">
                   <a:solidFill>
                     <a:srgbClr val="000000"/>
                   </a:solidFill>
@@ -16264,7 +16264,7 @@
             </a:ln>
             <a:extLst>
               <a:ext uri="{91240B29-F687-4f45-9708-019B960494DF}">
-                <a14:hiddenLine xmlns="" xmlns:a16="http://schemas.microsoft.com/office/drawing/2014/main" xmlns:p14="http://schemas.microsoft.com/office/powerpoint/2010/main" xmlns:a14="http://schemas.microsoft.com/office/drawing/2010/main" w="9525">
+                <a14:hiddenLine xmlns:a14="http://schemas.microsoft.com/office/drawing/2010/main" xmlns:p14="http://schemas.microsoft.com/office/powerpoint/2010/main" xmlns:a16="http://schemas.microsoft.com/office/drawing/2014/main" xmlns="" w="9525">
                   <a:solidFill>
                     <a:srgbClr val="000000"/>
                   </a:solidFill>
@@ -16341,7 +16341,7 @@
             </a:ln>
             <a:extLst>
               <a:ext uri="{91240B29-F687-4f45-9708-019B960494DF}">
-                <a14:hiddenLine xmlns="" xmlns:a16="http://schemas.microsoft.com/office/drawing/2014/main" xmlns:p14="http://schemas.microsoft.com/office/powerpoint/2010/main" xmlns:a14="http://schemas.microsoft.com/office/drawing/2010/main" w="9525">
+                <a14:hiddenLine xmlns:a14="http://schemas.microsoft.com/office/drawing/2010/main" xmlns:p14="http://schemas.microsoft.com/office/powerpoint/2010/main" xmlns:a16="http://schemas.microsoft.com/office/drawing/2014/main" xmlns="" w="9525">
                   <a:solidFill>
                     <a:srgbClr val="000000"/>
                   </a:solidFill>
@@ -16418,7 +16418,7 @@
             </a:ln>
             <a:extLst>
               <a:ext uri="{91240B29-F687-4f45-9708-019B960494DF}">
-                <a14:hiddenLine xmlns="" xmlns:a16="http://schemas.microsoft.com/office/drawing/2014/main" xmlns:p14="http://schemas.microsoft.com/office/powerpoint/2010/main" xmlns:a14="http://schemas.microsoft.com/office/drawing/2010/main" w="9525">
+                <a14:hiddenLine xmlns:a14="http://schemas.microsoft.com/office/drawing/2010/main" xmlns:p14="http://schemas.microsoft.com/office/powerpoint/2010/main" xmlns:a16="http://schemas.microsoft.com/office/drawing/2014/main" xmlns="" w="9525">
                   <a:solidFill>
                     <a:srgbClr val="000000"/>
                   </a:solidFill>
@@ -16523,7 +16523,7 @@
             </a:ln>
             <a:extLst>
               <a:ext uri="{91240B29-F687-4f45-9708-019B960494DF}">
-                <a14:hiddenLine xmlns="" xmlns:a16="http://schemas.microsoft.com/office/drawing/2014/main" xmlns:p14="http://schemas.microsoft.com/office/powerpoint/2010/main" xmlns:a14="http://schemas.microsoft.com/office/drawing/2010/main" w="9525">
+                <a14:hiddenLine xmlns:a14="http://schemas.microsoft.com/office/drawing/2010/main" xmlns:p14="http://schemas.microsoft.com/office/powerpoint/2010/main" xmlns:a16="http://schemas.microsoft.com/office/drawing/2014/main" xmlns="" w="9525">
                   <a:solidFill>
                     <a:srgbClr val="000000"/>
                   </a:solidFill>
@@ -16628,7 +16628,7 @@
             </a:ln>
             <a:extLst>
               <a:ext uri="{91240B29-F687-4f45-9708-019B960494DF}">
-                <a14:hiddenLine xmlns="" xmlns:a16="http://schemas.microsoft.com/office/drawing/2014/main" xmlns:p14="http://schemas.microsoft.com/office/powerpoint/2010/main" xmlns:a14="http://schemas.microsoft.com/office/drawing/2010/main" w="9525">
+                <a14:hiddenLine xmlns:a14="http://schemas.microsoft.com/office/drawing/2010/main" xmlns:p14="http://schemas.microsoft.com/office/powerpoint/2010/main" xmlns:a16="http://schemas.microsoft.com/office/drawing/2014/main" xmlns="" w="9525">
                   <a:solidFill>
                     <a:srgbClr val="000000"/>
                   </a:solidFill>
@@ -16705,7 +16705,7 @@
             </a:ln>
             <a:extLst>
               <a:ext uri="{91240B29-F687-4f45-9708-019B960494DF}">
-                <a14:hiddenLine xmlns="" xmlns:a16="http://schemas.microsoft.com/office/drawing/2014/main" xmlns:p14="http://schemas.microsoft.com/office/powerpoint/2010/main" xmlns:a14="http://schemas.microsoft.com/office/drawing/2010/main" w="9525">
+                <a14:hiddenLine xmlns:a14="http://schemas.microsoft.com/office/drawing/2010/main" xmlns:p14="http://schemas.microsoft.com/office/powerpoint/2010/main" xmlns:a16="http://schemas.microsoft.com/office/drawing/2014/main" xmlns="" w="9525">
                   <a:solidFill>
                     <a:srgbClr val="000000"/>
                   </a:solidFill>
@@ -16830,7 +16830,7 @@
             </a:ln>
             <a:extLst>
               <a:ext uri="{91240B29-F687-4f45-9708-019B960494DF}">
-                <a14:hiddenLine xmlns="" xmlns:a16="http://schemas.microsoft.com/office/drawing/2014/main" xmlns:p14="http://schemas.microsoft.com/office/powerpoint/2010/main" xmlns:a14="http://schemas.microsoft.com/office/drawing/2010/main" w="9525">
+                <a14:hiddenLine xmlns:a14="http://schemas.microsoft.com/office/drawing/2010/main" xmlns:p14="http://schemas.microsoft.com/office/powerpoint/2010/main" xmlns:a16="http://schemas.microsoft.com/office/drawing/2014/main" xmlns="" w="9525">
                   <a:solidFill>
                     <a:srgbClr val="000000"/>
                   </a:solidFill>
@@ -16944,7 +16944,7 @@
             </a:ln>
             <a:extLst>
               <a:ext uri="{91240B29-F687-4f45-9708-019B960494DF}">
-                <a14:hiddenLine xmlns="" xmlns:a16="http://schemas.microsoft.com/office/drawing/2014/main" xmlns:p14="http://schemas.microsoft.com/office/powerpoint/2010/main" xmlns:a14="http://schemas.microsoft.com/office/drawing/2010/main" w="9525">
+                <a14:hiddenLine xmlns:a14="http://schemas.microsoft.com/office/drawing/2010/main" xmlns:p14="http://schemas.microsoft.com/office/powerpoint/2010/main" xmlns:a16="http://schemas.microsoft.com/office/drawing/2014/main" xmlns="" w="9525">
                   <a:solidFill>
                     <a:srgbClr val="000000"/>
                   </a:solidFill>
@@ -17021,7 +17021,7 @@
             </a:ln>
             <a:extLst>
               <a:ext uri="{91240B29-F687-4f45-9708-019B960494DF}">
-                <a14:hiddenLine xmlns="" xmlns:a16="http://schemas.microsoft.com/office/drawing/2014/main" xmlns:p14="http://schemas.microsoft.com/office/powerpoint/2010/main" xmlns:a14="http://schemas.microsoft.com/office/drawing/2010/main" w="9525">
+                <a14:hiddenLine xmlns:a14="http://schemas.microsoft.com/office/drawing/2010/main" xmlns:p14="http://schemas.microsoft.com/office/powerpoint/2010/main" xmlns:a16="http://schemas.microsoft.com/office/drawing/2014/main" xmlns="" w="9525">
                   <a:solidFill>
                     <a:srgbClr val="000000"/>
                   </a:solidFill>
@@ -17098,7 +17098,7 @@
             </a:ln>
             <a:extLst>
               <a:ext uri="{91240B29-F687-4f45-9708-019B960494DF}">
-                <a14:hiddenLine xmlns="" xmlns:a16="http://schemas.microsoft.com/office/drawing/2014/main" xmlns:p14="http://schemas.microsoft.com/office/powerpoint/2010/main" xmlns:a14="http://schemas.microsoft.com/office/drawing/2010/main" w="9525">
+                <a14:hiddenLine xmlns:a14="http://schemas.microsoft.com/office/drawing/2010/main" xmlns:p14="http://schemas.microsoft.com/office/powerpoint/2010/main" xmlns:a16="http://schemas.microsoft.com/office/drawing/2014/main" xmlns="" w="9525">
                   <a:solidFill>
                     <a:srgbClr val="000000"/>
                   </a:solidFill>
@@ -17203,7 +17203,7 @@
             </a:ln>
             <a:extLst>
               <a:ext uri="{91240B29-F687-4f45-9708-019B960494DF}">
-                <a14:hiddenLine xmlns="" xmlns:a16="http://schemas.microsoft.com/office/drawing/2014/main" xmlns:p14="http://schemas.microsoft.com/office/powerpoint/2010/main" xmlns:a14="http://schemas.microsoft.com/office/drawing/2010/main" w="9525">
+                <a14:hiddenLine xmlns:a14="http://schemas.microsoft.com/office/drawing/2010/main" xmlns:p14="http://schemas.microsoft.com/office/powerpoint/2010/main" xmlns:a16="http://schemas.microsoft.com/office/drawing/2014/main" xmlns="" w="9525">
                   <a:solidFill>
                     <a:srgbClr val="000000"/>
                   </a:solidFill>
@@ -17252,7 +17252,7 @@
             </a:ln>
             <a:extLst>
               <a:ext uri="{91240B29-F687-4f45-9708-019B960494DF}">
-                <a14:hiddenLine xmlns="" xmlns:a16="http://schemas.microsoft.com/office/drawing/2014/main" xmlns:p14="http://schemas.microsoft.com/office/powerpoint/2010/main" xmlns:a14="http://schemas.microsoft.com/office/drawing/2010/main" w="9525">
+                <a14:hiddenLine xmlns:a14="http://schemas.microsoft.com/office/drawing/2010/main" xmlns:p14="http://schemas.microsoft.com/office/powerpoint/2010/main" xmlns:a16="http://schemas.microsoft.com/office/drawing/2014/main" xmlns="" w="9525">
                   <a:solidFill>
                     <a:srgbClr val="000000"/>
                   </a:solidFill>
@@ -17332,7 +17332,7 @@
             </a:ln>
             <a:extLst>
               <a:ext uri="{91240B29-F687-4f45-9708-019B960494DF}">
-                <a14:hiddenLine xmlns="" xmlns:a16="http://schemas.microsoft.com/office/drawing/2014/main" xmlns:p14="http://schemas.microsoft.com/office/powerpoint/2010/main" xmlns:a14="http://schemas.microsoft.com/office/drawing/2010/main" w="9525">
+                <a14:hiddenLine xmlns:a14="http://schemas.microsoft.com/office/drawing/2010/main" xmlns:p14="http://schemas.microsoft.com/office/powerpoint/2010/main" xmlns:a16="http://schemas.microsoft.com/office/drawing/2014/main" xmlns="" w="9525">
                   <a:solidFill>
                     <a:srgbClr val="000000"/>
                   </a:solidFill>
@@ -17437,7 +17437,7 @@
             </a:ln>
             <a:extLst>
               <a:ext uri="{91240B29-F687-4f45-9708-019B960494DF}">
-                <a14:hiddenLine xmlns="" xmlns:a16="http://schemas.microsoft.com/office/drawing/2014/main" xmlns:p14="http://schemas.microsoft.com/office/powerpoint/2010/main" xmlns:a14="http://schemas.microsoft.com/office/drawing/2010/main" w="9525">
+                <a14:hiddenLine xmlns:a14="http://schemas.microsoft.com/office/drawing/2010/main" xmlns:p14="http://schemas.microsoft.com/office/powerpoint/2010/main" xmlns:a16="http://schemas.microsoft.com/office/drawing/2014/main" xmlns="" w="9525">
                   <a:solidFill>
                     <a:srgbClr val="000000"/>
                   </a:solidFill>
@@ -17514,7 +17514,7 @@
             </a:ln>
             <a:extLst>
               <a:ext uri="{91240B29-F687-4f45-9708-019B960494DF}">
-                <a14:hiddenLine xmlns="" xmlns:a16="http://schemas.microsoft.com/office/drawing/2014/main" xmlns:p14="http://schemas.microsoft.com/office/powerpoint/2010/main" xmlns:a14="http://schemas.microsoft.com/office/drawing/2010/main" w="9525">
+                <a14:hiddenLine xmlns:a14="http://schemas.microsoft.com/office/drawing/2010/main" xmlns:p14="http://schemas.microsoft.com/office/powerpoint/2010/main" xmlns:a16="http://schemas.microsoft.com/office/drawing/2014/main" xmlns="" w="9525">
                   <a:solidFill>
                     <a:srgbClr val="000000"/>
                   </a:solidFill>
@@ -17619,7 +17619,7 @@
             </a:ln>
             <a:extLst>
               <a:ext uri="{91240B29-F687-4f45-9708-019B960494DF}">
-                <a14:hiddenLine xmlns="" xmlns:a16="http://schemas.microsoft.com/office/drawing/2014/main" xmlns:p14="http://schemas.microsoft.com/office/powerpoint/2010/main" xmlns:a14="http://schemas.microsoft.com/office/drawing/2010/main" w="9525">
+                <a14:hiddenLine xmlns:a14="http://schemas.microsoft.com/office/drawing/2010/main" xmlns:p14="http://schemas.microsoft.com/office/powerpoint/2010/main" xmlns:a16="http://schemas.microsoft.com/office/drawing/2014/main" xmlns="" w="9525">
                   <a:solidFill>
                     <a:srgbClr val="000000"/>
                   </a:solidFill>
@@ -17699,7 +17699,7 @@
             </a:ln>
             <a:extLst>
               <a:ext uri="{91240B29-F687-4f45-9708-019B960494DF}">
-                <a14:hiddenLine xmlns="" xmlns:a16="http://schemas.microsoft.com/office/drawing/2014/main" xmlns:p14="http://schemas.microsoft.com/office/powerpoint/2010/main" xmlns:a14="http://schemas.microsoft.com/office/drawing/2010/main" w="9525">
+                <a14:hiddenLine xmlns:a14="http://schemas.microsoft.com/office/drawing/2010/main" xmlns:p14="http://schemas.microsoft.com/office/powerpoint/2010/main" xmlns:a16="http://schemas.microsoft.com/office/drawing/2014/main" xmlns="" w="9525">
                   <a:solidFill>
                     <a:srgbClr val="000000"/>
                   </a:solidFill>
@@ -17776,7 +17776,7 @@
             </a:ln>
             <a:extLst>
               <a:ext uri="{91240B29-F687-4f45-9708-019B960494DF}">
-                <a14:hiddenLine xmlns="" xmlns:a16="http://schemas.microsoft.com/office/drawing/2014/main" xmlns:p14="http://schemas.microsoft.com/office/powerpoint/2010/main" xmlns:a14="http://schemas.microsoft.com/office/drawing/2010/main" w="9525">
+                <a14:hiddenLine xmlns:a14="http://schemas.microsoft.com/office/drawing/2010/main" xmlns:p14="http://schemas.microsoft.com/office/powerpoint/2010/main" xmlns:a16="http://schemas.microsoft.com/office/drawing/2014/main" xmlns="" w="9525">
                   <a:solidFill>
                     <a:srgbClr val="000000"/>
                   </a:solidFill>
@@ -17881,7 +17881,7 @@
             </a:ln>
             <a:extLst>
               <a:ext uri="{91240B29-F687-4f45-9708-019B960494DF}">
-                <a14:hiddenLine xmlns="" xmlns:a16="http://schemas.microsoft.com/office/drawing/2014/main" xmlns:p14="http://schemas.microsoft.com/office/powerpoint/2010/main" xmlns:a14="http://schemas.microsoft.com/office/drawing/2010/main" w="9525">
+                <a14:hiddenLine xmlns:a14="http://schemas.microsoft.com/office/drawing/2010/main" xmlns:p14="http://schemas.microsoft.com/office/powerpoint/2010/main" xmlns:a16="http://schemas.microsoft.com/office/drawing/2014/main" xmlns="" w="9525">
                   <a:solidFill>
                     <a:srgbClr val="000000"/>
                   </a:solidFill>
@@ -17986,7 +17986,7 @@
             </a:ln>
             <a:extLst>
               <a:ext uri="{91240B29-F687-4f45-9708-019B960494DF}">
-                <a14:hiddenLine xmlns="" xmlns:a16="http://schemas.microsoft.com/office/drawing/2014/main" xmlns:p14="http://schemas.microsoft.com/office/powerpoint/2010/main" xmlns:a14="http://schemas.microsoft.com/office/drawing/2010/main" w="9525">
+                <a14:hiddenLine xmlns:a14="http://schemas.microsoft.com/office/drawing/2010/main" xmlns:p14="http://schemas.microsoft.com/office/powerpoint/2010/main" xmlns:a16="http://schemas.microsoft.com/office/drawing/2014/main" xmlns="" w="9525">
                   <a:solidFill>
                     <a:srgbClr val="000000"/>
                   </a:solidFill>
@@ -18066,7 +18066,7 @@
             </a:ln>
             <a:extLst>
               <a:ext uri="{91240B29-F687-4f45-9708-019B960494DF}">
-                <a14:hiddenLine xmlns="" xmlns:a16="http://schemas.microsoft.com/office/drawing/2014/main" xmlns:p14="http://schemas.microsoft.com/office/powerpoint/2010/main" xmlns:a14="http://schemas.microsoft.com/office/drawing/2010/main" w="9525">
+                <a14:hiddenLine xmlns:a14="http://schemas.microsoft.com/office/drawing/2010/main" xmlns:p14="http://schemas.microsoft.com/office/powerpoint/2010/main" xmlns:a16="http://schemas.microsoft.com/office/drawing/2014/main" xmlns="" w="9525">
                   <a:solidFill>
                     <a:srgbClr val="000000"/>
                   </a:solidFill>
@@ -18201,7 +18201,7 @@
             </a:ln>
             <a:extLst>
               <a:ext uri="{91240B29-F687-4f45-9708-019B960494DF}">
-                <a14:hiddenLine xmlns="" xmlns:a16="http://schemas.microsoft.com/office/drawing/2014/main" xmlns:p14="http://schemas.microsoft.com/office/powerpoint/2010/main" xmlns:a14="http://schemas.microsoft.com/office/drawing/2010/main" w="9525">
+                <a14:hiddenLine xmlns:a14="http://schemas.microsoft.com/office/drawing/2010/main" xmlns:p14="http://schemas.microsoft.com/office/powerpoint/2010/main" xmlns:a16="http://schemas.microsoft.com/office/drawing/2014/main" xmlns="" w="9525">
                   <a:solidFill>
                     <a:srgbClr val="000000"/>
                   </a:solidFill>
@@ -18404,7 +18404,7 @@
             </a:ln>
             <a:extLst>
               <a:ext uri="{91240B29-F687-4f45-9708-019B960494DF}">
-                <a14:hiddenLine xmlns="" xmlns:a16="http://schemas.microsoft.com/office/drawing/2014/main" xmlns:p14="http://schemas.microsoft.com/office/powerpoint/2010/main" xmlns:a14="http://schemas.microsoft.com/office/drawing/2010/main" w="9525">
+                <a14:hiddenLine xmlns:a14="http://schemas.microsoft.com/office/drawing/2010/main" xmlns:p14="http://schemas.microsoft.com/office/powerpoint/2010/main" xmlns:a16="http://schemas.microsoft.com/office/drawing/2014/main" xmlns="" w="9525">
                   <a:solidFill>
                     <a:srgbClr val="000000"/>
                   </a:solidFill>
@@ -18534,7 +18534,7 @@
             </a:ln>
             <a:extLst>
               <a:ext uri="{91240B29-F687-4f45-9708-019B960494DF}">
-                <a14:hiddenLine xmlns="" xmlns:a16="http://schemas.microsoft.com/office/drawing/2014/main" xmlns:p14="http://schemas.microsoft.com/office/powerpoint/2010/main" xmlns:a14="http://schemas.microsoft.com/office/drawing/2010/main" w="9525">
+                <a14:hiddenLine xmlns:a14="http://schemas.microsoft.com/office/drawing/2010/main" xmlns:p14="http://schemas.microsoft.com/office/powerpoint/2010/main" xmlns:a16="http://schemas.microsoft.com/office/drawing/2014/main" xmlns="" w="9525">
                   <a:solidFill>
                     <a:srgbClr val="000000"/>
                   </a:solidFill>
@@ -18639,7 +18639,7 @@
             </a:ln>
             <a:extLst>
               <a:ext uri="{91240B29-F687-4f45-9708-019B960494DF}">
-                <a14:hiddenLine xmlns="" xmlns:a16="http://schemas.microsoft.com/office/drawing/2014/main" xmlns:p14="http://schemas.microsoft.com/office/powerpoint/2010/main" xmlns:a14="http://schemas.microsoft.com/office/drawing/2010/main" w="9525">
+                <a14:hiddenLine xmlns:a14="http://schemas.microsoft.com/office/drawing/2010/main" xmlns:p14="http://schemas.microsoft.com/office/powerpoint/2010/main" xmlns:a16="http://schemas.microsoft.com/office/drawing/2014/main" xmlns="" w="9525">
                   <a:solidFill>
                     <a:srgbClr val="000000"/>
                   </a:solidFill>
@@ -18719,7 +18719,7 @@
             </a:ln>
             <a:extLst>
               <a:ext uri="{91240B29-F687-4f45-9708-019B960494DF}">
-                <a14:hiddenLine xmlns="" xmlns:a16="http://schemas.microsoft.com/office/drawing/2014/main" xmlns:p14="http://schemas.microsoft.com/office/powerpoint/2010/main" xmlns:a14="http://schemas.microsoft.com/office/drawing/2010/main" w="9525">
+                <a14:hiddenLine xmlns:a14="http://schemas.microsoft.com/office/drawing/2010/main" xmlns:p14="http://schemas.microsoft.com/office/powerpoint/2010/main" xmlns:a16="http://schemas.microsoft.com/office/drawing/2014/main" xmlns="" w="9525">
                   <a:solidFill>
                     <a:srgbClr val="000000"/>
                   </a:solidFill>
@@ -18824,7 +18824,7 @@
             </a:ln>
             <a:extLst>
               <a:ext uri="{91240B29-F687-4f45-9708-019B960494DF}">
-                <a14:hiddenLine xmlns="" xmlns:a16="http://schemas.microsoft.com/office/drawing/2014/main" xmlns:p14="http://schemas.microsoft.com/office/powerpoint/2010/main" xmlns:a14="http://schemas.microsoft.com/office/drawing/2010/main" w="9525">
+                <a14:hiddenLine xmlns:a14="http://schemas.microsoft.com/office/drawing/2010/main" xmlns:p14="http://schemas.microsoft.com/office/powerpoint/2010/main" xmlns:a16="http://schemas.microsoft.com/office/drawing/2014/main" xmlns="" w="9525">
                   <a:solidFill>
                     <a:srgbClr val="000000"/>
                   </a:solidFill>
@@ -18907,7 +18907,7 @@
             </a:ln>
             <a:extLst>
               <a:ext uri="{91240B29-F687-4f45-9708-019B960494DF}">
-                <a14:hiddenLine xmlns="" xmlns:a16="http://schemas.microsoft.com/office/drawing/2014/main" xmlns:p14="http://schemas.microsoft.com/office/powerpoint/2010/main" xmlns:a14="http://schemas.microsoft.com/office/drawing/2010/main" w="9525">
+                <a14:hiddenLine xmlns:a14="http://schemas.microsoft.com/office/drawing/2010/main" xmlns:p14="http://schemas.microsoft.com/office/powerpoint/2010/main" xmlns:a16="http://schemas.microsoft.com/office/drawing/2014/main" xmlns="" w="9525">
                   <a:solidFill>
                     <a:srgbClr val="000000"/>
                   </a:solidFill>
@@ -19012,7 +19012,7 @@
             </a:ln>
             <a:extLst>
               <a:ext uri="{91240B29-F687-4f45-9708-019B960494DF}">
-                <a14:hiddenLine xmlns="" xmlns:a16="http://schemas.microsoft.com/office/drawing/2014/main" xmlns:p14="http://schemas.microsoft.com/office/powerpoint/2010/main" xmlns:a14="http://schemas.microsoft.com/office/drawing/2010/main" w="9525">
+                <a14:hiddenLine xmlns:a14="http://schemas.microsoft.com/office/drawing/2010/main" xmlns:p14="http://schemas.microsoft.com/office/powerpoint/2010/main" xmlns:a16="http://schemas.microsoft.com/office/drawing/2014/main" xmlns="" w="9525">
                   <a:solidFill>
                     <a:srgbClr val="000000"/>
                   </a:solidFill>
@@ -19095,7 +19095,7 @@
             </a:ln>
             <a:extLst>
               <a:ext uri="{91240B29-F687-4f45-9708-019B960494DF}">
-                <a14:hiddenLine xmlns="" xmlns:a16="http://schemas.microsoft.com/office/drawing/2014/main" xmlns:p14="http://schemas.microsoft.com/office/powerpoint/2010/main" xmlns:a14="http://schemas.microsoft.com/office/drawing/2010/main" w="9525">
+                <a14:hiddenLine xmlns:a14="http://schemas.microsoft.com/office/drawing/2010/main" xmlns:p14="http://schemas.microsoft.com/office/powerpoint/2010/main" xmlns:a16="http://schemas.microsoft.com/office/drawing/2014/main" xmlns="" w="9525">
                   <a:solidFill>
                     <a:srgbClr val="000000"/>
                   </a:solidFill>
@@ -19200,7 +19200,7 @@
             </a:ln>
             <a:extLst>
               <a:ext uri="{91240B29-F687-4f45-9708-019B960494DF}">
-                <a14:hiddenLine xmlns="" xmlns:a16="http://schemas.microsoft.com/office/drawing/2014/main" xmlns:p14="http://schemas.microsoft.com/office/powerpoint/2010/main" xmlns:a14="http://schemas.microsoft.com/office/drawing/2010/main" w="9525">
+                <a14:hiddenLine xmlns:a14="http://schemas.microsoft.com/office/drawing/2010/main" xmlns:p14="http://schemas.microsoft.com/office/powerpoint/2010/main" xmlns:a16="http://schemas.microsoft.com/office/drawing/2014/main" xmlns="" w="9525">
                   <a:solidFill>
                     <a:srgbClr val="000000"/>
                   </a:solidFill>
@@ -19249,7 +19249,7 @@
             </a:ln>
             <a:extLst>
               <a:ext uri="{91240B29-F687-4f45-9708-019B960494DF}">
-                <a14:hiddenLine xmlns="" xmlns:a16="http://schemas.microsoft.com/office/drawing/2014/main" xmlns:p14="http://schemas.microsoft.com/office/powerpoint/2010/main" xmlns:a14="http://schemas.microsoft.com/office/drawing/2010/main" w="9525">
+                <a14:hiddenLine xmlns:a14="http://schemas.microsoft.com/office/drawing/2010/main" xmlns:p14="http://schemas.microsoft.com/office/powerpoint/2010/main" xmlns:a16="http://schemas.microsoft.com/office/drawing/2014/main" xmlns="" w="9525">
                   <a:solidFill>
                     <a:srgbClr val="000000"/>
                   </a:solidFill>
@@ -19339,7 +19339,7 @@
         <p:spPr/>
         <p:txBody>
           <a:bodyPr>
-            <a:normAutofit fontScale="85000" lnSpcReduction="10000"/>
+            <a:normAutofit fontScale="70000" lnSpcReduction="20000"/>
           </a:bodyPr>
           <a:lstStyle/>
           <a:p>
@@ -19372,11 +19372,16 @@
           <a:p>
             <a:r>
               <a:rPr lang="en-US" dirty="0"/>
-              <a:t>Refactor when you add a new feature Refactor when you fix a bug</a:t>
-            </a:r>
-            <a:br>
+              <a:t>Refactor when you add a new feature </a:t>
+            </a:r>
+          </a:p>
+          <a:p>
+            <a:r>
               <a:rPr lang="en-US" dirty="0"/>
-            </a:br>
+              <a:t>Refactor when you fix a bug</a:t>
+            </a:r>
+          </a:p>
+          <a:p>
             <a:r>
               <a:rPr lang="en-US" dirty="0"/>
               <a:t>Refactor when you do a code review </a:t>
@@ -21571,23 +21576,7 @@
           <a:p>
             <a:r>
               <a:rPr lang="en-US" dirty="0"/>
-              <a:t>Over time, we add </a:t>
-            </a:r>
-            <a:r>
-              <a:rPr lang="en-US" dirty="0" err="1"/>
-              <a:t>colours</a:t>
-            </a:r>
-            <a:r>
-              <a:rPr lang="en-US" dirty="0"/>
-              <a:t> to our Shapes, methods for modifying </a:t>
-            </a:r>
-            <a:r>
-              <a:rPr lang="en-US" dirty="0" err="1"/>
-              <a:t>colours</a:t>
-            </a:r>
-            <a:r>
-              <a:rPr lang="en-US" dirty="0"/>
-              <a:t> (increasing transparency, brightness, etc.) </a:t>
+              <a:t>Over time, we add colors to our Shapes, methods for modifying colors (increasing transparency, brightness, etc.) </a:t>
             </a:r>
           </a:p>
           <a:p>
@@ -21605,15 +21594,7 @@
           <a:p>
             <a:r>
               <a:rPr lang="en-US" dirty="0"/>
-              <a:t>Remedy: introduce separate classes to handle </a:t>
-            </a:r>
-            <a:r>
-              <a:rPr lang="en-US" dirty="0" err="1"/>
-              <a:t>colours</a:t>
-            </a:r>
-            <a:r>
-              <a:rPr lang="en-US" dirty="0"/>
-              <a:t> and borders </a:t>
+              <a:t>Remedy: introduce separate classes to handle colors and borders </a:t>
             </a:r>
           </a:p>
           <a:p>
@@ -22647,7 +22628,12 @@
             <p:ph type="title"/>
           </p:nvPr>
         </p:nvSpPr>
-        <p:spPr/>
+        <p:spPr>
+          <a:xfrm>
+            <a:off x="1141413" y="251994"/>
+            <a:ext cx="9905998" cy="1478570"/>
+          </a:xfrm>
+        </p:spPr>
         <p:txBody>
           <a:bodyPr/>
           <a:lstStyle/>
@@ -22677,8 +22663,8 @@
         </p:nvSpPr>
         <p:spPr>
           <a:xfrm>
-            <a:off x="1141412" y="1891862"/>
-            <a:ext cx="9905999" cy="4214647"/>
+            <a:off x="1141413" y="1383168"/>
+            <a:ext cx="9905999" cy="5222838"/>
           </a:xfrm>
         </p:spPr>
         <p:txBody>
@@ -22693,15 +22679,19 @@
             </a:r>
           </a:p>
           <a:p>
-            <a:pPr lvl="1"/>
-            <a:r>
-              <a:rPr lang="en-US" dirty="0" err="1"/>
-              <a:t>SystemControllerHandlerFactoryComponent</a:t>
-            </a:r>
-            <a:r>
-              <a:rPr lang="en-US" dirty="0"/>
-              <a:t> </a:t>
-            </a:r>
+            <a:pPr marL="0" indent="0">
+              <a:buNone/>
+            </a:pPr>
+            <a:endParaRPr lang="en-US" dirty="0"/>
+          </a:p>
+          <a:p>
+            <a:pPr marL="0" indent="0">
+              <a:buNone/>
+            </a:pPr>
+            <a:endParaRPr lang="en-US" dirty="0"/>
+          </a:p>
+          <a:p>
+            <a:endParaRPr lang="en-US" dirty="0"/>
           </a:p>
           <a:p>
             <a:r>
@@ -22764,6 +22754,36 @@
           </a:p>
         </p:txBody>
       </p:sp>
+      <p:pic>
+        <p:nvPicPr>
+          <p:cNvPr id="4" name="Picture 3">
+            <a:extLst>
+              <a:ext uri="{FF2B5EF4-FFF2-40B4-BE49-F238E27FC236}">
+                <a16:creationId xmlns:a16="http://schemas.microsoft.com/office/drawing/2014/main" id="{9E79E2E1-0B4C-9D40-BA90-858413AE3814}"/>
+              </a:ext>
+            </a:extLst>
+          </p:cNvPr>
+          <p:cNvPicPr>
+            <a:picLocks noChangeAspect="1"/>
+          </p:cNvPicPr>
+          <p:nvPr/>
+        </p:nvPicPr>
+        <p:blipFill>
+          <a:blip r:embed="rId2"/>
+          <a:stretch>
+            <a:fillRect/>
+          </a:stretch>
+        </p:blipFill>
+        <p:spPr>
+          <a:xfrm>
+            <a:off x="1442583" y="2333188"/>
+            <a:ext cx="9303657" cy="1406600"/>
+          </a:xfrm>
+          <a:prstGeom prst="rect">
+            <a:avLst/>
+          </a:prstGeom>
+        </p:spPr>
+      </p:pic>
     </p:spTree>
     <p:extLst>
       <p:ext uri="{BB962C8B-B14F-4D97-AF65-F5344CB8AC3E}">
@@ -22953,7 +22973,7 @@
             </a:ln>
             <a:extLst>
               <a:ext uri="{91240B29-F687-4f45-9708-019B960494DF}">
-                <a14:hiddenLine xmlns="" xmlns:a16="http://schemas.microsoft.com/office/drawing/2014/main" xmlns:p14="http://schemas.microsoft.com/office/powerpoint/2010/main" xmlns:a14="http://schemas.microsoft.com/office/drawing/2010/main" w="9525">
+                <a14:hiddenLine xmlns:a14="http://schemas.microsoft.com/office/drawing/2010/main" xmlns:p14="http://schemas.microsoft.com/office/powerpoint/2010/main" xmlns:a16="http://schemas.microsoft.com/office/drawing/2014/main" xmlns="" w="9525">
                   <a:solidFill>
                     <a:srgbClr val="000000"/>
                   </a:solidFill>
@@ -23058,7 +23078,7 @@
             </a:ln>
             <a:extLst>
               <a:ext uri="{91240B29-F687-4f45-9708-019B960494DF}">
-                <a14:hiddenLine xmlns="" xmlns:a16="http://schemas.microsoft.com/office/drawing/2014/main" xmlns:p14="http://schemas.microsoft.com/office/powerpoint/2010/main" xmlns:a14="http://schemas.microsoft.com/office/drawing/2010/main" w="9525">
+                <a14:hiddenLine xmlns:a14="http://schemas.microsoft.com/office/drawing/2010/main" xmlns:p14="http://schemas.microsoft.com/office/powerpoint/2010/main" xmlns:a16="http://schemas.microsoft.com/office/drawing/2014/main" xmlns="" w="9525">
                   <a:solidFill>
                     <a:srgbClr val="000000"/>
                   </a:solidFill>
@@ -23163,7 +23183,7 @@
             </a:ln>
             <a:extLst>
               <a:ext uri="{91240B29-F687-4f45-9708-019B960494DF}">
-                <a14:hiddenLine xmlns="" xmlns:a16="http://schemas.microsoft.com/office/drawing/2014/main" xmlns:p14="http://schemas.microsoft.com/office/powerpoint/2010/main" xmlns:a14="http://schemas.microsoft.com/office/drawing/2010/main" w="9525">
+                <a14:hiddenLine xmlns:a14="http://schemas.microsoft.com/office/drawing/2010/main" xmlns:p14="http://schemas.microsoft.com/office/powerpoint/2010/main" xmlns:a16="http://schemas.microsoft.com/office/drawing/2014/main" xmlns="" w="9525">
                   <a:solidFill>
                     <a:srgbClr val="000000"/>
                   </a:solidFill>
@@ -23240,7 +23260,7 @@
             </a:ln>
             <a:extLst>
               <a:ext uri="{91240B29-F687-4f45-9708-019B960494DF}">
-                <a14:hiddenLine xmlns="" xmlns:a16="http://schemas.microsoft.com/office/drawing/2014/main" xmlns:p14="http://schemas.microsoft.com/office/powerpoint/2010/main" xmlns:a14="http://schemas.microsoft.com/office/drawing/2010/main" w="9525">
+                <a14:hiddenLine xmlns:a14="http://schemas.microsoft.com/office/drawing/2010/main" xmlns:p14="http://schemas.microsoft.com/office/powerpoint/2010/main" xmlns:a16="http://schemas.microsoft.com/office/drawing/2014/main" xmlns="" w="9525">
                   <a:solidFill>
                     <a:srgbClr val="000000"/>
                   </a:solidFill>
@@ -23345,7 +23365,7 @@
             </a:ln>
             <a:extLst>
               <a:ext uri="{91240B29-F687-4f45-9708-019B960494DF}">
-                <a14:hiddenLine xmlns="" xmlns:a16="http://schemas.microsoft.com/office/drawing/2014/main" xmlns:p14="http://schemas.microsoft.com/office/powerpoint/2010/main" xmlns:a14="http://schemas.microsoft.com/office/drawing/2010/main" w="9525">
+                <a14:hiddenLine xmlns:a14="http://schemas.microsoft.com/office/drawing/2010/main" xmlns:p14="http://schemas.microsoft.com/office/powerpoint/2010/main" xmlns:a16="http://schemas.microsoft.com/office/drawing/2014/main" xmlns="" w="9525">
                   <a:solidFill>
                     <a:srgbClr val="000000"/>
                   </a:solidFill>
@@ -23422,7 +23442,7 @@
             </a:ln>
             <a:extLst>
               <a:ext uri="{91240B29-F687-4f45-9708-019B960494DF}">
-                <a14:hiddenLine xmlns="" xmlns:a16="http://schemas.microsoft.com/office/drawing/2014/main" xmlns:p14="http://schemas.microsoft.com/office/powerpoint/2010/main" xmlns:a14="http://schemas.microsoft.com/office/drawing/2010/main" w="9525">
+                <a14:hiddenLine xmlns:a14="http://schemas.microsoft.com/office/drawing/2010/main" xmlns:p14="http://schemas.microsoft.com/office/powerpoint/2010/main" xmlns:a16="http://schemas.microsoft.com/office/drawing/2014/main" xmlns="" w="9525">
                   <a:solidFill>
                     <a:srgbClr val="000000"/>
                   </a:solidFill>
@@ -23499,7 +23519,7 @@
             </a:ln>
             <a:extLst>
               <a:ext uri="{91240B29-F687-4f45-9708-019B960494DF}">
-                <a14:hiddenLine xmlns="" xmlns:a16="http://schemas.microsoft.com/office/drawing/2014/main" xmlns:p14="http://schemas.microsoft.com/office/powerpoint/2010/main" xmlns:a14="http://schemas.microsoft.com/office/drawing/2010/main" w="9525">
+                <a14:hiddenLine xmlns:a14="http://schemas.microsoft.com/office/drawing/2010/main" xmlns:p14="http://schemas.microsoft.com/office/powerpoint/2010/main" xmlns:a16="http://schemas.microsoft.com/office/drawing/2014/main" xmlns="" w="9525">
                   <a:solidFill>
                     <a:srgbClr val="000000"/>
                   </a:solidFill>
@@ -23604,7 +23624,7 @@
             </a:ln>
             <a:extLst>
               <a:ext uri="{91240B29-F687-4f45-9708-019B960494DF}">
-                <a14:hiddenLine xmlns="" xmlns:a16="http://schemas.microsoft.com/office/drawing/2014/main" xmlns:p14="http://schemas.microsoft.com/office/powerpoint/2010/main" xmlns:a14="http://schemas.microsoft.com/office/drawing/2010/main" w="9525">
+                <a14:hiddenLine xmlns:a14="http://schemas.microsoft.com/office/drawing/2010/main" xmlns:p14="http://schemas.microsoft.com/office/powerpoint/2010/main" xmlns:a16="http://schemas.microsoft.com/office/drawing/2014/main" xmlns="" w="9525">
                   <a:solidFill>
                     <a:srgbClr val="000000"/>
                   </a:solidFill>
@@ -23709,7 +23729,7 @@
             </a:ln>
             <a:extLst>
               <a:ext uri="{91240B29-F687-4f45-9708-019B960494DF}">
-                <a14:hiddenLine xmlns="" xmlns:a16="http://schemas.microsoft.com/office/drawing/2014/main" xmlns:p14="http://schemas.microsoft.com/office/powerpoint/2010/main" xmlns:a14="http://schemas.microsoft.com/office/drawing/2010/main" w="9525">
+                <a14:hiddenLine xmlns:a14="http://schemas.microsoft.com/office/drawing/2010/main" xmlns:p14="http://schemas.microsoft.com/office/powerpoint/2010/main" xmlns:a16="http://schemas.microsoft.com/office/drawing/2014/main" xmlns="" w="9525">
                   <a:solidFill>
                     <a:srgbClr val="000000"/>
                   </a:solidFill>
@@ -23786,7 +23806,7 @@
             </a:ln>
             <a:extLst>
               <a:ext uri="{91240B29-F687-4f45-9708-019B960494DF}">
-                <a14:hiddenLine xmlns="" xmlns:a16="http://schemas.microsoft.com/office/drawing/2014/main" xmlns:p14="http://schemas.microsoft.com/office/powerpoint/2010/main" xmlns:a14="http://schemas.microsoft.com/office/drawing/2010/main" w="9525">
+                <a14:hiddenLine xmlns:a14="http://schemas.microsoft.com/office/drawing/2010/main" xmlns:p14="http://schemas.microsoft.com/office/powerpoint/2010/main" xmlns:a16="http://schemas.microsoft.com/office/drawing/2014/main" xmlns="" w="9525">
                   <a:solidFill>
                     <a:srgbClr val="000000"/>
                   </a:solidFill>
@@ -23911,7 +23931,7 @@
             </a:ln>
             <a:extLst>
               <a:ext uri="{91240B29-F687-4f45-9708-019B960494DF}">
-                <a14:hiddenLine xmlns="" xmlns:a16="http://schemas.microsoft.com/office/drawing/2014/main" xmlns:p14="http://schemas.microsoft.com/office/powerpoint/2010/main" xmlns:a14="http://schemas.microsoft.com/office/drawing/2010/main" w="9525">
+                <a14:hiddenLine xmlns:a14="http://schemas.microsoft.com/office/drawing/2010/main" xmlns:p14="http://schemas.microsoft.com/office/powerpoint/2010/main" xmlns:a16="http://schemas.microsoft.com/office/drawing/2014/main" xmlns="" w="9525">
                   <a:solidFill>
                     <a:srgbClr val="000000"/>
                   </a:solidFill>
@@ -24025,7 +24045,7 @@
             </a:ln>
             <a:extLst>
               <a:ext uri="{91240B29-F687-4f45-9708-019B960494DF}">
-                <a14:hiddenLine xmlns="" xmlns:a16="http://schemas.microsoft.com/office/drawing/2014/main" xmlns:p14="http://schemas.microsoft.com/office/powerpoint/2010/main" xmlns:a14="http://schemas.microsoft.com/office/drawing/2010/main" w="9525">
+                <a14:hiddenLine xmlns:a14="http://schemas.microsoft.com/office/drawing/2010/main" xmlns:p14="http://schemas.microsoft.com/office/powerpoint/2010/main" xmlns:a16="http://schemas.microsoft.com/office/drawing/2014/main" xmlns="" w="9525">
                   <a:solidFill>
                     <a:srgbClr val="000000"/>
                   </a:solidFill>
@@ -24102,7 +24122,7 @@
             </a:ln>
             <a:extLst>
               <a:ext uri="{91240B29-F687-4f45-9708-019B960494DF}">
-                <a14:hiddenLine xmlns="" xmlns:a16="http://schemas.microsoft.com/office/drawing/2014/main" xmlns:p14="http://schemas.microsoft.com/office/powerpoint/2010/main" xmlns:a14="http://schemas.microsoft.com/office/drawing/2010/main" w="9525">
+                <a14:hiddenLine xmlns:a14="http://schemas.microsoft.com/office/drawing/2010/main" xmlns:p14="http://schemas.microsoft.com/office/powerpoint/2010/main" xmlns:a16="http://schemas.microsoft.com/office/drawing/2014/main" xmlns="" w="9525">
                   <a:solidFill>
                     <a:srgbClr val="000000"/>
                   </a:solidFill>
@@ -24179,7 +24199,7 @@
             </a:ln>
             <a:extLst>
               <a:ext uri="{91240B29-F687-4f45-9708-019B960494DF}">
-                <a14:hiddenLine xmlns="" xmlns:a16="http://schemas.microsoft.com/office/drawing/2014/main" xmlns:p14="http://schemas.microsoft.com/office/powerpoint/2010/main" xmlns:a14="http://schemas.microsoft.com/office/drawing/2010/main" w="9525">
+                <a14:hiddenLine xmlns:a14="http://schemas.microsoft.com/office/drawing/2010/main" xmlns:p14="http://schemas.microsoft.com/office/powerpoint/2010/main" xmlns:a16="http://schemas.microsoft.com/office/drawing/2014/main" xmlns="" w="9525">
                   <a:solidFill>
                     <a:srgbClr val="000000"/>
                   </a:solidFill>
@@ -24284,7 +24304,7 @@
             </a:ln>
             <a:extLst>
               <a:ext uri="{91240B29-F687-4f45-9708-019B960494DF}">
-                <a14:hiddenLine xmlns="" xmlns:a16="http://schemas.microsoft.com/office/drawing/2014/main" xmlns:p14="http://schemas.microsoft.com/office/powerpoint/2010/main" xmlns:a14="http://schemas.microsoft.com/office/drawing/2010/main" w="9525">
+                <a14:hiddenLine xmlns:a14="http://schemas.microsoft.com/office/drawing/2010/main" xmlns:p14="http://schemas.microsoft.com/office/powerpoint/2010/main" xmlns:a16="http://schemas.microsoft.com/office/drawing/2014/main" xmlns="" w="9525">
                   <a:solidFill>
                     <a:srgbClr val="000000"/>
                   </a:solidFill>
@@ -24333,7 +24353,7 @@
             </a:ln>
             <a:extLst>
               <a:ext uri="{91240B29-F687-4f45-9708-019B960494DF}">
-                <a14:hiddenLine xmlns="" xmlns:a16="http://schemas.microsoft.com/office/drawing/2014/main" xmlns:p14="http://schemas.microsoft.com/office/powerpoint/2010/main" xmlns:a14="http://schemas.microsoft.com/office/drawing/2010/main" w="9525">
+                <a14:hiddenLine xmlns:a14="http://schemas.microsoft.com/office/drawing/2010/main" xmlns:p14="http://schemas.microsoft.com/office/powerpoint/2010/main" xmlns:a16="http://schemas.microsoft.com/office/drawing/2014/main" xmlns="" w="9525">
                   <a:solidFill>
                     <a:srgbClr val="000000"/>
                   </a:solidFill>
@@ -24413,7 +24433,7 @@
             </a:ln>
             <a:extLst>
               <a:ext uri="{91240B29-F687-4f45-9708-019B960494DF}">
-                <a14:hiddenLine xmlns="" xmlns:a16="http://schemas.microsoft.com/office/drawing/2014/main" xmlns:p14="http://schemas.microsoft.com/office/powerpoint/2010/main" xmlns:a14="http://schemas.microsoft.com/office/drawing/2010/main" w="9525">
+                <a14:hiddenLine xmlns:a14="http://schemas.microsoft.com/office/drawing/2010/main" xmlns:p14="http://schemas.microsoft.com/office/powerpoint/2010/main" xmlns:a16="http://schemas.microsoft.com/office/drawing/2014/main" xmlns="" w="9525">
                   <a:solidFill>
                     <a:srgbClr val="000000"/>
                   </a:solidFill>
@@ -24518,7 +24538,7 @@
             </a:ln>
             <a:extLst>
               <a:ext uri="{91240B29-F687-4f45-9708-019B960494DF}">
-                <a14:hiddenLine xmlns="" xmlns:a16="http://schemas.microsoft.com/office/drawing/2014/main" xmlns:p14="http://schemas.microsoft.com/office/powerpoint/2010/main" xmlns:a14="http://schemas.microsoft.com/office/drawing/2010/main" w="9525">
+                <a14:hiddenLine xmlns:a14="http://schemas.microsoft.com/office/drawing/2010/main" xmlns:p14="http://schemas.microsoft.com/office/powerpoint/2010/main" xmlns:a16="http://schemas.microsoft.com/office/drawing/2014/main" xmlns="" w="9525">
                   <a:solidFill>
                     <a:srgbClr val="000000"/>
                   </a:solidFill>
@@ -24595,7 +24615,7 @@
             </a:ln>
             <a:extLst>
               <a:ext uri="{91240B29-F687-4f45-9708-019B960494DF}">
-                <a14:hiddenLine xmlns="" xmlns:a16="http://schemas.microsoft.com/office/drawing/2014/main" xmlns:p14="http://schemas.microsoft.com/office/powerpoint/2010/main" xmlns:a14="http://schemas.microsoft.com/office/drawing/2010/main" w="9525">
+                <a14:hiddenLine xmlns:a14="http://schemas.microsoft.com/office/drawing/2010/main" xmlns:p14="http://schemas.microsoft.com/office/powerpoint/2010/main" xmlns:a16="http://schemas.microsoft.com/office/drawing/2014/main" xmlns="" w="9525">
                   <a:solidFill>
                     <a:srgbClr val="000000"/>
                   </a:solidFill>
@@ -24700,7 +24720,7 @@
             </a:ln>
             <a:extLst>
               <a:ext uri="{91240B29-F687-4f45-9708-019B960494DF}">
-                <a14:hiddenLine xmlns="" xmlns:a16="http://schemas.microsoft.com/office/drawing/2014/main" xmlns:p14="http://schemas.microsoft.com/office/powerpoint/2010/main" xmlns:a14="http://schemas.microsoft.com/office/drawing/2010/main" w="9525">
+                <a14:hiddenLine xmlns:a14="http://schemas.microsoft.com/office/drawing/2010/main" xmlns:p14="http://schemas.microsoft.com/office/powerpoint/2010/main" xmlns:a16="http://schemas.microsoft.com/office/drawing/2014/main" xmlns="" w="9525">
                   <a:solidFill>
                     <a:srgbClr val="000000"/>
                   </a:solidFill>
@@ -24780,7 +24800,7 @@
             </a:ln>
             <a:extLst>
               <a:ext uri="{91240B29-F687-4f45-9708-019B960494DF}">
-                <a14:hiddenLine xmlns="" xmlns:a16="http://schemas.microsoft.com/office/drawing/2014/main" xmlns:p14="http://schemas.microsoft.com/office/powerpoint/2010/main" xmlns:a14="http://schemas.microsoft.com/office/drawing/2010/main" w="9525">
+                <a14:hiddenLine xmlns:a14="http://schemas.microsoft.com/office/drawing/2010/main" xmlns:p14="http://schemas.microsoft.com/office/powerpoint/2010/main" xmlns:a16="http://schemas.microsoft.com/office/drawing/2014/main" xmlns="" w="9525">
                   <a:solidFill>
                     <a:srgbClr val="000000"/>
                   </a:solidFill>
@@ -24857,7 +24877,7 @@
             </a:ln>
             <a:extLst>
               <a:ext uri="{91240B29-F687-4f45-9708-019B960494DF}">
-                <a14:hiddenLine xmlns="" xmlns:a16="http://schemas.microsoft.com/office/drawing/2014/main" xmlns:p14="http://schemas.microsoft.com/office/powerpoint/2010/main" xmlns:a14="http://schemas.microsoft.com/office/drawing/2010/main" w="9525">
+                <a14:hiddenLine xmlns:a14="http://schemas.microsoft.com/office/drawing/2010/main" xmlns:p14="http://schemas.microsoft.com/office/powerpoint/2010/main" xmlns:a16="http://schemas.microsoft.com/office/drawing/2014/main" xmlns="" w="9525">
                   <a:solidFill>
                     <a:srgbClr val="000000"/>
                   </a:solidFill>
@@ -24962,7 +24982,7 @@
             </a:ln>
             <a:extLst>
               <a:ext uri="{91240B29-F687-4f45-9708-019B960494DF}">
-                <a14:hiddenLine xmlns="" xmlns:a16="http://schemas.microsoft.com/office/drawing/2014/main" xmlns:p14="http://schemas.microsoft.com/office/powerpoint/2010/main" xmlns:a14="http://schemas.microsoft.com/office/drawing/2010/main" w="9525">
+                <a14:hiddenLine xmlns:a14="http://schemas.microsoft.com/office/drawing/2010/main" xmlns:p14="http://schemas.microsoft.com/office/powerpoint/2010/main" xmlns:a16="http://schemas.microsoft.com/office/drawing/2014/main" xmlns="" w="9525">
                   <a:solidFill>
                     <a:srgbClr val="000000"/>
                   </a:solidFill>
@@ -25067,7 +25087,7 @@
             </a:ln>
             <a:extLst>
               <a:ext uri="{91240B29-F687-4f45-9708-019B960494DF}">
-                <a14:hiddenLine xmlns="" xmlns:a16="http://schemas.microsoft.com/office/drawing/2014/main" xmlns:p14="http://schemas.microsoft.com/office/powerpoint/2010/main" xmlns:a14="http://schemas.microsoft.com/office/drawing/2010/main" w="9525">
+                <a14:hiddenLine xmlns:a14="http://schemas.microsoft.com/office/drawing/2010/main" xmlns:p14="http://schemas.microsoft.com/office/powerpoint/2010/main" xmlns:a16="http://schemas.microsoft.com/office/drawing/2014/main" xmlns="" w="9525">
                   <a:solidFill>
                     <a:srgbClr val="000000"/>
                   </a:solidFill>
@@ -25147,7 +25167,7 @@
             </a:ln>
             <a:extLst>
               <a:ext uri="{91240B29-F687-4f45-9708-019B960494DF}">
-                <a14:hiddenLine xmlns="" xmlns:a16="http://schemas.microsoft.com/office/drawing/2014/main" xmlns:p14="http://schemas.microsoft.com/office/powerpoint/2010/main" xmlns:a14="http://schemas.microsoft.com/office/drawing/2010/main" w="9525">
+                <a14:hiddenLine xmlns:a14="http://schemas.microsoft.com/office/drawing/2010/main" xmlns:p14="http://schemas.microsoft.com/office/powerpoint/2010/main" xmlns:a16="http://schemas.microsoft.com/office/drawing/2014/main" xmlns="" w="9525">
                   <a:solidFill>
                     <a:srgbClr val="000000"/>
                   </a:solidFill>
@@ -25282,7 +25302,7 @@
             </a:ln>
             <a:extLst>
               <a:ext uri="{91240B29-F687-4f45-9708-019B960494DF}">
-                <a14:hiddenLine xmlns="" xmlns:a16="http://schemas.microsoft.com/office/drawing/2014/main" xmlns:p14="http://schemas.microsoft.com/office/powerpoint/2010/main" xmlns:a14="http://schemas.microsoft.com/office/drawing/2010/main" w="9525">
+                <a14:hiddenLine xmlns:a14="http://schemas.microsoft.com/office/drawing/2010/main" xmlns:p14="http://schemas.microsoft.com/office/powerpoint/2010/main" xmlns:a16="http://schemas.microsoft.com/office/drawing/2014/main" xmlns="" w="9525">
                   <a:solidFill>
                     <a:srgbClr val="000000"/>
                   </a:solidFill>
@@ -25596,7 +25616,7 @@
             </a:ln>
             <a:extLst>
               <a:ext uri="{91240B29-F687-4f45-9708-019B960494DF}">
-                <a14:hiddenLine xmlns="" xmlns:a16="http://schemas.microsoft.com/office/drawing/2014/main" xmlns:p14="http://schemas.microsoft.com/office/powerpoint/2010/main" xmlns:a14="http://schemas.microsoft.com/office/drawing/2010/main" w="9525">
+                <a14:hiddenLine xmlns:a14="http://schemas.microsoft.com/office/drawing/2010/main" xmlns:p14="http://schemas.microsoft.com/office/powerpoint/2010/main" xmlns:a16="http://schemas.microsoft.com/office/drawing/2014/main" xmlns="" w="9525">
                   <a:solidFill>
                     <a:srgbClr val="000000"/>
                   </a:solidFill>
@@ -25726,7 +25746,7 @@
             </a:ln>
             <a:extLst>
               <a:ext uri="{91240B29-F687-4f45-9708-019B960494DF}">
-                <a14:hiddenLine xmlns="" xmlns:a16="http://schemas.microsoft.com/office/drawing/2014/main" xmlns:p14="http://schemas.microsoft.com/office/powerpoint/2010/main" xmlns:a14="http://schemas.microsoft.com/office/drawing/2010/main" w="9525">
+                <a14:hiddenLine xmlns:a14="http://schemas.microsoft.com/office/drawing/2010/main" xmlns:p14="http://schemas.microsoft.com/office/powerpoint/2010/main" xmlns:a16="http://schemas.microsoft.com/office/drawing/2014/main" xmlns="" w="9525">
                   <a:solidFill>
                     <a:srgbClr val="000000"/>
                   </a:solidFill>
@@ -25831,7 +25851,7 @@
             </a:ln>
             <a:extLst>
               <a:ext uri="{91240B29-F687-4f45-9708-019B960494DF}">
-                <a14:hiddenLine xmlns="" xmlns:a16="http://schemas.microsoft.com/office/drawing/2014/main" xmlns:p14="http://schemas.microsoft.com/office/powerpoint/2010/main" xmlns:a14="http://schemas.microsoft.com/office/drawing/2010/main" w="9525">
+                <a14:hiddenLine xmlns:a14="http://schemas.microsoft.com/office/drawing/2010/main" xmlns:p14="http://schemas.microsoft.com/office/powerpoint/2010/main" xmlns:a16="http://schemas.microsoft.com/office/drawing/2014/main" xmlns="" w="9525">
                   <a:solidFill>
                     <a:srgbClr val="000000"/>
                   </a:solidFill>
@@ -25911,7 +25931,7 @@
             </a:ln>
             <a:extLst>
               <a:ext uri="{91240B29-F687-4f45-9708-019B960494DF}">
-                <a14:hiddenLine xmlns="" xmlns:a16="http://schemas.microsoft.com/office/drawing/2014/main" xmlns:p14="http://schemas.microsoft.com/office/powerpoint/2010/main" xmlns:a14="http://schemas.microsoft.com/office/drawing/2010/main" w="9525">
+                <a14:hiddenLine xmlns:a14="http://schemas.microsoft.com/office/drawing/2010/main" xmlns:p14="http://schemas.microsoft.com/office/powerpoint/2010/main" xmlns:a16="http://schemas.microsoft.com/office/drawing/2014/main" xmlns="" w="9525">
                   <a:solidFill>
                     <a:srgbClr val="000000"/>
                   </a:solidFill>
@@ -26016,7 +26036,7 @@
             </a:ln>
             <a:extLst>
               <a:ext uri="{91240B29-F687-4f45-9708-019B960494DF}">
-                <a14:hiddenLine xmlns="" xmlns:a16="http://schemas.microsoft.com/office/drawing/2014/main" xmlns:p14="http://schemas.microsoft.com/office/powerpoint/2010/main" xmlns:a14="http://schemas.microsoft.com/office/drawing/2010/main" w="9525">
+                <a14:hiddenLine xmlns:a14="http://schemas.microsoft.com/office/drawing/2010/main" xmlns:p14="http://schemas.microsoft.com/office/powerpoint/2010/main" xmlns:a16="http://schemas.microsoft.com/office/drawing/2014/main" xmlns="" w="9525">
                   <a:solidFill>
                     <a:srgbClr val="000000"/>
                   </a:solidFill>
@@ -26099,7 +26119,7 @@
             </a:ln>
             <a:extLst>
               <a:ext uri="{91240B29-F687-4f45-9708-019B960494DF}">
-                <a14:hiddenLine xmlns="" xmlns:a16="http://schemas.microsoft.com/office/drawing/2014/main" xmlns:p14="http://schemas.microsoft.com/office/powerpoint/2010/main" xmlns:a14="http://schemas.microsoft.com/office/drawing/2010/main" w="9525">
+                <a14:hiddenLine xmlns:a14="http://schemas.microsoft.com/office/drawing/2010/main" xmlns:p14="http://schemas.microsoft.com/office/powerpoint/2010/main" xmlns:a16="http://schemas.microsoft.com/office/drawing/2014/main" xmlns="" w="9525">
                   <a:solidFill>
                     <a:srgbClr val="000000"/>
                   </a:solidFill>
@@ -26204,7 +26224,7 @@
             </a:ln>
             <a:extLst>
               <a:ext uri="{91240B29-F687-4f45-9708-019B960494DF}">
-                <a14:hiddenLine xmlns="" xmlns:a16="http://schemas.microsoft.com/office/drawing/2014/main" xmlns:p14="http://schemas.microsoft.com/office/powerpoint/2010/main" xmlns:a14="http://schemas.microsoft.com/office/drawing/2010/main" w="9525">
+                <a14:hiddenLine xmlns:a14="http://schemas.microsoft.com/office/drawing/2010/main" xmlns:p14="http://schemas.microsoft.com/office/powerpoint/2010/main" xmlns:a16="http://schemas.microsoft.com/office/drawing/2014/main" xmlns="" w="9525">
                   <a:solidFill>
                     <a:srgbClr val="000000"/>
                   </a:solidFill>
@@ -26287,7 +26307,7 @@
             </a:ln>
             <a:extLst>
               <a:ext uri="{91240B29-F687-4f45-9708-019B960494DF}">
-                <a14:hiddenLine xmlns="" xmlns:a16="http://schemas.microsoft.com/office/drawing/2014/main" xmlns:p14="http://schemas.microsoft.com/office/powerpoint/2010/main" xmlns:a14="http://schemas.microsoft.com/office/drawing/2010/main" w="9525">
+                <a14:hiddenLine xmlns:a14="http://schemas.microsoft.com/office/drawing/2010/main" xmlns:p14="http://schemas.microsoft.com/office/powerpoint/2010/main" xmlns:a16="http://schemas.microsoft.com/office/drawing/2014/main" xmlns="" w="9525">
                   <a:solidFill>
                     <a:srgbClr val="000000"/>
                   </a:solidFill>
@@ -26392,7 +26412,7 @@
             </a:ln>
             <a:extLst>
               <a:ext uri="{91240B29-F687-4f45-9708-019B960494DF}">
-                <a14:hiddenLine xmlns="" xmlns:a16="http://schemas.microsoft.com/office/drawing/2014/main" xmlns:p14="http://schemas.microsoft.com/office/powerpoint/2010/main" xmlns:a14="http://schemas.microsoft.com/office/drawing/2010/main" w="9525">
+                <a14:hiddenLine xmlns:a14="http://schemas.microsoft.com/office/drawing/2010/main" xmlns:p14="http://schemas.microsoft.com/office/powerpoint/2010/main" xmlns:a16="http://schemas.microsoft.com/office/drawing/2014/main" xmlns="" w="9525">
                   <a:solidFill>
                     <a:srgbClr val="000000"/>
                   </a:solidFill>
@@ -26441,7 +26461,7 @@
             </a:ln>
             <a:extLst>
               <a:ext uri="{91240B29-F687-4f45-9708-019B960494DF}">
-                <a14:hiddenLine xmlns="" xmlns:a16="http://schemas.microsoft.com/office/drawing/2014/main" xmlns:p14="http://schemas.microsoft.com/office/powerpoint/2010/main" xmlns:a14="http://schemas.microsoft.com/office/drawing/2010/main" w="9525">
+                <a14:hiddenLine xmlns:a14="http://schemas.microsoft.com/office/drawing/2010/main" xmlns:p14="http://schemas.microsoft.com/office/powerpoint/2010/main" xmlns:a16="http://schemas.microsoft.com/office/drawing/2014/main" xmlns="" w="9525">
                   <a:solidFill>
                     <a:srgbClr val="000000"/>
                   </a:solidFill>
@@ -29801,7 +29821,7 @@
             <a:noFill/>
             <a:extLst>
               <a:ext uri="{909E8E84-426E-40dd-AFC4-6F175D3DCCD1}">
-                <a14:hiddenFill xmlns="" xmlns:a16="http://schemas.microsoft.com/office/drawing/2014/main" xmlns:a14="http://schemas.microsoft.com/office/drawing/2010/main" xmlns:p14="http://schemas.microsoft.com/office/powerpoint/2010/main">
+                <a14:hiddenFill xmlns:p14="http://schemas.microsoft.com/office/powerpoint/2010/main" xmlns:a14="http://schemas.microsoft.com/office/drawing/2010/main" xmlns:a16="http://schemas.microsoft.com/office/drawing/2014/main" xmlns="">
                   <a:solidFill>
                     <a:srgbClr val="FFFFFF"/>
                   </a:solidFill>
@@ -29949,7 +29969,7 @@
             </a:ln>
             <a:extLst>
               <a:ext uri="{91240B29-F687-4f45-9708-019B960494DF}">
-                <a14:hiddenLine xmlns="" xmlns:a16="http://schemas.microsoft.com/office/drawing/2014/main" xmlns:a14="http://schemas.microsoft.com/office/drawing/2010/main" xmlns:p14="http://schemas.microsoft.com/office/powerpoint/2010/main" w="9525">
+                <a14:hiddenLine xmlns:p14="http://schemas.microsoft.com/office/powerpoint/2010/main" xmlns:a14="http://schemas.microsoft.com/office/drawing/2010/main" xmlns:a16="http://schemas.microsoft.com/office/drawing/2014/main" xmlns="" w="9525">
                   <a:solidFill>
                     <a:srgbClr val="000000"/>
                   </a:solidFill>
@@ -30054,7 +30074,7 @@
             </a:ln>
             <a:extLst>
               <a:ext uri="{91240B29-F687-4f45-9708-019B960494DF}">
-                <a14:hiddenLine xmlns="" xmlns:a16="http://schemas.microsoft.com/office/drawing/2014/main" xmlns:a14="http://schemas.microsoft.com/office/drawing/2010/main" xmlns:p14="http://schemas.microsoft.com/office/powerpoint/2010/main" w="9525">
+                <a14:hiddenLine xmlns:p14="http://schemas.microsoft.com/office/powerpoint/2010/main" xmlns:a14="http://schemas.microsoft.com/office/drawing/2010/main" xmlns:a16="http://schemas.microsoft.com/office/drawing/2014/main" xmlns="" w="9525">
                   <a:solidFill>
                     <a:srgbClr val="000000"/>
                   </a:solidFill>
@@ -30159,7 +30179,7 @@
             </a:ln>
             <a:extLst>
               <a:ext uri="{91240B29-F687-4f45-9708-019B960494DF}">
-                <a14:hiddenLine xmlns="" xmlns:a16="http://schemas.microsoft.com/office/drawing/2014/main" xmlns:a14="http://schemas.microsoft.com/office/drawing/2010/main" xmlns:p14="http://schemas.microsoft.com/office/powerpoint/2010/main" w="9525">
+                <a14:hiddenLine xmlns:p14="http://schemas.microsoft.com/office/powerpoint/2010/main" xmlns:a14="http://schemas.microsoft.com/office/drawing/2010/main" xmlns:a16="http://schemas.microsoft.com/office/drawing/2014/main" xmlns="" w="9525">
                   <a:solidFill>
                     <a:srgbClr val="000000"/>
                   </a:solidFill>
@@ -30208,7 +30228,7 @@
             </a:ln>
             <a:extLst>
               <a:ext uri="{91240B29-F687-4f45-9708-019B960494DF}">
-                <a14:hiddenLine xmlns="" xmlns:a16="http://schemas.microsoft.com/office/drawing/2014/main" xmlns:a14="http://schemas.microsoft.com/office/drawing/2010/main" xmlns:p14="http://schemas.microsoft.com/office/powerpoint/2010/main" w="9525">
+                <a14:hiddenLine xmlns:p14="http://schemas.microsoft.com/office/powerpoint/2010/main" xmlns:a14="http://schemas.microsoft.com/office/drawing/2010/main" xmlns:a16="http://schemas.microsoft.com/office/drawing/2014/main" xmlns="" w="9525">
                   <a:solidFill>
                     <a:srgbClr val="000000"/>
                   </a:solidFill>
@@ -30313,7 +30333,7 @@
             </a:ln>
             <a:extLst>
               <a:ext uri="{91240B29-F687-4f45-9708-019B960494DF}">
-                <a14:hiddenLine xmlns="" xmlns:a16="http://schemas.microsoft.com/office/drawing/2014/main" xmlns:a14="http://schemas.microsoft.com/office/drawing/2010/main" xmlns:p14="http://schemas.microsoft.com/office/powerpoint/2010/main" w="9525">
+                <a14:hiddenLine xmlns:p14="http://schemas.microsoft.com/office/powerpoint/2010/main" xmlns:a14="http://schemas.microsoft.com/office/drawing/2010/main" xmlns:a16="http://schemas.microsoft.com/office/drawing/2014/main" xmlns="" w="9525">
                   <a:solidFill>
                     <a:srgbClr val="000000"/>
                   </a:solidFill>
@@ -30390,7 +30410,7 @@
             </a:ln>
             <a:extLst>
               <a:ext uri="{91240B29-F687-4f45-9708-019B960494DF}">
-                <a14:hiddenLine xmlns="" xmlns:a16="http://schemas.microsoft.com/office/drawing/2014/main" xmlns:a14="http://schemas.microsoft.com/office/drawing/2010/main" xmlns:p14="http://schemas.microsoft.com/office/powerpoint/2010/main" w="9525">
+                <a14:hiddenLine xmlns:p14="http://schemas.microsoft.com/office/powerpoint/2010/main" xmlns:a14="http://schemas.microsoft.com/office/drawing/2010/main" xmlns:a16="http://schemas.microsoft.com/office/drawing/2014/main" xmlns="" w="9525">
                   <a:solidFill>
                     <a:srgbClr val="000000"/>
                   </a:solidFill>
@@ -30467,7 +30487,7 @@
             </a:ln>
             <a:extLst>
               <a:ext uri="{91240B29-F687-4f45-9708-019B960494DF}">
-                <a14:hiddenLine xmlns="" xmlns:a16="http://schemas.microsoft.com/office/drawing/2014/main" xmlns:a14="http://schemas.microsoft.com/office/drawing/2010/main" xmlns:p14="http://schemas.microsoft.com/office/powerpoint/2010/main" w="9525">
+                <a14:hiddenLine xmlns:p14="http://schemas.microsoft.com/office/powerpoint/2010/main" xmlns:a14="http://schemas.microsoft.com/office/drawing/2010/main" xmlns:a16="http://schemas.microsoft.com/office/drawing/2014/main" xmlns="" w="9525">
                   <a:solidFill>
                     <a:srgbClr val="000000"/>
                   </a:solidFill>
@@ -30572,7 +30592,7 @@
             </a:ln>
             <a:extLst>
               <a:ext uri="{91240B29-F687-4f45-9708-019B960494DF}">
-                <a14:hiddenLine xmlns="" xmlns:a16="http://schemas.microsoft.com/office/drawing/2014/main" xmlns:a14="http://schemas.microsoft.com/office/drawing/2010/main" xmlns:p14="http://schemas.microsoft.com/office/powerpoint/2010/main" w="9525">
+                <a14:hiddenLine xmlns:p14="http://schemas.microsoft.com/office/powerpoint/2010/main" xmlns:a14="http://schemas.microsoft.com/office/drawing/2010/main" xmlns:a16="http://schemas.microsoft.com/office/drawing/2014/main" xmlns="" w="9525">
                   <a:solidFill>
                     <a:srgbClr val="000000"/>
                   </a:solidFill>
@@ -30649,7 +30669,7 @@
             </a:ln>
             <a:extLst>
               <a:ext uri="{91240B29-F687-4f45-9708-019B960494DF}">
-                <a14:hiddenLine xmlns="" xmlns:a16="http://schemas.microsoft.com/office/drawing/2014/main" xmlns:a14="http://schemas.microsoft.com/office/drawing/2010/main" xmlns:p14="http://schemas.microsoft.com/office/powerpoint/2010/main" w="9525">
+                <a14:hiddenLine xmlns:p14="http://schemas.microsoft.com/office/powerpoint/2010/main" xmlns:a14="http://schemas.microsoft.com/office/drawing/2010/main" xmlns:a16="http://schemas.microsoft.com/office/drawing/2014/main" xmlns="" w="9525">
                   <a:solidFill>
                     <a:srgbClr val="000000"/>
                   </a:solidFill>
@@ -30726,7 +30746,7 @@
             </a:ln>
             <a:extLst>
               <a:ext uri="{91240B29-F687-4f45-9708-019B960494DF}">
-                <a14:hiddenLine xmlns="" xmlns:a16="http://schemas.microsoft.com/office/drawing/2014/main" xmlns:a14="http://schemas.microsoft.com/office/drawing/2010/main" xmlns:p14="http://schemas.microsoft.com/office/powerpoint/2010/main" w="9525">
+                <a14:hiddenLine xmlns:p14="http://schemas.microsoft.com/office/powerpoint/2010/main" xmlns:a14="http://schemas.microsoft.com/office/drawing/2010/main" xmlns:a16="http://schemas.microsoft.com/office/drawing/2014/main" xmlns="" w="9525">
                   <a:solidFill>
                     <a:srgbClr val="000000"/>
                   </a:solidFill>
@@ -30831,7 +30851,7 @@
             </a:ln>
             <a:extLst>
               <a:ext uri="{91240B29-F687-4f45-9708-019B960494DF}">
-                <a14:hiddenLine xmlns="" xmlns:a16="http://schemas.microsoft.com/office/drawing/2014/main" xmlns:a14="http://schemas.microsoft.com/office/drawing/2010/main" xmlns:p14="http://schemas.microsoft.com/office/powerpoint/2010/main" w="9525">
+                <a14:hiddenLine xmlns:p14="http://schemas.microsoft.com/office/powerpoint/2010/main" xmlns:a14="http://schemas.microsoft.com/office/drawing/2010/main" xmlns:a16="http://schemas.microsoft.com/office/drawing/2014/main" xmlns="" w="9525">
                   <a:solidFill>
                     <a:srgbClr val="000000"/>
                   </a:solidFill>
@@ -30936,7 +30956,7 @@
             </a:ln>
             <a:extLst>
               <a:ext uri="{91240B29-F687-4f45-9708-019B960494DF}">
-                <a14:hiddenLine xmlns="" xmlns:a16="http://schemas.microsoft.com/office/drawing/2014/main" xmlns:a14="http://schemas.microsoft.com/office/drawing/2010/main" xmlns:p14="http://schemas.microsoft.com/office/powerpoint/2010/main" w="9525">
+                <a14:hiddenLine xmlns:p14="http://schemas.microsoft.com/office/powerpoint/2010/main" xmlns:a14="http://schemas.microsoft.com/office/drawing/2010/main" xmlns:a16="http://schemas.microsoft.com/office/drawing/2014/main" xmlns="" w="9525">
                   <a:solidFill>
                     <a:srgbClr val="000000"/>
                   </a:solidFill>
@@ -31013,7 +31033,7 @@
             </a:ln>
             <a:extLst>
               <a:ext uri="{91240B29-F687-4f45-9708-019B960494DF}">
-                <a14:hiddenLine xmlns="" xmlns:a16="http://schemas.microsoft.com/office/drawing/2014/main" xmlns:a14="http://schemas.microsoft.com/office/drawing/2010/main" xmlns:p14="http://schemas.microsoft.com/office/powerpoint/2010/main" w="9525">
+                <a14:hiddenLine xmlns:p14="http://schemas.microsoft.com/office/powerpoint/2010/main" xmlns:a14="http://schemas.microsoft.com/office/drawing/2010/main" xmlns:a16="http://schemas.microsoft.com/office/drawing/2014/main" xmlns="" w="9525">
                   <a:solidFill>
                     <a:srgbClr val="000000"/>
                   </a:solidFill>
@@ -31138,7 +31158,7 @@
             </a:ln>
             <a:extLst>
               <a:ext uri="{91240B29-F687-4f45-9708-019B960494DF}">
-                <a14:hiddenLine xmlns="" xmlns:a16="http://schemas.microsoft.com/office/drawing/2014/main" xmlns:a14="http://schemas.microsoft.com/office/drawing/2010/main" xmlns:p14="http://schemas.microsoft.com/office/powerpoint/2010/main" w="9525">
+                <a14:hiddenLine xmlns:p14="http://schemas.microsoft.com/office/powerpoint/2010/main" xmlns:a14="http://schemas.microsoft.com/office/drawing/2010/main" xmlns:a16="http://schemas.microsoft.com/office/drawing/2014/main" xmlns="" w="9525">
                   <a:solidFill>
                     <a:srgbClr val="000000"/>
                   </a:solidFill>
@@ -31215,7 +31235,7 @@
             </a:ln>
             <a:extLst>
               <a:ext uri="{91240B29-F687-4f45-9708-019B960494DF}">
-                <a14:hiddenLine xmlns="" xmlns:a16="http://schemas.microsoft.com/office/drawing/2014/main" xmlns:a14="http://schemas.microsoft.com/office/drawing/2010/main" xmlns:p14="http://schemas.microsoft.com/office/powerpoint/2010/main" w="9525">
+                <a14:hiddenLine xmlns:p14="http://schemas.microsoft.com/office/powerpoint/2010/main" xmlns:a14="http://schemas.microsoft.com/office/drawing/2010/main" xmlns:a16="http://schemas.microsoft.com/office/drawing/2014/main" xmlns="" w="9525">
                   <a:solidFill>
                     <a:srgbClr val="000000"/>
                   </a:solidFill>
@@ -31320,7 +31340,7 @@
             </a:ln>
             <a:extLst>
               <a:ext uri="{91240B29-F687-4f45-9708-019B960494DF}">
-                <a14:hiddenLine xmlns="" xmlns:a16="http://schemas.microsoft.com/office/drawing/2014/main" xmlns:a14="http://schemas.microsoft.com/office/drawing/2010/main" xmlns:p14="http://schemas.microsoft.com/office/powerpoint/2010/main" w="9525">
+                <a14:hiddenLine xmlns:p14="http://schemas.microsoft.com/office/powerpoint/2010/main" xmlns:a14="http://schemas.microsoft.com/office/drawing/2010/main" xmlns:a16="http://schemas.microsoft.com/office/drawing/2014/main" xmlns="" w="9525">
                   <a:solidFill>
                     <a:srgbClr val="000000"/>
                   </a:solidFill>
@@ -31425,7 +31445,7 @@
             </a:ln>
             <a:extLst>
               <a:ext uri="{91240B29-F687-4f45-9708-019B960494DF}">
-                <a14:hiddenLine xmlns="" xmlns:a16="http://schemas.microsoft.com/office/drawing/2014/main" xmlns:a14="http://schemas.microsoft.com/office/drawing/2010/main" xmlns:p14="http://schemas.microsoft.com/office/powerpoint/2010/main" w="9525">
+                <a14:hiddenLine xmlns:p14="http://schemas.microsoft.com/office/powerpoint/2010/main" xmlns:a14="http://schemas.microsoft.com/office/drawing/2010/main" xmlns:a16="http://schemas.microsoft.com/office/drawing/2014/main" xmlns="" w="9525">
                   <a:solidFill>
                     <a:srgbClr val="000000"/>
                   </a:solidFill>
@@ -31502,7 +31522,7 @@
             </a:ln>
             <a:extLst>
               <a:ext uri="{91240B29-F687-4f45-9708-019B960494DF}">
-                <a14:hiddenLine xmlns="" xmlns:a16="http://schemas.microsoft.com/office/drawing/2014/main" xmlns:a14="http://schemas.microsoft.com/office/drawing/2010/main" xmlns:p14="http://schemas.microsoft.com/office/powerpoint/2010/main" w="9525">
+                <a14:hiddenLine xmlns:p14="http://schemas.microsoft.com/office/powerpoint/2010/main" xmlns:a14="http://schemas.microsoft.com/office/drawing/2010/main" xmlns:a16="http://schemas.microsoft.com/office/drawing/2014/main" xmlns="" w="9525">
                   <a:solidFill>
                     <a:srgbClr val="000000"/>
                   </a:solidFill>
@@ -31607,7 +31627,7 @@
             </a:ln>
             <a:extLst>
               <a:ext uri="{91240B29-F687-4f45-9708-019B960494DF}">
-                <a14:hiddenLine xmlns="" xmlns:a16="http://schemas.microsoft.com/office/drawing/2014/main" xmlns:a14="http://schemas.microsoft.com/office/drawing/2010/main" xmlns:p14="http://schemas.microsoft.com/office/powerpoint/2010/main" w="9525">
+                <a14:hiddenLine xmlns:p14="http://schemas.microsoft.com/office/powerpoint/2010/main" xmlns:a14="http://schemas.microsoft.com/office/drawing/2010/main" xmlns:a16="http://schemas.microsoft.com/office/drawing/2014/main" xmlns="" w="9525">
                   <a:solidFill>
                     <a:srgbClr val="000000"/>
                   </a:solidFill>
@@ -31712,7 +31732,7 @@
             </a:ln>
             <a:extLst>
               <a:ext uri="{91240B29-F687-4f45-9708-019B960494DF}">
-                <a14:hiddenLine xmlns="" xmlns:a16="http://schemas.microsoft.com/office/drawing/2014/main" xmlns:a14="http://schemas.microsoft.com/office/drawing/2010/main" xmlns:p14="http://schemas.microsoft.com/office/powerpoint/2010/main" w="9525">
+                <a14:hiddenLine xmlns:p14="http://schemas.microsoft.com/office/powerpoint/2010/main" xmlns:a14="http://schemas.microsoft.com/office/drawing/2010/main" xmlns:a16="http://schemas.microsoft.com/office/drawing/2014/main" xmlns="" w="9525">
                   <a:solidFill>
                     <a:srgbClr val="000000"/>
                   </a:solidFill>
@@ -31783,7 +31803,7 @@
             </a:ln>
             <a:extLst>
               <a:ext uri="{91240B29-F687-4f45-9708-019B960494DF}">
-                <a14:hiddenLine xmlns="" xmlns:a16="http://schemas.microsoft.com/office/drawing/2014/main" xmlns:a14="http://schemas.microsoft.com/office/drawing/2010/main" xmlns:p14="http://schemas.microsoft.com/office/powerpoint/2010/main" w="9525">
+                <a14:hiddenLine xmlns:p14="http://schemas.microsoft.com/office/powerpoint/2010/main" xmlns:a14="http://schemas.microsoft.com/office/drawing/2010/main" xmlns:a16="http://schemas.microsoft.com/office/drawing/2014/main" xmlns="" w="9525">
                   <a:solidFill>
                     <a:srgbClr val="000000"/>
                   </a:solidFill>
@@ -31888,7 +31908,7 @@
             </a:ln>
             <a:extLst>
               <a:ext uri="{91240B29-F687-4f45-9708-019B960494DF}">
-                <a14:hiddenLine xmlns="" xmlns:a16="http://schemas.microsoft.com/office/drawing/2014/main" xmlns:a14="http://schemas.microsoft.com/office/drawing/2010/main" xmlns:p14="http://schemas.microsoft.com/office/powerpoint/2010/main" w="9525">
+                <a14:hiddenLine xmlns:p14="http://schemas.microsoft.com/office/powerpoint/2010/main" xmlns:a14="http://schemas.microsoft.com/office/drawing/2010/main" xmlns:a16="http://schemas.microsoft.com/office/drawing/2014/main" xmlns="" w="9525">
                   <a:solidFill>
                     <a:srgbClr val="000000"/>
                   </a:solidFill>
@@ -31959,7 +31979,7 @@
             </a:ln>
             <a:extLst>
               <a:ext uri="{91240B29-F687-4f45-9708-019B960494DF}">
-                <a14:hiddenLine xmlns="" xmlns:a16="http://schemas.microsoft.com/office/drawing/2014/main" xmlns:a14="http://schemas.microsoft.com/office/drawing/2010/main" xmlns:p14="http://schemas.microsoft.com/office/powerpoint/2010/main" w="9525">
+                <a14:hiddenLine xmlns:p14="http://schemas.microsoft.com/office/powerpoint/2010/main" xmlns:a14="http://schemas.microsoft.com/office/drawing/2010/main" xmlns:a16="http://schemas.microsoft.com/office/drawing/2014/main" xmlns="" w="9525">
                   <a:solidFill>
                     <a:srgbClr val="000000"/>
                   </a:solidFill>
@@ -32064,7 +32084,7 @@
             </a:ln>
             <a:extLst>
               <a:ext uri="{91240B29-F687-4f45-9708-019B960494DF}">
-                <a14:hiddenLine xmlns="" xmlns:a16="http://schemas.microsoft.com/office/drawing/2014/main" xmlns:a14="http://schemas.microsoft.com/office/drawing/2010/main" xmlns:p14="http://schemas.microsoft.com/office/powerpoint/2010/main" w="9525">
+                <a14:hiddenLine xmlns:p14="http://schemas.microsoft.com/office/powerpoint/2010/main" xmlns:a14="http://schemas.microsoft.com/office/drawing/2010/main" xmlns:a16="http://schemas.microsoft.com/office/drawing/2014/main" xmlns="" w="9525">
                   <a:solidFill>
                     <a:srgbClr val="000000"/>
                   </a:solidFill>
@@ -32147,7 +32167,7 @@
             </a:ln>
             <a:extLst>
               <a:ext uri="{91240B29-F687-4f45-9708-019B960494DF}">
-                <a14:hiddenLine xmlns="" xmlns:a16="http://schemas.microsoft.com/office/drawing/2014/main" xmlns:a14="http://schemas.microsoft.com/office/drawing/2010/main" xmlns:p14="http://schemas.microsoft.com/office/powerpoint/2010/main" w="9525">
+                <a14:hiddenLine xmlns:p14="http://schemas.microsoft.com/office/powerpoint/2010/main" xmlns:a14="http://schemas.microsoft.com/office/drawing/2010/main" xmlns:a16="http://schemas.microsoft.com/office/drawing/2014/main" xmlns="" w="9525">
                   <a:solidFill>
                     <a:srgbClr val="000000"/>
                   </a:solidFill>
@@ -32252,7 +32272,7 @@
             </a:ln>
             <a:extLst>
               <a:ext uri="{91240B29-F687-4f45-9708-019B960494DF}">
-                <a14:hiddenLine xmlns="" xmlns:a16="http://schemas.microsoft.com/office/drawing/2014/main" xmlns:a14="http://schemas.microsoft.com/office/drawing/2010/main" xmlns:p14="http://schemas.microsoft.com/office/powerpoint/2010/main" w="9525">
+                <a14:hiddenLine xmlns:p14="http://schemas.microsoft.com/office/powerpoint/2010/main" xmlns:a14="http://schemas.microsoft.com/office/drawing/2010/main" xmlns:a16="http://schemas.microsoft.com/office/drawing/2014/main" xmlns="" w="9525">
                   <a:solidFill>
                     <a:srgbClr val="000000"/>
                   </a:solidFill>
@@ -32335,7 +32355,7 @@
             </a:ln>
             <a:extLst>
               <a:ext uri="{91240B29-F687-4f45-9708-019B960494DF}">
-                <a14:hiddenLine xmlns="" xmlns:a16="http://schemas.microsoft.com/office/drawing/2014/main" xmlns:a14="http://schemas.microsoft.com/office/drawing/2010/main" xmlns:p14="http://schemas.microsoft.com/office/powerpoint/2010/main" w="9525">
+                <a14:hiddenLine xmlns:p14="http://schemas.microsoft.com/office/powerpoint/2010/main" xmlns:a14="http://schemas.microsoft.com/office/drawing/2010/main" xmlns:a16="http://schemas.microsoft.com/office/drawing/2014/main" xmlns="" w="9525">
                   <a:solidFill>
                     <a:srgbClr val="000000"/>
                   </a:solidFill>
@@ -32440,7 +32460,7 @@
             </a:ln>
             <a:extLst>
               <a:ext uri="{91240B29-F687-4f45-9708-019B960494DF}">
-                <a14:hiddenLine xmlns="" xmlns:a16="http://schemas.microsoft.com/office/drawing/2014/main" xmlns:a14="http://schemas.microsoft.com/office/drawing/2010/main" xmlns:p14="http://schemas.microsoft.com/office/powerpoint/2010/main" w="9525">
+                <a14:hiddenLine xmlns:p14="http://schemas.microsoft.com/office/powerpoint/2010/main" xmlns:a14="http://schemas.microsoft.com/office/drawing/2010/main" xmlns:a16="http://schemas.microsoft.com/office/drawing/2014/main" xmlns="" w="9525">
                   <a:solidFill>
                     <a:srgbClr val="000000"/>
                   </a:solidFill>
@@ -32489,7 +32509,7 @@
             </a:ln>
             <a:extLst>
               <a:ext uri="{91240B29-F687-4f45-9708-019B960494DF}">
-                <a14:hiddenLine xmlns="" xmlns:a16="http://schemas.microsoft.com/office/drawing/2014/main" xmlns:a14="http://schemas.microsoft.com/office/drawing/2010/main" xmlns:p14="http://schemas.microsoft.com/office/powerpoint/2010/main" w="9525">
+                <a14:hiddenLine xmlns:p14="http://schemas.microsoft.com/office/powerpoint/2010/main" xmlns:a14="http://schemas.microsoft.com/office/drawing/2010/main" xmlns:a16="http://schemas.microsoft.com/office/drawing/2014/main" xmlns="" w="9525">
                   <a:solidFill>
                     <a:srgbClr val="000000"/>
                   </a:solidFill>
@@ -32594,7 +32614,7 @@
             </a:ln>
             <a:extLst>
               <a:ext uri="{91240B29-F687-4f45-9708-019B960494DF}">
-                <a14:hiddenLine xmlns="" xmlns:a16="http://schemas.microsoft.com/office/drawing/2014/main" xmlns:a14="http://schemas.microsoft.com/office/drawing/2010/main" xmlns:p14="http://schemas.microsoft.com/office/powerpoint/2010/main" w="9525">
+                <a14:hiddenLine xmlns:p14="http://schemas.microsoft.com/office/powerpoint/2010/main" xmlns:a14="http://schemas.microsoft.com/office/drawing/2010/main" xmlns:a16="http://schemas.microsoft.com/office/drawing/2014/main" xmlns="" w="9525">
                   <a:solidFill>
                     <a:srgbClr val="000000"/>
                   </a:solidFill>
@@ -32671,7 +32691,7 @@
             </a:ln>
             <a:extLst>
               <a:ext uri="{91240B29-F687-4f45-9708-019B960494DF}">
-                <a14:hiddenLine xmlns="" xmlns:a16="http://schemas.microsoft.com/office/drawing/2014/main" xmlns:a14="http://schemas.microsoft.com/office/drawing/2010/main" xmlns:p14="http://schemas.microsoft.com/office/powerpoint/2010/main" w="9525">
+                <a14:hiddenLine xmlns:p14="http://schemas.microsoft.com/office/powerpoint/2010/main" xmlns:a14="http://schemas.microsoft.com/office/drawing/2010/main" xmlns:a16="http://schemas.microsoft.com/office/drawing/2014/main" xmlns="" w="9525">
                   <a:solidFill>
                     <a:srgbClr val="000000"/>
                   </a:solidFill>
@@ -32748,7 +32768,7 @@
             </a:ln>
             <a:extLst>
               <a:ext uri="{91240B29-F687-4f45-9708-019B960494DF}">
-                <a14:hiddenLine xmlns="" xmlns:a16="http://schemas.microsoft.com/office/drawing/2014/main" xmlns:a14="http://schemas.microsoft.com/office/drawing/2010/main" xmlns:p14="http://schemas.microsoft.com/office/powerpoint/2010/main" w="9525">
+                <a14:hiddenLine xmlns:p14="http://schemas.microsoft.com/office/powerpoint/2010/main" xmlns:a14="http://schemas.microsoft.com/office/drawing/2010/main" xmlns:a16="http://schemas.microsoft.com/office/drawing/2014/main" xmlns="" w="9525">
                   <a:solidFill>
                     <a:srgbClr val="000000"/>
                   </a:solidFill>
@@ -32853,7 +32873,7 @@
             </a:ln>
             <a:extLst>
               <a:ext uri="{91240B29-F687-4f45-9708-019B960494DF}">
-                <a14:hiddenLine xmlns="" xmlns:a16="http://schemas.microsoft.com/office/drawing/2014/main" xmlns:a14="http://schemas.microsoft.com/office/drawing/2010/main" xmlns:p14="http://schemas.microsoft.com/office/powerpoint/2010/main" w="9525">
+                <a14:hiddenLine xmlns:p14="http://schemas.microsoft.com/office/powerpoint/2010/main" xmlns:a14="http://schemas.microsoft.com/office/drawing/2010/main" xmlns:a16="http://schemas.microsoft.com/office/drawing/2014/main" xmlns="" w="9525">
                   <a:solidFill>
                     <a:srgbClr val="000000"/>
                   </a:solidFill>
@@ -32936,7 +32956,7 @@
             </a:ln>
             <a:extLst>
               <a:ext uri="{91240B29-F687-4f45-9708-019B960494DF}">
-                <a14:hiddenLine xmlns="" xmlns:a16="http://schemas.microsoft.com/office/drawing/2014/main" xmlns:a14="http://schemas.microsoft.com/office/drawing/2010/main" xmlns:p14="http://schemas.microsoft.com/office/powerpoint/2010/main" w="9525">
+                <a14:hiddenLine xmlns:p14="http://schemas.microsoft.com/office/powerpoint/2010/main" xmlns:a14="http://schemas.microsoft.com/office/drawing/2010/main" xmlns:a16="http://schemas.microsoft.com/office/drawing/2014/main" xmlns="" w="9525">
                   <a:solidFill>
                     <a:srgbClr val="000000"/>
                   </a:solidFill>
@@ -33013,7 +33033,7 @@
             </a:ln>
             <a:extLst>
               <a:ext uri="{91240B29-F687-4f45-9708-019B960494DF}">
-                <a14:hiddenLine xmlns="" xmlns:a16="http://schemas.microsoft.com/office/drawing/2014/main" xmlns:a14="http://schemas.microsoft.com/office/drawing/2010/main" xmlns:p14="http://schemas.microsoft.com/office/powerpoint/2010/main" w="9525">
+                <a14:hiddenLine xmlns:p14="http://schemas.microsoft.com/office/powerpoint/2010/main" xmlns:a14="http://schemas.microsoft.com/office/drawing/2010/main" xmlns:a16="http://schemas.microsoft.com/office/drawing/2014/main" xmlns="" w="9525">
                   <a:solidFill>
                     <a:srgbClr val="000000"/>
                   </a:solidFill>
@@ -33118,7 +33138,7 @@
             </a:ln>
             <a:extLst>
               <a:ext uri="{91240B29-F687-4f45-9708-019B960494DF}">
-                <a14:hiddenLine xmlns="" xmlns:a16="http://schemas.microsoft.com/office/drawing/2014/main" xmlns:a14="http://schemas.microsoft.com/office/drawing/2010/main" xmlns:p14="http://schemas.microsoft.com/office/powerpoint/2010/main" w="9525">
+                <a14:hiddenLine xmlns:p14="http://schemas.microsoft.com/office/powerpoint/2010/main" xmlns:a14="http://schemas.microsoft.com/office/drawing/2010/main" xmlns:a16="http://schemas.microsoft.com/office/drawing/2014/main" xmlns="" w="9525">
                   <a:solidFill>
                     <a:srgbClr val="000000"/>
                   </a:solidFill>
@@ -33195,7 +33215,7 @@
             </a:ln>
             <a:extLst>
               <a:ext uri="{91240B29-F687-4f45-9708-019B960494DF}">
-                <a14:hiddenLine xmlns="" xmlns:a16="http://schemas.microsoft.com/office/drawing/2014/main" xmlns:a14="http://schemas.microsoft.com/office/drawing/2010/main" xmlns:p14="http://schemas.microsoft.com/office/powerpoint/2010/main" w="9525">
+                <a14:hiddenLine xmlns:p14="http://schemas.microsoft.com/office/powerpoint/2010/main" xmlns:a14="http://schemas.microsoft.com/office/drawing/2010/main" xmlns:a16="http://schemas.microsoft.com/office/drawing/2014/main" xmlns="" w="9525">
                   <a:solidFill>
                     <a:srgbClr val="000000"/>
                   </a:solidFill>
@@ -33300,7 +33320,7 @@
             </a:ln>
             <a:extLst>
               <a:ext uri="{91240B29-F687-4f45-9708-019B960494DF}">
-                <a14:hiddenLine xmlns="" xmlns:a16="http://schemas.microsoft.com/office/drawing/2014/main" xmlns:a14="http://schemas.microsoft.com/office/drawing/2010/main" xmlns:p14="http://schemas.microsoft.com/office/powerpoint/2010/main" w="9525">
+                <a14:hiddenLine xmlns:p14="http://schemas.microsoft.com/office/powerpoint/2010/main" xmlns:a14="http://schemas.microsoft.com/office/drawing/2010/main" xmlns:a16="http://schemas.microsoft.com/office/drawing/2014/main" xmlns="" w="9525">
                   <a:solidFill>
                     <a:srgbClr val="000000"/>
                   </a:solidFill>
@@ -33377,7 +33397,7 @@
             </a:ln>
             <a:extLst>
               <a:ext uri="{91240B29-F687-4f45-9708-019B960494DF}">
-                <a14:hiddenLine xmlns="" xmlns:a16="http://schemas.microsoft.com/office/drawing/2014/main" xmlns:a14="http://schemas.microsoft.com/office/drawing/2010/main" xmlns:p14="http://schemas.microsoft.com/office/powerpoint/2010/main" w="9525">
+                <a14:hiddenLine xmlns:p14="http://schemas.microsoft.com/office/powerpoint/2010/main" xmlns:a14="http://schemas.microsoft.com/office/drawing/2010/main" xmlns:a16="http://schemas.microsoft.com/office/drawing/2014/main" xmlns="" w="9525">
                   <a:solidFill>
                     <a:srgbClr val="000000"/>
                   </a:solidFill>
@@ -33482,7 +33502,7 @@
             </a:ln>
             <a:extLst>
               <a:ext uri="{91240B29-F687-4f45-9708-019B960494DF}">
-                <a14:hiddenLine xmlns="" xmlns:a16="http://schemas.microsoft.com/office/drawing/2014/main" xmlns:a14="http://schemas.microsoft.com/office/drawing/2010/main" xmlns:p14="http://schemas.microsoft.com/office/powerpoint/2010/main" w="9525">
+                <a14:hiddenLine xmlns:p14="http://schemas.microsoft.com/office/powerpoint/2010/main" xmlns:a14="http://schemas.microsoft.com/office/drawing/2010/main" xmlns:a16="http://schemas.microsoft.com/office/drawing/2014/main" xmlns="" w="9525">
                   <a:solidFill>
                     <a:srgbClr val="000000"/>
                   </a:solidFill>
@@ -33531,7 +33551,7 @@
             </a:ln>
             <a:extLst>
               <a:ext uri="{91240B29-F687-4f45-9708-019B960494DF}">
-                <a14:hiddenLine xmlns="" xmlns:a16="http://schemas.microsoft.com/office/drawing/2014/main" xmlns:a14="http://schemas.microsoft.com/office/drawing/2010/main" xmlns:p14="http://schemas.microsoft.com/office/powerpoint/2010/main" w="9525">
+                <a14:hiddenLine xmlns:p14="http://schemas.microsoft.com/office/powerpoint/2010/main" xmlns:a14="http://schemas.microsoft.com/office/drawing/2010/main" xmlns:a16="http://schemas.microsoft.com/office/drawing/2014/main" xmlns="" w="9525">
                   <a:solidFill>
                     <a:srgbClr val="000000"/>
                   </a:solidFill>
@@ -33611,7 +33631,7 @@
             </a:ln>
             <a:extLst>
               <a:ext uri="{91240B29-F687-4f45-9708-019B960494DF}">
-                <a14:hiddenLine xmlns="" xmlns:a16="http://schemas.microsoft.com/office/drawing/2014/main" xmlns:a14="http://schemas.microsoft.com/office/drawing/2010/main" xmlns:p14="http://schemas.microsoft.com/office/powerpoint/2010/main" w="9525">
+                <a14:hiddenLine xmlns:p14="http://schemas.microsoft.com/office/powerpoint/2010/main" xmlns:a14="http://schemas.microsoft.com/office/drawing/2010/main" xmlns:a16="http://schemas.microsoft.com/office/drawing/2014/main" xmlns="" w="9525">
                   <a:solidFill>
                     <a:srgbClr val="000000"/>
                   </a:solidFill>
@@ -33716,7 +33736,7 @@
             </a:ln>
             <a:extLst>
               <a:ext uri="{91240B29-F687-4f45-9708-019B960494DF}">
-                <a14:hiddenLine xmlns="" xmlns:a16="http://schemas.microsoft.com/office/drawing/2014/main" xmlns:a14="http://schemas.microsoft.com/office/drawing/2010/main" xmlns:p14="http://schemas.microsoft.com/office/powerpoint/2010/main" w="9525">
+                <a14:hiddenLine xmlns:p14="http://schemas.microsoft.com/office/powerpoint/2010/main" xmlns:a14="http://schemas.microsoft.com/office/drawing/2010/main" xmlns:a16="http://schemas.microsoft.com/office/drawing/2014/main" xmlns="" w="9525">
                   <a:solidFill>
                     <a:srgbClr val="000000"/>
                   </a:solidFill>
@@ -33793,7 +33813,7 @@
             </a:ln>
             <a:extLst>
               <a:ext uri="{91240B29-F687-4f45-9708-019B960494DF}">
-                <a14:hiddenLine xmlns="" xmlns:a16="http://schemas.microsoft.com/office/drawing/2014/main" xmlns:a14="http://schemas.microsoft.com/office/drawing/2010/main" xmlns:p14="http://schemas.microsoft.com/office/powerpoint/2010/main" w="9525">
+                <a14:hiddenLine xmlns:p14="http://schemas.microsoft.com/office/powerpoint/2010/main" xmlns:a14="http://schemas.microsoft.com/office/drawing/2010/main" xmlns:a16="http://schemas.microsoft.com/office/drawing/2014/main" xmlns="" w="9525">
                   <a:solidFill>
                     <a:srgbClr val="000000"/>
                   </a:solidFill>
@@ -33898,7 +33918,7 @@
             </a:ln>
             <a:extLst>
               <a:ext uri="{91240B29-F687-4f45-9708-019B960494DF}">
-                <a14:hiddenLine xmlns="" xmlns:a16="http://schemas.microsoft.com/office/drawing/2014/main" xmlns:a14="http://schemas.microsoft.com/office/drawing/2010/main" xmlns:p14="http://schemas.microsoft.com/office/powerpoint/2010/main" w="9525">
+                <a14:hiddenLine xmlns:p14="http://schemas.microsoft.com/office/powerpoint/2010/main" xmlns:a14="http://schemas.microsoft.com/office/drawing/2010/main" xmlns:a16="http://schemas.microsoft.com/office/drawing/2014/main" xmlns="" w="9525">
                   <a:solidFill>
                     <a:srgbClr val="000000"/>
                   </a:solidFill>
@@ -34003,7 +34023,7 @@
             </a:ln>
             <a:extLst>
               <a:ext uri="{91240B29-F687-4f45-9708-019B960494DF}">
-                <a14:hiddenLine xmlns="" xmlns:a16="http://schemas.microsoft.com/office/drawing/2014/main" xmlns:a14="http://schemas.microsoft.com/office/drawing/2010/main" xmlns:p14="http://schemas.microsoft.com/office/powerpoint/2010/main" w="9525">
+                <a14:hiddenLine xmlns:p14="http://schemas.microsoft.com/office/powerpoint/2010/main" xmlns:a14="http://schemas.microsoft.com/office/drawing/2010/main" xmlns:a16="http://schemas.microsoft.com/office/drawing/2014/main" xmlns="" w="9525">
                   <a:solidFill>
                     <a:srgbClr val="000000"/>
                   </a:solidFill>
@@ -34083,7 +34103,7 @@
             </a:ln>
             <a:extLst>
               <a:ext uri="{91240B29-F687-4f45-9708-019B960494DF}">
-                <a14:hiddenLine xmlns="" xmlns:a16="http://schemas.microsoft.com/office/drawing/2014/main" xmlns:a14="http://schemas.microsoft.com/office/drawing/2010/main" xmlns:p14="http://schemas.microsoft.com/office/powerpoint/2010/main" w="9525">
+                <a14:hiddenLine xmlns:p14="http://schemas.microsoft.com/office/powerpoint/2010/main" xmlns:a14="http://schemas.microsoft.com/office/drawing/2010/main" xmlns:a16="http://schemas.microsoft.com/office/drawing/2014/main" xmlns="" w="9525">
                   <a:solidFill>
                     <a:srgbClr val="000000"/>
                   </a:solidFill>
@@ -34160,7 +34180,7 @@
             </a:ln>
             <a:extLst>
               <a:ext uri="{91240B29-F687-4f45-9708-019B960494DF}">
-                <a14:hiddenLine xmlns="" xmlns:a16="http://schemas.microsoft.com/office/drawing/2014/main" xmlns:a14="http://schemas.microsoft.com/office/drawing/2010/main" xmlns:p14="http://schemas.microsoft.com/office/powerpoint/2010/main" w="9525">
+                <a14:hiddenLine xmlns:p14="http://schemas.microsoft.com/office/powerpoint/2010/main" xmlns:a14="http://schemas.microsoft.com/office/drawing/2010/main" xmlns:a16="http://schemas.microsoft.com/office/drawing/2014/main" xmlns="" w="9525">
                   <a:solidFill>
                     <a:srgbClr val="000000"/>
                   </a:solidFill>
@@ -34265,7 +34285,7 @@
             </a:ln>
             <a:extLst>
               <a:ext uri="{91240B29-F687-4f45-9708-019B960494DF}">
-                <a14:hiddenLine xmlns="" xmlns:a16="http://schemas.microsoft.com/office/drawing/2014/main" xmlns:a14="http://schemas.microsoft.com/office/drawing/2010/main" xmlns:p14="http://schemas.microsoft.com/office/powerpoint/2010/main" w="9525">
+                <a14:hiddenLine xmlns:p14="http://schemas.microsoft.com/office/powerpoint/2010/main" xmlns:a14="http://schemas.microsoft.com/office/drawing/2010/main" xmlns:a16="http://schemas.microsoft.com/office/drawing/2014/main" xmlns="" w="9525">
                   <a:solidFill>
                     <a:srgbClr val="000000"/>
                   </a:solidFill>
@@ -34370,7 +34390,7 @@
             </a:ln>
             <a:extLst>
               <a:ext uri="{91240B29-F687-4f45-9708-019B960494DF}">
-                <a14:hiddenLine xmlns="" xmlns:a16="http://schemas.microsoft.com/office/drawing/2014/main" xmlns:a14="http://schemas.microsoft.com/office/drawing/2010/main" xmlns:p14="http://schemas.microsoft.com/office/powerpoint/2010/main" w="9525">
+                <a14:hiddenLine xmlns:p14="http://schemas.microsoft.com/office/powerpoint/2010/main" xmlns:a14="http://schemas.microsoft.com/office/drawing/2010/main" xmlns:a16="http://schemas.microsoft.com/office/drawing/2014/main" xmlns="" w="9525">
                   <a:solidFill>
                     <a:srgbClr val="000000"/>
                   </a:solidFill>
@@ -34447,7 +34467,7 @@
             </a:ln>
             <a:extLst>
               <a:ext uri="{91240B29-F687-4f45-9708-019B960494DF}">
-                <a14:hiddenLine xmlns="" xmlns:a16="http://schemas.microsoft.com/office/drawing/2014/main" xmlns:a14="http://schemas.microsoft.com/office/drawing/2010/main" xmlns:p14="http://schemas.microsoft.com/office/powerpoint/2010/main" w="9525">
+                <a14:hiddenLine xmlns:p14="http://schemas.microsoft.com/office/powerpoint/2010/main" xmlns:a14="http://schemas.microsoft.com/office/drawing/2010/main" xmlns:a16="http://schemas.microsoft.com/office/drawing/2014/main" xmlns="" w="9525">
                   <a:solidFill>
                     <a:srgbClr val="000000"/>
                   </a:solidFill>
@@ -34582,7 +34602,7 @@
             </a:ln>
             <a:extLst>
               <a:ext uri="{91240B29-F687-4f45-9708-019B960494DF}">
-                <a14:hiddenLine xmlns="" xmlns:a16="http://schemas.microsoft.com/office/drawing/2014/main" xmlns:a14="http://schemas.microsoft.com/office/drawing/2010/main" xmlns:p14="http://schemas.microsoft.com/office/powerpoint/2010/main" w="9525">
+                <a14:hiddenLine xmlns:p14="http://schemas.microsoft.com/office/powerpoint/2010/main" xmlns:a14="http://schemas.microsoft.com/office/drawing/2010/main" xmlns:a16="http://schemas.microsoft.com/office/drawing/2014/main" xmlns="" w="9525">
                   <a:solidFill>
                     <a:srgbClr val="000000"/>
                   </a:solidFill>
@@ -34665,7 +34685,7 @@
             </a:ln>
             <a:extLst>
               <a:ext uri="{91240B29-F687-4f45-9708-019B960494DF}">
-                <a14:hiddenLine xmlns="" xmlns:a16="http://schemas.microsoft.com/office/drawing/2014/main" xmlns:a14="http://schemas.microsoft.com/office/drawing/2010/main" xmlns:p14="http://schemas.microsoft.com/office/powerpoint/2010/main" w="9525">
+                <a14:hiddenLine xmlns:p14="http://schemas.microsoft.com/office/powerpoint/2010/main" xmlns:a14="http://schemas.microsoft.com/office/drawing/2010/main" xmlns:a16="http://schemas.microsoft.com/office/drawing/2014/main" xmlns="" w="9525">
                   <a:solidFill>
                     <a:srgbClr val="000000"/>
                   </a:solidFill>
@@ -34770,7 +34790,7 @@
             </a:ln>
             <a:extLst>
               <a:ext uri="{91240B29-F687-4f45-9708-019B960494DF}">
-                <a14:hiddenLine xmlns="" xmlns:a16="http://schemas.microsoft.com/office/drawing/2014/main" xmlns:a14="http://schemas.microsoft.com/office/drawing/2010/main" xmlns:p14="http://schemas.microsoft.com/office/powerpoint/2010/main" w="9525">
+                <a14:hiddenLine xmlns:p14="http://schemas.microsoft.com/office/powerpoint/2010/main" xmlns:a14="http://schemas.microsoft.com/office/drawing/2010/main" xmlns:a16="http://schemas.microsoft.com/office/drawing/2014/main" xmlns="" w="9525">
                   <a:solidFill>
                     <a:srgbClr val="000000"/>
                   </a:solidFill>
@@ -35034,7 +35054,7 @@
           <a:noFill/>
           <a:extLst>
             <a:ext uri="{909E8E84-426E-40dd-AFC4-6F175D3DCCD1}">
-              <a14:hiddenFill xmlns="" xmlns:a16="http://schemas.microsoft.com/office/drawing/2014/main" xmlns:p14="http://schemas.microsoft.com/office/powerpoint/2010/main" xmlns:a14="http://schemas.microsoft.com/office/drawing/2010/main">
+              <a14:hiddenFill xmlns:a14="http://schemas.microsoft.com/office/drawing/2010/main" xmlns:p14="http://schemas.microsoft.com/office/powerpoint/2010/main" xmlns:a16="http://schemas.microsoft.com/office/drawing/2014/main" xmlns="">
                 <a:solidFill>
                   <a:srgbClr val="FFFFFF"/>
                 </a:solidFill>
@@ -35125,7 +35145,7 @@
             </a:ln>
             <a:extLst>
               <a:ext uri="{91240B29-F687-4f45-9708-019B960494DF}">
-                <a14:hiddenLine xmlns="" xmlns:a16="http://schemas.microsoft.com/office/drawing/2014/main" xmlns:p14="http://schemas.microsoft.com/office/powerpoint/2010/main" xmlns:a14="http://schemas.microsoft.com/office/drawing/2010/main" w="9525">
+                <a14:hiddenLine xmlns:a14="http://schemas.microsoft.com/office/drawing/2010/main" xmlns:p14="http://schemas.microsoft.com/office/powerpoint/2010/main" xmlns:a16="http://schemas.microsoft.com/office/drawing/2014/main" xmlns="" w="9525">
                   <a:solidFill>
                     <a:srgbClr val="000000"/>
                   </a:solidFill>
@@ -35230,7 +35250,7 @@
             </a:ln>
             <a:extLst>
               <a:ext uri="{91240B29-F687-4f45-9708-019B960494DF}">
-                <a14:hiddenLine xmlns="" xmlns:a16="http://schemas.microsoft.com/office/drawing/2014/main" xmlns:p14="http://schemas.microsoft.com/office/powerpoint/2010/main" xmlns:a14="http://schemas.microsoft.com/office/drawing/2010/main" w="9525">
+                <a14:hiddenLine xmlns:a14="http://schemas.microsoft.com/office/drawing/2010/main" xmlns:p14="http://schemas.microsoft.com/office/powerpoint/2010/main" xmlns:a16="http://schemas.microsoft.com/office/drawing/2014/main" xmlns="" w="9525">
                   <a:solidFill>
                     <a:srgbClr val="000000"/>
                   </a:solidFill>
@@ -35335,7 +35355,7 @@
             </a:ln>
             <a:extLst>
               <a:ext uri="{91240B29-F687-4f45-9708-019B960494DF}">
-                <a14:hiddenLine xmlns="" xmlns:a16="http://schemas.microsoft.com/office/drawing/2014/main" xmlns:p14="http://schemas.microsoft.com/office/powerpoint/2010/main" xmlns:a14="http://schemas.microsoft.com/office/drawing/2010/main" w="9525">
+                <a14:hiddenLine xmlns:a14="http://schemas.microsoft.com/office/drawing/2010/main" xmlns:p14="http://schemas.microsoft.com/office/powerpoint/2010/main" xmlns:a16="http://schemas.microsoft.com/office/drawing/2014/main" xmlns="" w="9525">
                   <a:solidFill>
                     <a:srgbClr val="000000"/>
                   </a:solidFill>
@@ -35384,7 +35404,7 @@
             </a:ln>
             <a:extLst>
               <a:ext uri="{91240B29-F687-4f45-9708-019B960494DF}">
-                <a14:hiddenLine xmlns="" xmlns:a16="http://schemas.microsoft.com/office/drawing/2014/main" xmlns:p14="http://schemas.microsoft.com/office/powerpoint/2010/main" xmlns:a14="http://schemas.microsoft.com/office/drawing/2010/main" w="9525">
+                <a14:hiddenLine xmlns:a14="http://schemas.microsoft.com/office/drawing/2010/main" xmlns:p14="http://schemas.microsoft.com/office/powerpoint/2010/main" xmlns:a16="http://schemas.microsoft.com/office/drawing/2014/main" xmlns="" w="9525">
                   <a:solidFill>
                     <a:srgbClr val="000000"/>
                   </a:solidFill>
@@ -35489,7 +35509,7 @@
             </a:ln>
             <a:extLst>
               <a:ext uri="{91240B29-F687-4f45-9708-019B960494DF}">
-                <a14:hiddenLine xmlns="" xmlns:a16="http://schemas.microsoft.com/office/drawing/2014/main" xmlns:p14="http://schemas.microsoft.com/office/powerpoint/2010/main" xmlns:a14="http://schemas.microsoft.com/office/drawing/2010/main" w="9525">
+                <a14:hiddenLine xmlns:a14="http://schemas.microsoft.com/office/drawing/2010/main" xmlns:p14="http://schemas.microsoft.com/office/powerpoint/2010/main" xmlns:a16="http://schemas.microsoft.com/office/drawing/2014/main" xmlns="" w="9525">
                   <a:solidFill>
                     <a:srgbClr val="000000"/>
                   </a:solidFill>
@@ -35566,7 +35586,7 @@
             </a:ln>
             <a:extLst>
               <a:ext uri="{91240B29-F687-4f45-9708-019B960494DF}">
-                <a14:hiddenLine xmlns="" xmlns:a16="http://schemas.microsoft.com/office/drawing/2014/main" xmlns:p14="http://schemas.microsoft.com/office/powerpoint/2010/main" xmlns:a14="http://schemas.microsoft.com/office/drawing/2010/main" w="9525">
+                <a14:hiddenLine xmlns:a14="http://schemas.microsoft.com/office/drawing/2010/main" xmlns:p14="http://schemas.microsoft.com/office/powerpoint/2010/main" xmlns:a16="http://schemas.microsoft.com/office/drawing/2014/main" xmlns="" w="9525">
                   <a:solidFill>
                     <a:srgbClr val="000000"/>
                   </a:solidFill>
@@ -35643,7 +35663,7 @@
             </a:ln>
             <a:extLst>
               <a:ext uri="{91240B29-F687-4f45-9708-019B960494DF}">
-                <a14:hiddenLine xmlns="" xmlns:a16="http://schemas.microsoft.com/office/drawing/2014/main" xmlns:p14="http://schemas.microsoft.com/office/powerpoint/2010/main" xmlns:a14="http://schemas.microsoft.com/office/drawing/2010/main" w="9525">
+                <a14:hiddenLine xmlns:a14="http://schemas.microsoft.com/office/drawing/2010/main" xmlns:p14="http://schemas.microsoft.com/office/powerpoint/2010/main" xmlns:a16="http://schemas.microsoft.com/office/drawing/2014/main" xmlns="" w="9525">
                   <a:solidFill>
                     <a:srgbClr val="000000"/>
                   </a:solidFill>
@@ -35748,7 +35768,7 @@
             </a:ln>
             <a:extLst>
               <a:ext uri="{91240B29-F687-4f45-9708-019B960494DF}">
-                <a14:hiddenLine xmlns="" xmlns:a16="http://schemas.microsoft.com/office/drawing/2014/main" xmlns:p14="http://schemas.microsoft.com/office/powerpoint/2010/main" xmlns:a14="http://schemas.microsoft.com/office/drawing/2010/main" w="9525">
+                <a14:hiddenLine xmlns:a14="http://schemas.microsoft.com/office/drawing/2010/main" xmlns:p14="http://schemas.microsoft.com/office/powerpoint/2010/main" xmlns:a16="http://schemas.microsoft.com/office/drawing/2014/main" xmlns="" w="9525">
                   <a:solidFill>
                     <a:srgbClr val="000000"/>
                   </a:solidFill>
@@ -35825,7 +35845,7 @@
             </a:ln>
             <a:extLst>
               <a:ext uri="{91240B29-F687-4f45-9708-019B960494DF}">
-                <a14:hiddenLine xmlns="" xmlns:a16="http://schemas.microsoft.com/office/drawing/2014/main" xmlns:p14="http://schemas.microsoft.com/office/powerpoint/2010/main" xmlns:a14="http://schemas.microsoft.com/office/drawing/2010/main" w="9525">
+                <a14:hiddenLine xmlns:a14="http://schemas.microsoft.com/office/drawing/2010/main" xmlns:p14="http://schemas.microsoft.com/office/powerpoint/2010/main" xmlns:a16="http://schemas.microsoft.com/office/drawing/2014/main" xmlns="" w="9525">
                   <a:solidFill>
                     <a:srgbClr val="000000"/>
                   </a:solidFill>
@@ -35902,7 +35922,7 @@
             </a:ln>
             <a:extLst>
               <a:ext uri="{91240B29-F687-4f45-9708-019B960494DF}">
-                <a14:hiddenLine xmlns="" xmlns:a16="http://schemas.microsoft.com/office/drawing/2014/main" xmlns:p14="http://schemas.microsoft.com/office/powerpoint/2010/main" xmlns:a14="http://schemas.microsoft.com/office/drawing/2010/main" w="9525">
+                <a14:hiddenLine xmlns:a14="http://schemas.microsoft.com/office/drawing/2010/main" xmlns:p14="http://schemas.microsoft.com/office/powerpoint/2010/main" xmlns:a16="http://schemas.microsoft.com/office/drawing/2014/main" xmlns="" w="9525">
                   <a:solidFill>
                     <a:srgbClr val="000000"/>
                   </a:solidFill>
@@ -36007,7 +36027,7 @@
             </a:ln>
             <a:extLst>
               <a:ext uri="{91240B29-F687-4f45-9708-019B960494DF}">
-                <a14:hiddenLine xmlns="" xmlns:a16="http://schemas.microsoft.com/office/drawing/2014/main" xmlns:p14="http://schemas.microsoft.com/office/powerpoint/2010/main" xmlns:a14="http://schemas.microsoft.com/office/drawing/2010/main" w="9525">
+                <a14:hiddenLine xmlns:a14="http://schemas.microsoft.com/office/drawing/2010/main" xmlns:p14="http://schemas.microsoft.com/office/powerpoint/2010/main" xmlns:a16="http://schemas.microsoft.com/office/drawing/2014/main" xmlns="" w="9525">
                   <a:solidFill>
                     <a:srgbClr val="000000"/>
                   </a:solidFill>
@@ -36112,7 +36132,7 @@
             </a:ln>
             <a:extLst>
               <a:ext uri="{91240B29-F687-4f45-9708-019B960494DF}">
-                <a14:hiddenLine xmlns="" xmlns:a16="http://schemas.microsoft.com/office/drawing/2014/main" xmlns:p14="http://schemas.microsoft.com/office/powerpoint/2010/main" xmlns:a14="http://schemas.microsoft.com/office/drawing/2010/main" w="9525">
+                <a14:hiddenLine xmlns:a14="http://schemas.microsoft.com/office/drawing/2010/main" xmlns:p14="http://schemas.microsoft.com/office/powerpoint/2010/main" xmlns:a16="http://schemas.microsoft.com/office/drawing/2014/main" xmlns="" w="9525">
                   <a:solidFill>
                     <a:srgbClr val="000000"/>
                   </a:solidFill>
@@ -36189,7 +36209,7 @@
             </a:ln>
             <a:extLst>
               <a:ext uri="{91240B29-F687-4f45-9708-019B960494DF}">
-                <a14:hiddenLine xmlns="" xmlns:a16="http://schemas.microsoft.com/office/drawing/2014/main" xmlns:p14="http://schemas.microsoft.com/office/powerpoint/2010/main" xmlns:a14="http://schemas.microsoft.com/office/drawing/2010/main" w="9525">
+                <a14:hiddenLine xmlns:a14="http://schemas.microsoft.com/office/drawing/2010/main" xmlns:p14="http://schemas.microsoft.com/office/powerpoint/2010/main" xmlns:a16="http://schemas.microsoft.com/office/drawing/2014/main" xmlns="" w="9525">
                   <a:solidFill>
                     <a:srgbClr val="000000"/>
                   </a:solidFill>
@@ -36314,7 +36334,7 @@
             </a:ln>
             <a:extLst>
               <a:ext uri="{91240B29-F687-4f45-9708-019B960494DF}">
-                <a14:hiddenLine xmlns="" xmlns:a16="http://schemas.microsoft.com/office/drawing/2014/main" xmlns:p14="http://schemas.microsoft.com/office/powerpoint/2010/main" xmlns:a14="http://schemas.microsoft.com/office/drawing/2010/main" w="9525">
+                <a14:hiddenLine xmlns:a14="http://schemas.microsoft.com/office/drawing/2010/main" xmlns:p14="http://schemas.microsoft.com/office/powerpoint/2010/main" xmlns:a16="http://schemas.microsoft.com/office/drawing/2014/main" xmlns="" w="9525">
                   <a:solidFill>
                     <a:srgbClr val="000000"/>
                   </a:solidFill>
@@ -36391,7 +36411,7 @@
             </a:ln>
             <a:extLst>
               <a:ext uri="{91240B29-F687-4f45-9708-019B960494DF}">
-                <a14:hiddenLine xmlns="" xmlns:a16="http://schemas.microsoft.com/office/drawing/2014/main" xmlns:p14="http://schemas.microsoft.com/office/powerpoint/2010/main" xmlns:a14="http://schemas.microsoft.com/office/drawing/2010/main" w="9525">
+                <a14:hiddenLine xmlns:a14="http://schemas.microsoft.com/office/drawing/2010/main" xmlns:p14="http://schemas.microsoft.com/office/powerpoint/2010/main" xmlns:a16="http://schemas.microsoft.com/office/drawing/2014/main" xmlns="" w="9525">
                   <a:solidFill>
                     <a:srgbClr val="000000"/>
                   </a:solidFill>
@@ -36496,7 +36516,7 @@
             </a:ln>
             <a:extLst>
               <a:ext uri="{91240B29-F687-4f45-9708-019B960494DF}">
-                <a14:hiddenLine xmlns="" xmlns:a16="http://schemas.microsoft.com/office/drawing/2014/main" xmlns:p14="http://schemas.microsoft.com/office/powerpoint/2010/main" xmlns:a14="http://schemas.microsoft.com/office/drawing/2010/main" w="9525">
+                <a14:hiddenLine xmlns:a14="http://schemas.microsoft.com/office/drawing/2010/main" xmlns:p14="http://schemas.microsoft.com/office/powerpoint/2010/main" xmlns:a16="http://schemas.microsoft.com/office/drawing/2014/main" xmlns="" w="9525">
                   <a:solidFill>
                     <a:srgbClr val="000000"/>
                   </a:solidFill>
@@ -36601,7 +36621,7 @@
             </a:ln>
             <a:extLst>
               <a:ext uri="{91240B29-F687-4f45-9708-019B960494DF}">
-                <a14:hiddenLine xmlns="" xmlns:a16="http://schemas.microsoft.com/office/drawing/2014/main" xmlns:p14="http://schemas.microsoft.com/office/powerpoint/2010/main" xmlns:a14="http://schemas.microsoft.com/office/drawing/2010/main" w="9525">
+                <a14:hiddenLine xmlns:a14="http://schemas.microsoft.com/office/drawing/2010/main" xmlns:p14="http://schemas.microsoft.com/office/powerpoint/2010/main" xmlns:a16="http://schemas.microsoft.com/office/drawing/2014/main" xmlns="" w="9525">
                   <a:solidFill>
                     <a:srgbClr val="000000"/>
                   </a:solidFill>
@@ -36678,7 +36698,7 @@
             </a:ln>
             <a:extLst>
               <a:ext uri="{91240B29-F687-4f45-9708-019B960494DF}">
-                <a14:hiddenLine xmlns="" xmlns:a16="http://schemas.microsoft.com/office/drawing/2014/main" xmlns:p14="http://schemas.microsoft.com/office/powerpoint/2010/main" xmlns:a14="http://schemas.microsoft.com/office/drawing/2010/main" w="9525">
+                <a14:hiddenLine xmlns:a14="http://schemas.microsoft.com/office/drawing/2010/main" xmlns:p14="http://schemas.microsoft.com/office/powerpoint/2010/main" xmlns:a16="http://schemas.microsoft.com/office/drawing/2014/main" xmlns="" w="9525">
                   <a:solidFill>
                     <a:srgbClr val="000000"/>
                   </a:solidFill>
@@ -36783,7 +36803,7 @@
             </a:ln>
             <a:extLst>
               <a:ext uri="{91240B29-F687-4f45-9708-019B960494DF}">
-                <a14:hiddenLine xmlns="" xmlns:a16="http://schemas.microsoft.com/office/drawing/2014/main" xmlns:p14="http://schemas.microsoft.com/office/powerpoint/2010/main" xmlns:a14="http://schemas.microsoft.com/office/drawing/2010/main" w="9525">
+                <a14:hiddenLine xmlns:a14="http://schemas.microsoft.com/office/drawing/2010/main" xmlns:p14="http://schemas.microsoft.com/office/powerpoint/2010/main" xmlns:a16="http://schemas.microsoft.com/office/drawing/2014/main" xmlns="" w="9525">
                   <a:solidFill>
                     <a:srgbClr val="000000"/>
                   </a:solidFill>
@@ -36888,7 +36908,7 @@
             </a:ln>
             <a:extLst>
               <a:ext uri="{91240B29-F687-4f45-9708-019B960494DF}">
-                <a14:hiddenLine xmlns="" xmlns:a16="http://schemas.microsoft.com/office/drawing/2014/main" xmlns:p14="http://schemas.microsoft.com/office/powerpoint/2010/main" xmlns:a14="http://schemas.microsoft.com/office/drawing/2010/main" w="9525">
+                <a14:hiddenLine xmlns:a14="http://schemas.microsoft.com/office/drawing/2010/main" xmlns:p14="http://schemas.microsoft.com/office/powerpoint/2010/main" xmlns:a16="http://schemas.microsoft.com/office/drawing/2014/main" xmlns="" w="9525">
                   <a:solidFill>
                     <a:srgbClr val="000000"/>
                   </a:solidFill>
@@ -36959,7 +36979,7 @@
             </a:ln>
             <a:extLst>
               <a:ext uri="{91240B29-F687-4f45-9708-019B960494DF}">
-                <a14:hiddenLine xmlns="" xmlns:a16="http://schemas.microsoft.com/office/drawing/2014/main" xmlns:p14="http://schemas.microsoft.com/office/powerpoint/2010/main" xmlns:a14="http://schemas.microsoft.com/office/drawing/2010/main" w="9525">
+                <a14:hiddenLine xmlns:a14="http://schemas.microsoft.com/office/drawing/2010/main" xmlns:p14="http://schemas.microsoft.com/office/powerpoint/2010/main" xmlns:a16="http://schemas.microsoft.com/office/drawing/2014/main" xmlns="" w="9525">
                   <a:solidFill>
                     <a:srgbClr val="000000"/>
                   </a:solidFill>
@@ -37064,7 +37084,7 @@
             </a:ln>
             <a:extLst>
               <a:ext uri="{91240B29-F687-4f45-9708-019B960494DF}">
-                <a14:hiddenLine xmlns="" xmlns:a16="http://schemas.microsoft.com/office/drawing/2014/main" xmlns:p14="http://schemas.microsoft.com/office/powerpoint/2010/main" xmlns:a14="http://schemas.microsoft.com/office/drawing/2010/main" w="9525">
+                <a14:hiddenLine xmlns:a14="http://schemas.microsoft.com/office/drawing/2010/main" xmlns:p14="http://schemas.microsoft.com/office/powerpoint/2010/main" xmlns:a16="http://schemas.microsoft.com/office/drawing/2014/main" xmlns="" w="9525">
                   <a:solidFill>
                     <a:srgbClr val="000000"/>
                   </a:solidFill>
@@ -37135,7 +37155,7 @@
             </a:ln>
             <a:extLst>
               <a:ext uri="{91240B29-F687-4f45-9708-019B960494DF}">
-                <a14:hiddenLine xmlns="" xmlns:a16="http://schemas.microsoft.com/office/drawing/2014/main" xmlns:p14="http://schemas.microsoft.com/office/powerpoint/2010/main" xmlns:a14="http://schemas.microsoft.com/office/drawing/2010/main" w="9525">
+                <a14:hiddenLine xmlns:a14="http://schemas.microsoft.com/office/drawing/2010/main" xmlns:p14="http://schemas.microsoft.com/office/powerpoint/2010/main" xmlns:a16="http://schemas.microsoft.com/office/drawing/2014/main" xmlns="" w="9525">
                   <a:solidFill>
                     <a:srgbClr val="000000"/>
                   </a:solidFill>
@@ -37240,7 +37260,7 @@
             </a:ln>
             <a:extLst>
               <a:ext uri="{91240B29-F687-4f45-9708-019B960494DF}">
-                <a14:hiddenLine xmlns="" xmlns:a16="http://schemas.microsoft.com/office/drawing/2014/main" xmlns:p14="http://schemas.microsoft.com/office/powerpoint/2010/main" xmlns:a14="http://schemas.microsoft.com/office/drawing/2010/main" w="9525">
+                <a14:hiddenLine xmlns:a14="http://schemas.microsoft.com/office/drawing/2010/main" xmlns:p14="http://schemas.microsoft.com/office/powerpoint/2010/main" xmlns:a16="http://schemas.microsoft.com/office/drawing/2014/main" xmlns="" w="9525">
                   <a:solidFill>
                     <a:srgbClr val="000000"/>
                   </a:solidFill>
@@ -37323,7 +37343,7 @@
             </a:ln>
             <a:extLst>
               <a:ext uri="{91240B29-F687-4f45-9708-019B960494DF}">
-                <a14:hiddenLine xmlns="" xmlns:a16="http://schemas.microsoft.com/office/drawing/2014/main" xmlns:p14="http://schemas.microsoft.com/office/powerpoint/2010/main" xmlns:a14="http://schemas.microsoft.com/office/drawing/2010/main" w="9525">
+                <a14:hiddenLine xmlns:a14="http://schemas.microsoft.com/office/drawing/2010/main" xmlns:p14="http://schemas.microsoft.com/office/powerpoint/2010/main" xmlns:a16="http://schemas.microsoft.com/office/drawing/2014/main" xmlns="" w="9525">
                   <a:solidFill>
                     <a:srgbClr val="000000"/>
                   </a:solidFill>
@@ -37428,7 +37448,7 @@
             </a:ln>
             <a:extLst>
               <a:ext uri="{91240B29-F687-4f45-9708-019B960494DF}">
-                <a14:hiddenLine xmlns="" xmlns:a16="http://schemas.microsoft.com/office/drawing/2014/main" xmlns:p14="http://schemas.microsoft.com/office/powerpoint/2010/main" xmlns:a14="http://schemas.microsoft.com/office/drawing/2010/main" w="9525">
+                <a14:hiddenLine xmlns:a14="http://schemas.microsoft.com/office/drawing/2010/main" xmlns:p14="http://schemas.microsoft.com/office/powerpoint/2010/main" xmlns:a16="http://schemas.microsoft.com/office/drawing/2014/main" xmlns="" w="9525">
                   <a:solidFill>
                     <a:srgbClr val="000000"/>
                   </a:solidFill>
@@ -37511,7 +37531,7 @@
             </a:ln>
             <a:extLst>
               <a:ext uri="{91240B29-F687-4f45-9708-019B960494DF}">
-                <a14:hiddenLine xmlns="" xmlns:a16="http://schemas.microsoft.com/office/drawing/2014/main" xmlns:p14="http://schemas.microsoft.com/office/powerpoint/2010/main" xmlns:a14="http://schemas.microsoft.com/office/drawing/2010/main" w="9525">
+                <a14:hiddenLine xmlns:a14="http://schemas.microsoft.com/office/drawing/2010/main" xmlns:p14="http://schemas.microsoft.com/office/powerpoint/2010/main" xmlns:a16="http://schemas.microsoft.com/office/drawing/2014/main" xmlns="" w="9525">
                   <a:solidFill>
                     <a:srgbClr val="000000"/>
                   </a:solidFill>
@@ -37616,7 +37636,7 @@
             </a:ln>
             <a:extLst>
               <a:ext uri="{91240B29-F687-4f45-9708-019B960494DF}">
-                <a14:hiddenLine xmlns="" xmlns:a16="http://schemas.microsoft.com/office/drawing/2014/main" xmlns:p14="http://schemas.microsoft.com/office/powerpoint/2010/main" xmlns:a14="http://schemas.microsoft.com/office/drawing/2010/main" w="9525">
+                <a14:hiddenLine xmlns:a14="http://schemas.microsoft.com/office/drawing/2010/main" xmlns:p14="http://schemas.microsoft.com/office/powerpoint/2010/main" xmlns:a16="http://schemas.microsoft.com/office/drawing/2014/main" xmlns="" w="9525">
                   <a:solidFill>
                     <a:srgbClr val="000000"/>
                   </a:solidFill>
@@ -37665,7 +37685,7 @@
             </a:ln>
             <a:extLst>
               <a:ext uri="{91240B29-F687-4f45-9708-019B960494DF}">
-                <a14:hiddenLine xmlns="" xmlns:a16="http://schemas.microsoft.com/office/drawing/2014/main" xmlns:p14="http://schemas.microsoft.com/office/powerpoint/2010/main" xmlns:a14="http://schemas.microsoft.com/office/drawing/2010/main" w="9525">
+                <a14:hiddenLine xmlns:a14="http://schemas.microsoft.com/office/drawing/2010/main" xmlns:p14="http://schemas.microsoft.com/office/powerpoint/2010/main" xmlns:a16="http://schemas.microsoft.com/office/drawing/2014/main" xmlns="" w="9525">
                   <a:solidFill>
                     <a:srgbClr val="000000"/>
                   </a:solidFill>
@@ -37770,7 +37790,7 @@
             </a:ln>
             <a:extLst>
               <a:ext uri="{91240B29-F687-4f45-9708-019B960494DF}">
-                <a14:hiddenLine xmlns="" xmlns:a16="http://schemas.microsoft.com/office/drawing/2014/main" xmlns:p14="http://schemas.microsoft.com/office/powerpoint/2010/main" xmlns:a14="http://schemas.microsoft.com/office/drawing/2010/main" w="9525">
+                <a14:hiddenLine xmlns:a14="http://schemas.microsoft.com/office/drawing/2010/main" xmlns:p14="http://schemas.microsoft.com/office/powerpoint/2010/main" xmlns:a16="http://schemas.microsoft.com/office/drawing/2014/main" xmlns="" w="9525">
                   <a:solidFill>
                     <a:srgbClr val="000000"/>
                   </a:solidFill>
@@ -37847,7 +37867,7 @@
             </a:ln>
             <a:extLst>
               <a:ext uri="{91240B29-F687-4f45-9708-019B960494DF}">
-                <a14:hiddenLine xmlns="" xmlns:a16="http://schemas.microsoft.com/office/drawing/2014/main" xmlns:p14="http://schemas.microsoft.com/office/powerpoint/2010/main" xmlns:a14="http://schemas.microsoft.com/office/drawing/2010/main" w="9525">
+                <a14:hiddenLine xmlns:a14="http://schemas.microsoft.com/office/drawing/2010/main" xmlns:p14="http://schemas.microsoft.com/office/powerpoint/2010/main" xmlns:a16="http://schemas.microsoft.com/office/drawing/2014/main" xmlns="" w="9525">
                   <a:solidFill>
                     <a:srgbClr val="000000"/>
                   </a:solidFill>
@@ -37924,7 +37944,7 @@
             </a:ln>
             <a:extLst>
               <a:ext uri="{91240B29-F687-4f45-9708-019B960494DF}">
-                <a14:hiddenLine xmlns="" xmlns:a16="http://schemas.microsoft.com/office/drawing/2014/main" xmlns:p14="http://schemas.microsoft.com/office/powerpoint/2010/main" xmlns:a14="http://schemas.microsoft.com/office/drawing/2010/main" w="9525">
+                <a14:hiddenLine xmlns:a14="http://schemas.microsoft.com/office/drawing/2010/main" xmlns:p14="http://schemas.microsoft.com/office/powerpoint/2010/main" xmlns:a16="http://schemas.microsoft.com/office/drawing/2014/main" xmlns="" w="9525">
                   <a:solidFill>
                     <a:srgbClr val="000000"/>
                   </a:solidFill>
@@ -38029,7 +38049,7 @@
             </a:ln>
             <a:extLst>
               <a:ext uri="{91240B29-F687-4f45-9708-019B960494DF}">
-                <a14:hiddenLine xmlns="" xmlns:a16="http://schemas.microsoft.com/office/drawing/2014/main" xmlns:p14="http://schemas.microsoft.com/office/powerpoint/2010/main" xmlns:a14="http://schemas.microsoft.com/office/drawing/2010/main" w="9525">
+                <a14:hiddenLine xmlns:a14="http://schemas.microsoft.com/office/drawing/2010/main" xmlns:p14="http://schemas.microsoft.com/office/powerpoint/2010/main" xmlns:a16="http://schemas.microsoft.com/office/drawing/2014/main" xmlns="" w="9525">
                   <a:solidFill>
                     <a:srgbClr val="000000"/>
                   </a:solidFill>
@@ -38112,7 +38132,7 @@
             </a:ln>
             <a:extLst>
               <a:ext uri="{91240B29-F687-4f45-9708-019B960494DF}">
-                <a14:hiddenLine xmlns="" xmlns:a16="http://schemas.microsoft.com/office/drawing/2014/main" xmlns:p14="http://schemas.microsoft.com/office/powerpoint/2010/main" xmlns:a14="http://schemas.microsoft.com/office/drawing/2010/main" w="9525">
+                <a14:hiddenLine xmlns:a14="http://schemas.microsoft.com/office/drawing/2010/main" xmlns:p14="http://schemas.microsoft.com/office/powerpoint/2010/main" xmlns:a16="http://schemas.microsoft.com/office/drawing/2014/main" xmlns="" w="9525">
                   <a:solidFill>
                     <a:srgbClr val="000000"/>
                   </a:solidFill>
@@ -38189,7 +38209,7 @@
             </a:ln>
             <a:extLst>
               <a:ext uri="{91240B29-F687-4f45-9708-019B960494DF}">
-                <a14:hiddenLine xmlns="" xmlns:a16="http://schemas.microsoft.com/office/drawing/2014/main" xmlns:p14="http://schemas.microsoft.com/office/powerpoint/2010/main" xmlns:a14="http://schemas.microsoft.com/office/drawing/2010/main" w="9525">
+                <a14:hiddenLine xmlns:a14="http://schemas.microsoft.com/office/drawing/2010/main" xmlns:p14="http://schemas.microsoft.com/office/powerpoint/2010/main" xmlns:a16="http://schemas.microsoft.com/office/drawing/2014/main" xmlns="" w="9525">
                   <a:solidFill>
                     <a:srgbClr val="000000"/>
                   </a:solidFill>
@@ -38294,7 +38314,7 @@
             </a:ln>
             <a:extLst>
               <a:ext uri="{91240B29-F687-4f45-9708-019B960494DF}">
-                <a14:hiddenLine xmlns="" xmlns:a16="http://schemas.microsoft.com/office/drawing/2014/main" xmlns:p14="http://schemas.microsoft.com/office/powerpoint/2010/main" xmlns:a14="http://schemas.microsoft.com/office/drawing/2010/main" w="9525">
+                <a14:hiddenLine xmlns:a14="http://schemas.microsoft.com/office/drawing/2010/main" xmlns:p14="http://schemas.microsoft.com/office/powerpoint/2010/main" xmlns:a16="http://schemas.microsoft.com/office/drawing/2014/main" xmlns="" w="9525">
                   <a:solidFill>
                     <a:srgbClr val="000000"/>
                   </a:solidFill>
@@ -38371,7 +38391,7 @@
             </a:ln>
             <a:extLst>
               <a:ext uri="{91240B29-F687-4f45-9708-019B960494DF}">
-                <a14:hiddenLine xmlns="" xmlns:a16="http://schemas.microsoft.com/office/drawing/2014/main" xmlns:p14="http://schemas.microsoft.com/office/powerpoint/2010/main" xmlns:a14="http://schemas.microsoft.com/office/drawing/2010/main" w="9525">
+                <a14:hiddenLine xmlns:a14="http://schemas.microsoft.com/office/drawing/2010/main" xmlns:p14="http://schemas.microsoft.com/office/powerpoint/2010/main" xmlns:a16="http://schemas.microsoft.com/office/drawing/2014/main" xmlns="" w="9525">
                   <a:solidFill>
                     <a:srgbClr val="000000"/>
                   </a:solidFill>
@@ -38476,7 +38496,7 @@
             </a:ln>
             <a:extLst>
               <a:ext uri="{91240B29-F687-4f45-9708-019B960494DF}">
-                <a14:hiddenLine xmlns="" xmlns:a16="http://schemas.microsoft.com/office/drawing/2014/main" xmlns:p14="http://schemas.microsoft.com/office/powerpoint/2010/main" xmlns:a14="http://schemas.microsoft.com/office/drawing/2010/main" w="9525">
+                <a14:hiddenLine xmlns:a14="http://schemas.microsoft.com/office/drawing/2010/main" xmlns:p14="http://schemas.microsoft.com/office/powerpoint/2010/main" xmlns:a16="http://schemas.microsoft.com/office/drawing/2014/main" xmlns="" w="9525">
                   <a:solidFill>
                     <a:srgbClr val="000000"/>
                   </a:solidFill>
@@ -38553,7 +38573,7 @@
             </a:ln>
             <a:extLst>
               <a:ext uri="{91240B29-F687-4f45-9708-019B960494DF}">
-                <a14:hiddenLine xmlns="" xmlns:a16="http://schemas.microsoft.com/office/drawing/2014/main" xmlns:p14="http://schemas.microsoft.com/office/powerpoint/2010/main" xmlns:a14="http://schemas.microsoft.com/office/drawing/2010/main" w="9525">
+                <a14:hiddenLine xmlns:a14="http://schemas.microsoft.com/office/drawing/2010/main" xmlns:p14="http://schemas.microsoft.com/office/powerpoint/2010/main" xmlns:a16="http://schemas.microsoft.com/office/drawing/2014/main" xmlns="" w="9525">
                   <a:solidFill>
                     <a:srgbClr val="000000"/>
                   </a:solidFill>
@@ -38658,7 +38678,7 @@
             </a:ln>
             <a:extLst>
               <a:ext uri="{91240B29-F687-4f45-9708-019B960494DF}">
-                <a14:hiddenLine xmlns="" xmlns:a16="http://schemas.microsoft.com/office/drawing/2014/main" xmlns:p14="http://schemas.microsoft.com/office/powerpoint/2010/main" xmlns:a14="http://schemas.microsoft.com/office/drawing/2010/main" w="9525">
+                <a14:hiddenLine xmlns:a14="http://schemas.microsoft.com/office/drawing/2010/main" xmlns:p14="http://schemas.microsoft.com/office/powerpoint/2010/main" xmlns:a16="http://schemas.microsoft.com/office/drawing/2014/main" xmlns="" w="9525">
                   <a:solidFill>
                     <a:srgbClr val="000000"/>
                   </a:solidFill>
@@ -38707,7 +38727,7 @@
             </a:ln>
             <a:extLst>
               <a:ext uri="{91240B29-F687-4f45-9708-019B960494DF}">
-                <a14:hiddenLine xmlns="" xmlns:a16="http://schemas.microsoft.com/office/drawing/2014/main" xmlns:p14="http://schemas.microsoft.com/office/powerpoint/2010/main" xmlns:a14="http://schemas.microsoft.com/office/drawing/2010/main" w="9525">
+                <a14:hiddenLine xmlns:a14="http://schemas.microsoft.com/office/drawing/2010/main" xmlns:p14="http://schemas.microsoft.com/office/powerpoint/2010/main" xmlns:a16="http://schemas.microsoft.com/office/drawing/2014/main" xmlns="" w="9525">
                   <a:solidFill>
                     <a:srgbClr val="000000"/>
                   </a:solidFill>
@@ -38787,7 +38807,7 @@
             </a:ln>
             <a:extLst>
               <a:ext uri="{91240B29-F687-4f45-9708-019B960494DF}">
-                <a14:hiddenLine xmlns="" xmlns:a16="http://schemas.microsoft.com/office/drawing/2014/main" xmlns:p14="http://schemas.microsoft.com/office/powerpoint/2010/main" xmlns:a14="http://schemas.microsoft.com/office/drawing/2010/main" w="9525">
+                <a14:hiddenLine xmlns:a14="http://schemas.microsoft.com/office/drawing/2010/main" xmlns:p14="http://schemas.microsoft.com/office/powerpoint/2010/main" xmlns:a16="http://schemas.microsoft.com/office/drawing/2014/main" xmlns="" w="9525">
                   <a:solidFill>
                     <a:srgbClr val="000000"/>
                   </a:solidFill>
@@ -38892,7 +38912,7 @@
             </a:ln>
             <a:extLst>
               <a:ext uri="{91240B29-F687-4f45-9708-019B960494DF}">
-                <a14:hiddenLine xmlns="" xmlns:a16="http://schemas.microsoft.com/office/drawing/2014/main" xmlns:p14="http://schemas.microsoft.com/office/powerpoint/2010/main" xmlns:a14="http://schemas.microsoft.com/office/drawing/2010/main" w="9525">
+                <a14:hiddenLine xmlns:a14="http://schemas.microsoft.com/office/drawing/2010/main" xmlns:p14="http://schemas.microsoft.com/office/powerpoint/2010/main" xmlns:a16="http://schemas.microsoft.com/office/drawing/2014/main" xmlns="" w="9525">
                   <a:solidFill>
                     <a:srgbClr val="000000"/>
                   </a:solidFill>
@@ -38969,7 +38989,7 @@
             </a:ln>
             <a:extLst>
               <a:ext uri="{91240B29-F687-4f45-9708-019B960494DF}">
-                <a14:hiddenLine xmlns="" xmlns:a16="http://schemas.microsoft.com/office/drawing/2014/main" xmlns:p14="http://schemas.microsoft.com/office/powerpoint/2010/main" xmlns:a14="http://schemas.microsoft.com/office/drawing/2010/main" w="9525">
+                <a14:hiddenLine xmlns:a14="http://schemas.microsoft.com/office/drawing/2010/main" xmlns:p14="http://schemas.microsoft.com/office/powerpoint/2010/main" xmlns:a16="http://schemas.microsoft.com/office/drawing/2014/main" xmlns="" w="9525">
                   <a:solidFill>
                     <a:srgbClr val="000000"/>
                   </a:solidFill>
@@ -39074,7 +39094,7 @@
             </a:ln>
             <a:extLst>
               <a:ext uri="{91240B29-F687-4f45-9708-019B960494DF}">
-                <a14:hiddenLine xmlns="" xmlns:a16="http://schemas.microsoft.com/office/drawing/2014/main" xmlns:p14="http://schemas.microsoft.com/office/powerpoint/2010/main" xmlns:a14="http://schemas.microsoft.com/office/drawing/2010/main" w="9525">
+                <a14:hiddenLine xmlns:a14="http://schemas.microsoft.com/office/drawing/2010/main" xmlns:p14="http://schemas.microsoft.com/office/powerpoint/2010/main" xmlns:a16="http://schemas.microsoft.com/office/drawing/2014/main" xmlns="" w="9525">
                   <a:solidFill>
                     <a:srgbClr val="000000"/>
                   </a:solidFill>
@@ -39179,7 +39199,7 @@
             </a:ln>
             <a:extLst>
               <a:ext uri="{91240B29-F687-4f45-9708-019B960494DF}">
-                <a14:hiddenLine xmlns="" xmlns:a16="http://schemas.microsoft.com/office/drawing/2014/main" xmlns:p14="http://schemas.microsoft.com/office/powerpoint/2010/main" xmlns:a14="http://schemas.microsoft.com/office/drawing/2010/main" w="9525">
+                <a14:hiddenLine xmlns:a14="http://schemas.microsoft.com/office/drawing/2010/main" xmlns:p14="http://schemas.microsoft.com/office/powerpoint/2010/main" xmlns:a16="http://schemas.microsoft.com/office/drawing/2014/main" xmlns="" w="9525">
                   <a:solidFill>
                     <a:srgbClr val="000000"/>
                   </a:solidFill>
@@ -39259,7 +39279,7 @@
             </a:ln>
             <a:extLst>
               <a:ext uri="{91240B29-F687-4f45-9708-019B960494DF}">
-                <a14:hiddenLine xmlns="" xmlns:a16="http://schemas.microsoft.com/office/drawing/2014/main" xmlns:p14="http://schemas.microsoft.com/office/powerpoint/2010/main" xmlns:a14="http://schemas.microsoft.com/office/drawing/2010/main" w="9525">
+                <a14:hiddenLine xmlns:a14="http://schemas.microsoft.com/office/drawing/2010/main" xmlns:p14="http://schemas.microsoft.com/office/powerpoint/2010/main" xmlns:a16="http://schemas.microsoft.com/office/drawing/2014/main" xmlns="" w="9525">
                   <a:solidFill>
                     <a:srgbClr val="000000"/>
                   </a:solidFill>
@@ -39336,7 +39356,7 @@
             </a:ln>
             <a:extLst>
               <a:ext uri="{91240B29-F687-4f45-9708-019B960494DF}">
-                <a14:hiddenLine xmlns="" xmlns:a16="http://schemas.microsoft.com/office/drawing/2014/main" xmlns:p14="http://schemas.microsoft.com/office/powerpoint/2010/main" xmlns:a14="http://schemas.microsoft.com/office/drawing/2010/main" w="9525">
+                <a14:hiddenLine xmlns:a14="http://schemas.microsoft.com/office/drawing/2010/main" xmlns:p14="http://schemas.microsoft.com/office/powerpoint/2010/main" xmlns:a16="http://schemas.microsoft.com/office/drawing/2014/main" xmlns="" w="9525">
                   <a:solidFill>
                     <a:srgbClr val="000000"/>
                   </a:solidFill>
@@ -39441,7 +39461,7 @@
             </a:ln>
             <a:extLst>
               <a:ext uri="{91240B29-F687-4f45-9708-019B960494DF}">
-                <a14:hiddenLine xmlns="" xmlns:a16="http://schemas.microsoft.com/office/drawing/2014/main" xmlns:p14="http://schemas.microsoft.com/office/powerpoint/2010/main" xmlns:a14="http://schemas.microsoft.com/office/drawing/2010/main" w="9525">
+                <a14:hiddenLine xmlns:a14="http://schemas.microsoft.com/office/drawing/2010/main" xmlns:p14="http://schemas.microsoft.com/office/powerpoint/2010/main" xmlns:a16="http://schemas.microsoft.com/office/drawing/2014/main" xmlns="" w="9525">
                   <a:solidFill>
                     <a:srgbClr val="000000"/>
                   </a:solidFill>
@@ -39546,7 +39566,7 @@
             </a:ln>
             <a:extLst>
               <a:ext uri="{91240B29-F687-4f45-9708-019B960494DF}">
-                <a14:hiddenLine xmlns="" xmlns:a16="http://schemas.microsoft.com/office/drawing/2014/main" xmlns:p14="http://schemas.microsoft.com/office/powerpoint/2010/main" xmlns:a14="http://schemas.microsoft.com/office/drawing/2010/main" w="9525">
+                <a14:hiddenLine xmlns:a14="http://schemas.microsoft.com/office/drawing/2010/main" xmlns:p14="http://schemas.microsoft.com/office/powerpoint/2010/main" xmlns:a16="http://schemas.microsoft.com/office/drawing/2014/main" xmlns="" w="9525">
                   <a:solidFill>
                     <a:srgbClr val="000000"/>
                   </a:solidFill>
@@ -39623,7 +39643,7 @@
             </a:ln>
             <a:extLst>
               <a:ext uri="{91240B29-F687-4f45-9708-019B960494DF}">
-                <a14:hiddenLine xmlns="" xmlns:a16="http://schemas.microsoft.com/office/drawing/2014/main" xmlns:p14="http://schemas.microsoft.com/office/powerpoint/2010/main" xmlns:a14="http://schemas.microsoft.com/office/drawing/2010/main" w="9525">
+                <a14:hiddenLine xmlns:a14="http://schemas.microsoft.com/office/drawing/2010/main" xmlns:p14="http://schemas.microsoft.com/office/powerpoint/2010/main" xmlns:a16="http://schemas.microsoft.com/office/drawing/2014/main" xmlns="" w="9525">
                   <a:solidFill>
                     <a:srgbClr val="000000"/>
                   </a:solidFill>
@@ -39758,7 +39778,7 @@
             </a:ln>
             <a:extLst>
               <a:ext uri="{91240B29-F687-4f45-9708-019B960494DF}">
-                <a14:hiddenLine xmlns="" xmlns:a16="http://schemas.microsoft.com/office/drawing/2014/main" xmlns:p14="http://schemas.microsoft.com/office/powerpoint/2010/main" xmlns:a14="http://schemas.microsoft.com/office/drawing/2010/main" w="9525">
+                <a14:hiddenLine xmlns:a14="http://schemas.microsoft.com/office/drawing/2010/main" xmlns:p14="http://schemas.microsoft.com/office/powerpoint/2010/main" xmlns:a16="http://schemas.microsoft.com/office/drawing/2014/main" xmlns="" w="9525">
                   <a:solidFill>
                     <a:srgbClr val="000000"/>
                   </a:solidFill>
@@ -39841,7 +39861,7 @@
             </a:ln>
             <a:extLst>
               <a:ext uri="{91240B29-F687-4f45-9708-019B960494DF}">
-                <a14:hiddenLine xmlns="" xmlns:a16="http://schemas.microsoft.com/office/drawing/2014/main" xmlns:p14="http://schemas.microsoft.com/office/powerpoint/2010/main" xmlns:a14="http://schemas.microsoft.com/office/drawing/2010/main" w="9525">
+                <a14:hiddenLine xmlns:a14="http://schemas.microsoft.com/office/drawing/2010/main" xmlns:p14="http://schemas.microsoft.com/office/powerpoint/2010/main" xmlns:a16="http://schemas.microsoft.com/office/drawing/2014/main" xmlns="" w="9525">
                   <a:solidFill>
                     <a:srgbClr val="000000"/>
                   </a:solidFill>
@@ -39946,7 +39966,7 @@
             </a:ln>
             <a:extLst>
               <a:ext uri="{91240B29-F687-4f45-9708-019B960494DF}">
-                <a14:hiddenLine xmlns="" xmlns:a16="http://schemas.microsoft.com/office/drawing/2014/main" xmlns:p14="http://schemas.microsoft.com/office/powerpoint/2010/main" xmlns:a14="http://schemas.microsoft.com/office/drawing/2010/main" w="9525">
+                <a14:hiddenLine xmlns:a14="http://schemas.microsoft.com/office/drawing/2010/main" xmlns:p14="http://schemas.microsoft.com/office/powerpoint/2010/main" xmlns:a16="http://schemas.microsoft.com/office/drawing/2014/main" xmlns="" w="9525">
                   <a:solidFill>
                     <a:srgbClr val="000000"/>
                   </a:solidFill>

</xml_diff>

<commit_message>
A few more slide updates.
</commit_message>
<xml_diff>
--- a/slides/601 - Refactoring.pptx
+++ b/slides/601 - Refactoring.pptx
@@ -19903,6 +19903,88 @@
   <p:clrMapOvr>
     <a:masterClrMapping/>
   </p:clrMapOvr>
+  <p:timing>
+    <p:tnLst>
+      <p:par>
+        <p:cTn id="1" dur="indefinite" restart="never" nodeType="tmRoot">
+          <p:childTnLst>
+            <p:seq concurrent="1" nextAc="seek">
+              <p:cTn id="2" dur="indefinite" nodeType="mainSeq">
+                <p:childTnLst>
+                  <p:par>
+                    <p:cTn id="3" fill="hold">
+                      <p:stCondLst>
+                        <p:cond delay="indefinite"/>
+                      </p:stCondLst>
+                      <p:childTnLst>
+                        <p:par>
+                          <p:cTn id="4" fill="hold">
+                            <p:stCondLst>
+                              <p:cond delay="0"/>
+                            </p:stCondLst>
+                            <p:childTnLst>
+                              <p:par>
+                                <p:cTn id="5" presetID="1" presetClass="entr" presetSubtype="0" fill="hold" grpId="0" nodeType="clickEffect">
+                                  <p:stCondLst>
+                                    <p:cond delay="0"/>
+                                  </p:stCondLst>
+                                  <p:childTnLst>
+                                    <p:set>
+                                      <p:cBhvr>
+                                        <p:cTn id="6" dur="1" fill="hold">
+                                          <p:stCondLst>
+                                            <p:cond delay="0"/>
+                                          </p:stCondLst>
+                                        </p:cTn>
+                                        <p:tgtEl>
+                                          <p:spTgt spid="3">
+                                            <p:txEl>
+                                              <p:pRg st="0" end="0"/>
+                                            </p:txEl>
+                                          </p:spTgt>
+                                        </p:tgtEl>
+                                        <p:attrNameLst>
+                                          <p:attrName>style.visibility</p:attrName>
+                                        </p:attrNameLst>
+                                      </p:cBhvr>
+                                      <p:to>
+                                        <p:strVal val="visible"/>
+                                      </p:to>
+                                    </p:set>
+                                  </p:childTnLst>
+                                </p:cTn>
+                              </p:par>
+                            </p:childTnLst>
+                          </p:cTn>
+                        </p:par>
+                      </p:childTnLst>
+                    </p:cTn>
+                  </p:par>
+                </p:childTnLst>
+              </p:cTn>
+              <p:prevCondLst>
+                <p:cond evt="onPrev" delay="0">
+                  <p:tgtEl>
+                    <p:sldTgt/>
+                  </p:tgtEl>
+                </p:cond>
+              </p:prevCondLst>
+              <p:nextCondLst>
+                <p:cond evt="onNext" delay="0">
+                  <p:tgtEl>
+                    <p:sldTgt/>
+                  </p:tgtEl>
+                </p:cond>
+              </p:nextCondLst>
+            </p:seq>
+          </p:childTnLst>
+        </p:cTn>
+      </p:par>
+    </p:tnLst>
+    <p:bldLst>
+      <p:bldP spid="3" grpId="0" build="p"/>
+    </p:bldLst>
+  </p:timing>
 </p:sld>
 </file>
 
@@ -20328,6 +20410,137 @@
   <p:clrMapOvr>
     <a:masterClrMapping/>
   </p:clrMapOvr>
+  <p:timing>
+    <p:tnLst>
+      <p:par>
+        <p:cTn id="1" dur="indefinite" restart="never" nodeType="tmRoot">
+          <p:childTnLst>
+            <p:seq concurrent="1" nextAc="seek">
+              <p:cTn id="2" dur="indefinite" nodeType="mainSeq">
+                <p:childTnLst>
+                  <p:par>
+                    <p:cTn id="3" fill="hold">
+                      <p:stCondLst>
+                        <p:cond delay="indefinite"/>
+                      </p:stCondLst>
+                      <p:childTnLst>
+                        <p:par>
+                          <p:cTn id="4" fill="hold">
+                            <p:stCondLst>
+                              <p:cond delay="0"/>
+                            </p:stCondLst>
+                            <p:childTnLst>
+                              <p:par>
+                                <p:cTn id="5" presetID="1" presetClass="entr" presetSubtype="0" fill="hold" grpId="0" nodeType="clickEffect">
+                                  <p:stCondLst>
+                                    <p:cond delay="0"/>
+                                  </p:stCondLst>
+                                  <p:childTnLst>
+                                    <p:set>
+                                      <p:cBhvr>
+                                        <p:cTn id="6" dur="1" fill="hold">
+                                          <p:stCondLst>
+                                            <p:cond delay="0"/>
+                                          </p:stCondLst>
+                                        </p:cTn>
+                                        <p:tgtEl>
+                                          <p:spTgt spid="3">
+                                            <p:txEl>
+                                              <p:pRg st="0" end="0"/>
+                                            </p:txEl>
+                                          </p:spTgt>
+                                        </p:tgtEl>
+                                        <p:attrNameLst>
+                                          <p:attrName>style.visibility</p:attrName>
+                                        </p:attrNameLst>
+                                      </p:cBhvr>
+                                      <p:to>
+                                        <p:strVal val="visible"/>
+                                      </p:to>
+                                    </p:set>
+                                  </p:childTnLst>
+                                </p:cTn>
+                              </p:par>
+                            </p:childTnLst>
+                          </p:cTn>
+                        </p:par>
+                      </p:childTnLst>
+                    </p:cTn>
+                  </p:par>
+                  <p:par>
+                    <p:cTn id="7" fill="hold">
+                      <p:stCondLst>
+                        <p:cond delay="indefinite"/>
+                      </p:stCondLst>
+                      <p:childTnLst>
+                        <p:par>
+                          <p:cTn id="8" fill="hold">
+                            <p:stCondLst>
+                              <p:cond delay="0"/>
+                            </p:stCondLst>
+                            <p:childTnLst>
+                              <p:par>
+                                <p:cTn id="9" presetID="1" presetClass="entr" presetSubtype="0" fill="hold" grpId="0" nodeType="clickEffect">
+                                  <p:stCondLst>
+                                    <p:cond delay="0"/>
+                                  </p:stCondLst>
+                                  <p:childTnLst>
+                                    <p:set>
+                                      <p:cBhvr>
+                                        <p:cTn id="10" dur="1" fill="hold">
+                                          <p:stCondLst>
+                                            <p:cond delay="0"/>
+                                          </p:stCondLst>
+                                        </p:cTn>
+                                        <p:tgtEl>
+                                          <p:spTgt spid="3">
+                                            <p:txEl>
+                                              <p:pRg st="1" end="1"/>
+                                            </p:txEl>
+                                          </p:spTgt>
+                                        </p:tgtEl>
+                                        <p:attrNameLst>
+                                          <p:attrName>style.visibility</p:attrName>
+                                        </p:attrNameLst>
+                                      </p:cBhvr>
+                                      <p:to>
+                                        <p:strVal val="visible"/>
+                                      </p:to>
+                                    </p:set>
+                                  </p:childTnLst>
+                                </p:cTn>
+                              </p:par>
+                            </p:childTnLst>
+                          </p:cTn>
+                        </p:par>
+                      </p:childTnLst>
+                    </p:cTn>
+                  </p:par>
+                </p:childTnLst>
+              </p:cTn>
+              <p:prevCondLst>
+                <p:cond evt="onPrev" delay="0">
+                  <p:tgtEl>
+                    <p:sldTgt/>
+                  </p:tgtEl>
+                </p:cond>
+              </p:prevCondLst>
+              <p:nextCondLst>
+                <p:cond evt="onNext" delay="0">
+                  <p:tgtEl>
+                    <p:sldTgt/>
+                  </p:tgtEl>
+                </p:cond>
+              </p:nextCondLst>
+            </p:seq>
+          </p:childTnLst>
+        </p:cTn>
+      </p:par>
+    </p:tnLst>
+    <p:bldLst>
+      <p:bldP spid="3" grpId="0" build="p"/>
+    </p:bldLst>
+  </p:timing>
 </p:sld>
 </file>
 
@@ -20730,6 +20943,137 @@
   <p:clrMapOvr>
     <a:masterClrMapping/>
   </p:clrMapOvr>
+  <p:timing>
+    <p:tnLst>
+      <p:par>
+        <p:cTn id="1" dur="indefinite" restart="never" nodeType="tmRoot">
+          <p:childTnLst>
+            <p:seq concurrent="1" nextAc="seek">
+              <p:cTn id="2" dur="indefinite" nodeType="mainSeq">
+                <p:childTnLst>
+                  <p:par>
+                    <p:cTn id="3" fill="hold">
+                      <p:stCondLst>
+                        <p:cond delay="indefinite"/>
+                      </p:stCondLst>
+                      <p:childTnLst>
+                        <p:par>
+                          <p:cTn id="4" fill="hold">
+                            <p:stCondLst>
+                              <p:cond delay="0"/>
+                            </p:stCondLst>
+                            <p:childTnLst>
+                              <p:par>
+                                <p:cTn id="5" presetID="1" presetClass="entr" presetSubtype="0" fill="hold" grpId="0" nodeType="clickEffect">
+                                  <p:stCondLst>
+                                    <p:cond delay="0"/>
+                                  </p:stCondLst>
+                                  <p:childTnLst>
+                                    <p:set>
+                                      <p:cBhvr>
+                                        <p:cTn id="6" dur="1" fill="hold">
+                                          <p:stCondLst>
+                                            <p:cond delay="0"/>
+                                          </p:stCondLst>
+                                        </p:cTn>
+                                        <p:tgtEl>
+                                          <p:spTgt spid="3">
+                                            <p:txEl>
+                                              <p:pRg st="0" end="0"/>
+                                            </p:txEl>
+                                          </p:spTgt>
+                                        </p:tgtEl>
+                                        <p:attrNameLst>
+                                          <p:attrName>style.visibility</p:attrName>
+                                        </p:attrNameLst>
+                                      </p:cBhvr>
+                                      <p:to>
+                                        <p:strVal val="visible"/>
+                                      </p:to>
+                                    </p:set>
+                                  </p:childTnLst>
+                                </p:cTn>
+                              </p:par>
+                            </p:childTnLst>
+                          </p:cTn>
+                        </p:par>
+                      </p:childTnLst>
+                    </p:cTn>
+                  </p:par>
+                  <p:par>
+                    <p:cTn id="7" fill="hold">
+                      <p:stCondLst>
+                        <p:cond delay="indefinite"/>
+                      </p:stCondLst>
+                      <p:childTnLst>
+                        <p:par>
+                          <p:cTn id="8" fill="hold">
+                            <p:stCondLst>
+                              <p:cond delay="0"/>
+                            </p:stCondLst>
+                            <p:childTnLst>
+                              <p:par>
+                                <p:cTn id="9" presetID="1" presetClass="entr" presetSubtype="0" fill="hold" grpId="0" nodeType="clickEffect">
+                                  <p:stCondLst>
+                                    <p:cond delay="0"/>
+                                  </p:stCondLst>
+                                  <p:childTnLst>
+                                    <p:set>
+                                      <p:cBhvr>
+                                        <p:cTn id="10" dur="1" fill="hold">
+                                          <p:stCondLst>
+                                            <p:cond delay="0"/>
+                                          </p:stCondLst>
+                                        </p:cTn>
+                                        <p:tgtEl>
+                                          <p:spTgt spid="3">
+                                            <p:txEl>
+                                              <p:pRg st="1" end="1"/>
+                                            </p:txEl>
+                                          </p:spTgt>
+                                        </p:tgtEl>
+                                        <p:attrNameLst>
+                                          <p:attrName>style.visibility</p:attrName>
+                                        </p:attrNameLst>
+                                      </p:cBhvr>
+                                      <p:to>
+                                        <p:strVal val="visible"/>
+                                      </p:to>
+                                    </p:set>
+                                  </p:childTnLst>
+                                </p:cTn>
+                              </p:par>
+                            </p:childTnLst>
+                          </p:cTn>
+                        </p:par>
+                      </p:childTnLst>
+                    </p:cTn>
+                  </p:par>
+                </p:childTnLst>
+              </p:cTn>
+              <p:prevCondLst>
+                <p:cond evt="onPrev" delay="0">
+                  <p:tgtEl>
+                    <p:sldTgt/>
+                  </p:tgtEl>
+                </p:cond>
+              </p:prevCondLst>
+              <p:nextCondLst>
+                <p:cond evt="onNext" delay="0">
+                  <p:tgtEl>
+                    <p:sldTgt/>
+                  </p:tgtEl>
+                </p:cond>
+              </p:nextCondLst>
+            </p:seq>
+          </p:childTnLst>
+        </p:cTn>
+      </p:par>
+    </p:tnLst>
+    <p:bldLst>
+      <p:bldP spid="3" grpId="0" build="p"/>
+    </p:bldLst>
+  </p:timing>
 </p:sld>
 </file>
 
@@ -21389,6 +21733,137 @@
   <p:clrMapOvr>
     <a:masterClrMapping/>
   </p:clrMapOvr>
+  <p:timing>
+    <p:tnLst>
+      <p:par>
+        <p:cTn id="1" dur="indefinite" restart="never" nodeType="tmRoot">
+          <p:childTnLst>
+            <p:seq concurrent="1" nextAc="seek">
+              <p:cTn id="2" dur="indefinite" nodeType="mainSeq">
+                <p:childTnLst>
+                  <p:par>
+                    <p:cTn id="3" fill="hold">
+                      <p:stCondLst>
+                        <p:cond delay="indefinite"/>
+                      </p:stCondLst>
+                      <p:childTnLst>
+                        <p:par>
+                          <p:cTn id="4" fill="hold">
+                            <p:stCondLst>
+                              <p:cond delay="0"/>
+                            </p:stCondLst>
+                            <p:childTnLst>
+                              <p:par>
+                                <p:cTn id="5" presetID="1" presetClass="entr" presetSubtype="0" fill="hold" grpId="0" nodeType="clickEffect">
+                                  <p:stCondLst>
+                                    <p:cond delay="0"/>
+                                  </p:stCondLst>
+                                  <p:childTnLst>
+                                    <p:set>
+                                      <p:cBhvr>
+                                        <p:cTn id="6" dur="1" fill="hold">
+                                          <p:stCondLst>
+                                            <p:cond delay="0"/>
+                                          </p:stCondLst>
+                                        </p:cTn>
+                                        <p:tgtEl>
+                                          <p:spTgt spid="3">
+                                            <p:txEl>
+                                              <p:pRg st="0" end="0"/>
+                                            </p:txEl>
+                                          </p:spTgt>
+                                        </p:tgtEl>
+                                        <p:attrNameLst>
+                                          <p:attrName>style.visibility</p:attrName>
+                                        </p:attrNameLst>
+                                      </p:cBhvr>
+                                      <p:to>
+                                        <p:strVal val="visible"/>
+                                      </p:to>
+                                    </p:set>
+                                  </p:childTnLst>
+                                </p:cTn>
+                              </p:par>
+                            </p:childTnLst>
+                          </p:cTn>
+                        </p:par>
+                      </p:childTnLst>
+                    </p:cTn>
+                  </p:par>
+                  <p:par>
+                    <p:cTn id="7" fill="hold">
+                      <p:stCondLst>
+                        <p:cond delay="indefinite"/>
+                      </p:stCondLst>
+                      <p:childTnLst>
+                        <p:par>
+                          <p:cTn id="8" fill="hold">
+                            <p:stCondLst>
+                              <p:cond delay="0"/>
+                            </p:stCondLst>
+                            <p:childTnLst>
+                              <p:par>
+                                <p:cTn id="9" presetID="1" presetClass="entr" presetSubtype="0" fill="hold" grpId="0" nodeType="clickEffect">
+                                  <p:stCondLst>
+                                    <p:cond delay="0"/>
+                                  </p:stCondLst>
+                                  <p:childTnLst>
+                                    <p:set>
+                                      <p:cBhvr>
+                                        <p:cTn id="10" dur="1" fill="hold">
+                                          <p:stCondLst>
+                                            <p:cond delay="0"/>
+                                          </p:stCondLst>
+                                        </p:cTn>
+                                        <p:tgtEl>
+                                          <p:spTgt spid="3">
+                                            <p:txEl>
+                                              <p:pRg st="1" end="1"/>
+                                            </p:txEl>
+                                          </p:spTgt>
+                                        </p:tgtEl>
+                                        <p:attrNameLst>
+                                          <p:attrName>style.visibility</p:attrName>
+                                        </p:attrNameLst>
+                                      </p:cBhvr>
+                                      <p:to>
+                                        <p:strVal val="visible"/>
+                                      </p:to>
+                                    </p:set>
+                                  </p:childTnLst>
+                                </p:cTn>
+                              </p:par>
+                            </p:childTnLst>
+                          </p:cTn>
+                        </p:par>
+                      </p:childTnLst>
+                    </p:cTn>
+                  </p:par>
+                </p:childTnLst>
+              </p:cTn>
+              <p:prevCondLst>
+                <p:cond evt="onPrev" delay="0">
+                  <p:tgtEl>
+                    <p:sldTgt/>
+                  </p:tgtEl>
+                </p:cond>
+              </p:prevCondLst>
+              <p:nextCondLst>
+                <p:cond evt="onNext" delay="0">
+                  <p:tgtEl>
+                    <p:sldTgt/>
+                  </p:tgtEl>
+                </p:cond>
+              </p:nextCondLst>
+            </p:seq>
+          </p:childTnLst>
+        </p:cTn>
+      </p:par>
+    </p:tnLst>
+    <p:bldLst>
+      <p:bldP spid="3" grpId="0" build="p"/>
+    </p:bldLst>
+  </p:timing>
 </p:sld>
 </file>
 
@@ -22233,6 +22708,137 @@
   <p:clrMapOvr>
     <a:masterClrMapping/>
   </p:clrMapOvr>
+  <p:timing>
+    <p:tnLst>
+      <p:par>
+        <p:cTn id="1" dur="indefinite" restart="never" nodeType="tmRoot">
+          <p:childTnLst>
+            <p:seq concurrent="1" nextAc="seek">
+              <p:cTn id="2" dur="indefinite" nodeType="mainSeq">
+                <p:childTnLst>
+                  <p:par>
+                    <p:cTn id="3" fill="hold">
+                      <p:stCondLst>
+                        <p:cond delay="indefinite"/>
+                      </p:stCondLst>
+                      <p:childTnLst>
+                        <p:par>
+                          <p:cTn id="4" fill="hold">
+                            <p:stCondLst>
+                              <p:cond delay="0"/>
+                            </p:stCondLst>
+                            <p:childTnLst>
+                              <p:par>
+                                <p:cTn id="5" presetID="1" presetClass="entr" presetSubtype="0" fill="hold" grpId="0" nodeType="clickEffect">
+                                  <p:stCondLst>
+                                    <p:cond delay="0"/>
+                                  </p:stCondLst>
+                                  <p:childTnLst>
+                                    <p:set>
+                                      <p:cBhvr>
+                                        <p:cTn id="6" dur="1" fill="hold">
+                                          <p:stCondLst>
+                                            <p:cond delay="0"/>
+                                          </p:stCondLst>
+                                        </p:cTn>
+                                        <p:tgtEl>
+                                          <p:spTgt spid="3">
+                                            <p:txEl>
+                                              <p:pRg st="0" end="0"/>
+                                            </p:txEl>
+                                          </p:spTgt>
+                                        </p:tgtEl>
+                                        <p:attrNameLst>
+                                          <p:attrName>style.visibility</p:attrName>
+                                        </p:attrNameLst>
+                                      </p:cBhvr>
+                                      <p:to>
+                                        <p:strVal val="visible"/>
+                                      </p:to>
+                                    </p:set>
+                                  </p:childTnLst>
+                                </p:cTn>
+                              </p:par>
+                            </p:childTnLst>
+                          </p:cTn>
+                        </p:par>
+                      </p:childTnLst>
+                    </p:cTn>
+                  </p:par>
+                  <p:par>
+                    <p:cTn id="7" fill="hold">
+                      <p:stCondLst>
+                        <p:cond delay="indefinite"/>
+                      </p:stCondLst>
+                      <p:childTnLst>
+                        <p:par>
+                          <p:cTn id="8" fill="hold">
+                            <p:stCondLst>
+                              <p:cond delay="0"/>
+                            </p:stCondLst>
+                            <p:childTnLst>
+                              <p:par>
+                                <p:cTn id="9" presetID="1" presetClass="entr" presetSubtype="0" fill="hold" grpId="0" nodeType="clickEffect">
+                                  <p:stCondLst>
+                                    <p:cond delay="0"/>
+                                  </p:stCondLst>
+                                  <p:childTnLst>
+                                    <p:set>
+                                      <p:cBhvr>
+                                        <p:cTn id="10" dur="1" fill="hold">
+                                          <p:stCondLst>
+                                            <p:cond delay="0"/>
+                                          </p:stCondLst>
+                                        </p:cTn>
+                                        <p:tgtEl>
+                                          <p:spTgt spid="3">
+                                            <p:txEl>
+                                              <p:pRg st="1" end="1"/>
+                                            </p:txEl>
+                                          </p:spTgt>
+                                        </p:tgtEl>
+                                        <p:attrNameLst>
+                                          <p:attrName>style.visibility</p:attrName>
+                                        </p:attrNameLst>
+                                      </p:cBhvr>
+                                      <p:to>
+                                        <p:strVal val="visible"/>
+                                      </p:to>
+                                    </p:set>
+                                  </p:childTnLst>
+                                </p:cTn>
+                              </p:par>
+                            </p:childTnLst>
+                          </p:cTn>
+                        </p:par>
+                      </p:childTnLst>
+                    </p:cTn>
+                  </p:par>
+                </p:childTnLst>
+              </p:cTn>
+              <p:prevCondLst>
+                <p:cond evt="onPrev" delay="0">
+                  <p:tgtEl>
+                    <p:sldTgt/>
+                  </p:tgtEl>
+                </p:cond>
+              </p:prevCondLst>
+              <p:nextCondLst>
+                <p:cond evt="onNext" delay="0">
+                  <p:tgtEl>
+                    <p:sldTgt/>
+                  </p:tgtEl>
+                </p:cond>
+              </p:nextCondLst>
+            </p:seq>
+          </p:childTnLst>
+        </p:cTn>
+      </p:par>
+    </p:tnLst>
+    <p:bldLst>
+      <p:bldP spid="3" grpId="0" build="p"/>
+    </p:bldLst>
+  </p:timing>
 </p:sld>
 </file>
 

</xml_diff>